<commit_message>
*DELETE Namen im Inhaltsverzeichnis
</commit_message>
<xml_diff>
--- a/doc/Präsentationen/SF AG_Praesentation_Pflichtenheft.pptx
+++ b/doc/Präsentationen/SF AG_Praesentation_Pflichtenheft.pptx
@@ -4815,7 +4815,7 @@
         <a:p>
           <a:r>
             <a:rPr lang="de-DE" sz="1800" dirty="0" smtClean="0"/>
-            <a:t>Zielbestimmung und Produkteinsatz – Mario</a:t>
+            <a:t>Zielbestimmung und Produkteinsatz </a:t>
           </a:r>
           <a:endParaRPr lang="de-DE" sz="1800" dirty="0"/>
         </a:p>
@@ -5166,8 +5166,12 @@
         <a:lstStyle/>
         <a:p>
           <a:r>
-            <a:rPr lang="de-DE" sz="1800" smtClean="0"/>
-            <a:t>Produkt- und Entwicklungsumgebung - Denis</a:t>
+            <a:rPr lang="de-DE" sz="1800" dirty="0" smtClean="0"/>
+            <a:t>Produkt- und </a:t>
+          </a:r>
+          <a:r>
+            <a:rPr lang="de-DE" sz="1800" dirty="0" smtClean="0"/>
+            <a:t>Entwicklungsumgebung</a:t>
           </a:r>
           <a:endParaRPr lang="de-DE" sz="1800" dirty="0" smtClean="0"/>
         </a:p>
@@ -5212,7 +5216,7 @@
           </a:r>
           <a:r>
             <a:rPr lang="de-DE" sz="1800" dirty="0" smtClean="0"/>
-            <a:t> –Denis &amp; Hannes</a:t>
+            <a:t> </a:t>
           </a:r>
         </a:p>
       </dgm:t>
@@ -5248,7 +5252,7 @@
         <a:p>
           <a:r>
             <a:rPr lang="de-DE" sz="1800" dirty="0" smtClean="0"/>
-            <a:t>Produktfunktionen und Nutzungsoberfläche – Hannes &amp; Anna</a:t>
+            <a:t>Produktfunktionen und Nutzungsoberfläche </a:t>
           </a:r>
         </a:p>
       </dgm:t>
@@ -5284,8 +5288,13 @@
         <a:p>
           <a:r>
             <a:rPr lang="de-DE" sz="1800" dirty="0" smtClean="0"/>
-            <a:t>Qualitätsbestimmungen und Testszenarien - Christian</a:t>
+            <a:t>Qualitätsbestimmungen und </a:t>
           </a:r>
+          <a:r>
+            <a:rPr lang="de-DE" sz="1800" dirty="0" smtClean="0"/>
+            <a:t>Testszenarien</a:t>
+          </a:r>
+          <a:endParaRPr lang="de-DE" sz="1800" dirty="0" smtClean="0"/>
         </a:p>
       </dgm:t>
     </dgm:pt>
@@ -5319,8 +5328,12 @@
         <a:lstStyle/>
         <a:p>
           <a:r>
-            <a:rPr lang="de-DE" sz="1800" smtClean="0"/>
-            <a:t>Projektplan und Kostenvoranschlag –Christian, Mario</a:t>
+            <a:rPr lang="de-DE" sz="1800" dirty="0" smtClean="0"/>
+            <a:t>Projektplan und </a:t>
+          </a:r>
+          <a:r>
+            <a:rPr lang="de-DE" sz="1800" dirty="0" smtClean="0"/>
+            <a:t>Kostenvoranschlag</a:t>
           </a:r>
           <a:endParaRPr lang="de-DE" sz="1800" dirty="0" smtClean="0"/>
         </a:p>
@@ -5356,8 +5369,12 @@
         <a:lstStyle/>
         <a:p>
           <a:r>
-            <a:rPr lang="de-DE" sz="1800" smtClean="0"/>
-            <a:t>Innensicht des Projekts -Anna</a:t>
+            <a:rPr lang="de-DE" sz="1800" dirty="0" smtClean="0"/>
+            <a:t>Innensicht des </a:t>
+          </a:r>
+          <a:r>
+            <a:rPr lang="de-DE" sz="1800" dirty="0" smtClean="0"/>
+            <a:t>Projekts</a:t>
           </a:r>
           <a:endParaRPr lang="de-DE" sz="1800" dirty="0" smtClean="0"/>
         </a:p>
@@ -5673,35 +5690,35 @@
     </dgm:pt>
   </dgm:ptLst>
   <dgm:cxnLst>
-    <dgm:cxn modelId="{B7A99A54-56A7-4B98-9C3A-F5B0292C9EA1}" srcId="{B1389AA1-4F50-41C7-BDAF-28EE93F9478B}" destId="{9AD6B979-877E-4A34-A507-055B0020E11F}" srcOrd="0" destOrd="0" parTransId="{8B8D9D8E-A442-4608-91C0-A153A022DD46}" sibTransId="{D3EC2C15-D7FE-4E0E-BEBA-D29F178F6494}"/>
+    <dgm:cxn modelId="{8DF4DE35-9281-45E6-84BF-FB23CD261E55}" type="presOf" srcId="{74D2B66C-A75A-4853-B4F0-3B1F136FC023}" destId="{B2D2E7C7-A742-4586-8A0E-2B612AA3D8BB}" srcOrd="0" destOrd="0" presId="urn:microsoft.com/office/officeart/2005/8/layout/chevron2"/>
+    <dgm:cxn modelId="{F07738AC-9611-49B6-9F04-FAD373BF3A1E}" type="presOf" srcId="{C5BE56B8-E998-4994-AB6D-D53C001808F8}" destId="{2AB58C2D-4664-457C-A832-27293074B7DD}" srcOrd="0" destOrd="0" presId="urn:microsoft.com/office/officeart/2005/8/layout/chevron2"/>
+    <dgm:cxn modelId="{77FE077E-B089-4588-817C-88D1CFF8A672}" srcId="{64606DBA-29EC-4F5E-BF5D-F0B923FB34A7}" destId="{7366CD37-DA49-4525-AC13-116241659A95}" srcOrd="0" destOrd="0" parTransId="{5FA333EC-8335-4994-B6AC-1170F3F0DBC5}" sibTransId="{2CF5DE81-BCF7-4D6C-949A-F9DAEE711BA9}"/>
+    <dgm:cxn modelId="{33F7DFA3-6463-48F1-ACA0-013561A41005}" srcId="{D9890230-8E9A-4334-87C3-5C2EF50BBCF6}" destId="{58634E8B-57B7-4D3B-9A79-6256E54BAA31}" srcOrd="2" destOrd="0" parTransId="{CDB4DDCC-151B-4B86-8D18-414BEAD395BF}" sibTransId="{E4710B5A-0B02-4110-9DCC-9A0BAEC84B31}"/>
     <dgm:cxn modelId="{9C3B1520-E2D7-46E0-9BD6-0BA4B15627C0}" type="presOf" srcId="{5A28F3F4-5BBD-4E33-A71C-03A2E9049957}" destId="{E3001D05-152A-4029-8EE4-34737AC02E20}" srcOrd="0" destOrd="0" presId="urn:microsoft.com/office/officeart/2005/8/layout/chevron2"/>
-    <dgm:cxn modelId="{2488FE0A-3AE4-46B1-A63A-F3FD5B485C27}" type="presOf" srcId="{75EB0DC1-F6F1-4971-9434-C71497027C90}" destId="{1B73F951-1DDC-4C3A-833E-8CEC648AEA5A}" srcOrd="0" destOrd="0" presId="urn:microsoft.com/office/officeart/2005/8/layout/chevron2"/>
+    <dgm:cxn modelId="{435378F1-0FE4-40B5-88E1-C03E1F060787}" srcId="{58634E8B-57B7-4D3B-9A79-6256E54BAA31}" destId="{24D5D5BA-462F-4895-BDA8-AA9CCCEED162}" srcOrd="0" destOrd="0" parTransId="{5E0C9BA7-BB12-4B66-8C25-F823EE4AB5FC}" sibTransId="{DB2A7B58-DC59-423D-AF5A-FC9DC24A1C0D}"/>
+    <dgm:cxn modelId="{2A704B99-40CC-4FA8-A39E-69253F8EF8B8}" type="presOf" srcId="{9C6C8DBA-7D03-4464-A799-80BBC2F078C5}" destId="{C01B44A7-DD34-4A5C-9EAE-1FFC3BB31F39}" srcOrd="0" destOrd="0" presId="urn:microsoft.com/office/officeart/2005/8/layout/chevron2"/>
+    <dgm:cxn modelId="{7A62D63B-B7E0-4C88-BBE8-195DA7416C2C}" type="presOf" srcId="{24D5D5BA-462F-4895-BDA8-AA9CCCEED162}" destId="{894A46E6-703C-436E-AA2E-287279148530}" srcOrd="0" destOrd="0" presId="urn:microsoft.com/office/officeart/2005/8/layout/chevron2"/>
     <dgm:cxn modelId="{0CF909F1-31E0-4B3A-B4E5-4F738E0E6B9F}" srcId="{5A28F3F4-5BBD-4E33-A71C-03A2E9049957}" destId="{643278C1-DC07-425B-82AB-F8A204C7EA80}" srcOrd="0" destOrd="0" parTransId="{A86B039E-9C54-4AF4-AC00-16212A5178FC}" sibTransId="{7E77A3FC-5166-468B-9CAB-8B122D71875E}"/>
     <dgm:cxn modelId="{CDEF37A5-8D74-4A7B-A44B-C737D48B8B6A}" type="presOf" srcId="{722D2027-0CFB-467A-9A1D-092AC8524A04}" destId="{F3740BEB-E70D-49FF-9B2A-9F10CEB82215}" srcOrd="0" destOrd="0" presId="urn:microsoft.com/office/officeart/2005/8/layout/chevron2"/>
+    <dgm:cxn modelId="{D3FDA964-5DA9-4816-97A0-8B000EC6312E}" srcId="{D9890230-8E9A-4334-87C3-5C2EF50BBCF6}" destId="{B1389AA1-4F50-41C7-BDAF-28EE93F9478B}" srcOrd="6" destOrd="0" parTransId="{FF279693-2EC6-479A-9836-56C5369036FE}" sibTransId="{1F8D2F55-69A3-456E-88DB-A7D9F9BE991F}"/>
+    <dgm:cxn modelId="{C996E261-68FA-440B-9FA3-BBE3F5240799}" type="presOf" srcId="{9AD6B979-877E-4A34-A507-055B0020E11F}" destId="{4C385E69-E824-47C4-92B7-98C08F4FE795}" srcOrd="0" destOrd="0" presId="urn:microsoft.com/office/officeart/2005/8/layout/chevron2"/>
+    <dgm:cxn modelId="{CD926D03-DEA0-47E5-BA55-5642EBB1B08D}" srcId="{C5BE56B8-E998-4994-AB6D-D53C001808F8}" destId="{74D2B66C-A75A-4853-B4F0-3B1F136FC023}" srcOrd="0" destOrd="0" parTransId="{DCFDEAD7-0C83-4E6E-81E4-56FD471A2C39}" sibTransId="{90C6B325-0417-4364-95EA-7E7253BC9524}"/>
+    <dgm:cxn modelId="{380DAB43-02E1-40C2-B3DB-0BB46CB4F75E}" srcId="{D9890230-8E9A-4334-87C3-5C2EF50BBCF6}" destId="{64606DBA-29EC-4F5E-BF5D-F0B923FB34A7}" srcOrd="4" destOrd="0" parTransId="{2CCDE401-15B0-47B2-AE59-A91899E62292}" sibTransId="{92E86BE7-9308-45CB-852F-28EB8687EA45}"/>
+    <dgm:cxn modelId="{7CC1A55C-2818-4115-84A1-5668C76B8765}" srcId="{1971BCFB-BC82-41E0-A3B5-9EE0E17C8A3F}" destId="{9C6C8DBA-7D03-4464-A799-80BBC2F078C5}" srcOrd="0" destOrd="0" parTransId="{86F55B28-9E1D-4B5F-9D3C-C282E5D11363}" sibTransId="{1B268AEE-24A6-4DEA-BDB0-E14F45D1D7A6}"/>
+    <dgm:cxn modelId="{D3DF5E9D-F114-4FFF-AE0A-41E78EF793E2}" srcId="{D9890230-8E9A-4334-87C3-5C2EF50BBCF6}" destId="{5A28F3F4-5BBD-4E33-A71C-03A2E9049957}" srcOrd="5" destOrd="0" parTransId="{9F02E0A3-378F-4A03-8B0A-C07DA249754D}" sibTransId="{8F9E13FF-BD27-4116-A5DC-BA69EA1C130B}"/>
     <dgm:cxn modelId="{D64AF397-D2E3-4C97-BC01-BBDD1152B581}" type="presOf" srcId="{64606DBA-29EC-4F5E-BF5D-F0B923FB34A7}" destId="{9526EA86-AF28-4CAD-9F0E-9E238425486E}" srcOrd="0" destOrd="0" presId="urn:microsoft.com/office/officeart/2005/8/layout/chevron2"/>
-    <dgm:cxn modelId="{7A62D63B-B7E0-4C88-BBE8-195DA7416C2C}" type="presOf" srcId="{24D5D5BA-462F-4895-BDA8-AA9CCCEED162}" destId="{894A46E6-703C-436E-AA2E-287279148530}" srcOrd="0" destOrd="0" presId="urn:microsoft.com/office/officeart/2005/8/layout/chevron2"/>
-    <dgm:cxn modelId="{42BA7576-72D3-4B5A-AF10-69D6173020CA}" srcId="{D9890230-8E9A-4334-87C3-5C2EF50BBCF6}" destId="{722D2027-0CFB-467A-9A1D-092AC8524A04}" srcOrd="3" destOrd="0" parTransId="{62A45583-139E-4305-9903-B364EF26C82B}" sibTransId="{4ACE2343-D160-4D17-A29F-2230A7356CC3}"/>
-    <dgm:cxn modelId="{435378F1-0FE4-40B5-88E1-C03E1F060787}" srcId="{58634E8B-57B7-4D3B-9A79-6256E54BAA31}" destId="{24D5D5BA-462F-4895-BDA8-AA9CCCEED162}" srcOrd="0" destOrd="0" parTransId="{5E0C9BA7-BB12-4B66-8C25-F823EE4AB5FC}" sibTransId="{DB2A7B58-DC59-423D-AF5A-FC9DC24A1C0D}"/>
+    <dgm:cxn modelId="{2488FE0A-3AE4-46B1-A63A-F3FD5B485C27}" type="presOf" srcId="{75EB0DC1-F6F1-4971-9434-C71497027C90}" destId="{1B73F951-1DDC-4C3A-833E-8CEC648AEA5A}" srcOrd="0" destOrd="0" presId="urn:microsoft.com/office/officeart/2005/8/layout/chevron2"/>
+    <dgm:cxn modelId="{A6C52E3D-1888-49D6-9ADB-E78961BFF016}" srcId="{D9890230-8E9A-4334-87C3-5C2EF50BBCF6}" destId="{C5BE56B8-E998-4994-AB6D-D53C001808F8}" srcOrd="0" destOrd="0" parTransId="{B1CAFAD4-D5B7-48CE-8DA6-3711C6327BEC}" sibTransId="{1600A9A6-8DE6-4F03-B655-65DABE56DCC1}"/>
     <dgm:cxn modelId="{D7FF7317-5A3A-4024-B85A-3C9F62DF9DE9}" type="presOf" srcId="{B1389AA1-4F50-41C7-BDAF-28EE93F9478B}" destId="{9A897EE7-A5B6-43E9-86F9-591C2E9894C4}" srcOrd="0" destOrd="0" presId="urn:microsoft.com/office/officeart/2005/8/layout/chevron2"/>
     <dgm:cxn modelId="{3C069D4A-C254-43B3-8E84-475F5EF6373A}" srcId="{722D2027-0CFB-467A-9A1D-092AC8524A04}" destId="{75EB0DC1-F6F1-4971-9434-C71497027C90}" srcOrd="0" destOrd="0" parTransId="{A93469A3-0557-4AAC-A69F-15378917206F}" sibTransId="{E5E575FE-3CAF-4BDC-9470-E298A92DDB6D}"/>
-    <dgm:cxn modelId="{F07738AC-9611-49B6-9F04-FAD373BF3A1E}" type="presOf" srcId="{C5BE56B8-E998-4994-AB6D-D53C001808F8}" destId="{2AB58C2D-4664-457C-A832-27293074B7DD}" srcOrd="0" destOrd="0" presId="urn:microsoft.com/office/officeart/2005/8/layout/chevron2"/>
+    <dgm:cxn modelId="{B0344854-BE65-4ED4-8D72-4C6FB05E2716}" type="presOf" srcId="{D9890230-8E9A-4334-87C3-5C2EF50BBCF6}" destId="{4FB34F54-3797-4D4F-9F09-182089D5CB8E}" srcOrd="0" destOrd="0" presId="urn:microsoft.com/office/officeart/2005/8/layout/chevron2"/>
+    <dgm:cxn modelId="{97BFF584-264B-4DED-8207-84AE93117B98}" srcId="{D9890230-8E9A-4334-87C3-5C2EF50BBCF6}" destId="{1971BCFB-BC82-41E0-A3B5-9EE0E17C8A3F}" srcOrd="1" destOrd="0" parTransId="{053AEE55-A708-41C3-A6F2-7A8280055493}" sibTransId="{B670B984-43E7-4AA7-88B2-01CA8EC0FC6D}"/>
+    <dgm:cxn modelId="{42BA7576-72D3-4B5A-AF10-69D6173020CA}" srcId="{D9890230-8E9A-4334-87C3-5C2EF50BBCF6}" destId="{722D2027-0CFB-467A-9A1D-092AC8524A04}" srcOrd="3" destOrd="0" parTransId="{62A45583-139E-4305-9903-B364EF26C82B}" sibTransId="{4ACE2343-D160-4D17-A29F-2230A7356CC3}"/>
+    <dgm:cxn modelId="{256D404A-9114-4144-90DE-2E4B0AB410BC}" type="presOf" srcId="{1971BCFB-BC82-41E0-A3B5-9EE0E17C8A3F}" destId="{E3F19936-8B71-4FA3-AD5C-430CF09D137E}" srcOrd="0" destOrd="0" presId="urn:microsoft.com/office/officeart/2005/8/layout/chevron2"/>
     <dgm:cxn modelId="{AA288442-FE9D-4AA8-BB84-34B86912A09A}" type="presOf" srcId="{7366CD37-DA49-4525-AC13-116241659A95}" destId="{68BA67DE-E77A-4C02-A1CE-28F3246103E1}" srcOrd="0" destOrd="0" presId="urn:microsoft.com/office/officeart/2005/8/layout/chevron2"/>
-    <dgm:cxn modelId="{33F7DFA3-6463-48F1-ACA0-013561A41005}" srcId="{D9890230-8E9A-4334-87C3-5C2EF50BBCF6}" destId="{58634E8B-57B7-4D3B-9A79-6256E54BAA31}" srcOrd="2" destOrd="0" parTransId="{CDB4DDCC-151B-4B86-8D18-414BEAD395BF}" sibTransId="{E4710B5A-0B02-4110-9DCC-9A0BAEC84B31}"/>
-    <dgm:cxn modelId="{2A704B99-40CC-4FA8-A39E-69253F8EF8B8}" type="presOf" srcId="{9C6C8DBA-7D03-4464-A799-80BBC2F078C5}" destId="{C01B44A7-DD34-4A5C-9EAE-1FFC3BB31F39}" srcOrd="0" destOrd="0" presId="urn:microsoft.com/office/officeart/2005/8/layout/chevron2"/>
-    <dgm:cxn modelId="{256D404A-9114-4144-90DE-2E4B0AB410BC}" type="presOf" srcId="{1971BCFB-BC82-41E0-A3B5-9EE0E17C8A3F}" destId="{E3F19936-8B71-4FA3-AD5C-430CF09D137E}" srcOrd="0" destOrd="0" presId="urn:microsoft.com/office/officeart/2005/8/layout/chevron2"/>
+    <dgm:cxn modelId="{C73ED5C4-0EB4-4D2B-84F1-5731B03FC4BD}" type="presOf" srcId="{643278C1-DC07-425B-82AB-F8A204C7EA80}" destId="{D904E67A-2D65-4C8F-A661-2173B3B9B2AD}" srcOrd="0" destOrd="0" presId="urn:microsoft.com/office/officeart/2005/8/layout/chevron2"/>
     <dgm:cxn modelId="{F8D8AB19-F7AC-451C-A7C9-B531D0F8DEA3}" type="presOf" srcId="{58634E8B-57B7-4D3B-9A79-6256E54BAA31}" destId="{6F6599AB-DC4B-4490-B40B-40D454984C6F}" srcOrd="0" destOrd="0" presId="urn:microsoft.com/office/officeart/2005/8/layout/chevron2"/>
-    <dgm:cxn modelId="{A6C52E3D-1888-49D6-9ADB-E78961BFF016}" srcId="{D9890230-8E9A-4334-87C3-5C2EF50BBCF6}" destId="{C5BE56B8-E998-4994-AB6D-D53C001808F8}" srcOrd="0" destOrd="0" parTransId="{B1CAFAD4-D5B7-48CE-8DA6-3711C6327BEC}" sibTransId="{1600A9A6-8DE6-4F03-B655-65DABE56DCC1}"/>
-    <dgm:cxn modelId="{97BFF584-264B-4DED-8207-84AE93117B98}" srcId="{D9890230-8E9A-4334-87C3-5C2EF50BBCF6}" destId="{1971BCFB-BC82-41E0-A3B5-9EE0E17C8A3F}" srcOrd="1" destOrd="0" parTransId="{053AEE55-A708-41C3-A6F2-7A8280055493}" sibTransId="{B670B984-43E7-4AA7-88B2-01CA8EC0FC6D}"/>
-    <dgm:cxn modelId="{7CC1A55C-2818-4115-84A1-5668C76B8765}" srcId="{1971BCFB-BC82-41E0-A3B5-9EE0E17C8A3F}" destId="{9C6C8DBA-7D03-4464-A799-80BBC2F078C5}" srcOrd="0" destOrd="0" parTransId="{86F55B28-9E1D-4B5F-9D3C-C282E5D11363}" sibTransId="{1B268AEE-24A6-4DEA-BDB0-E14F45D1D7A6}"/>
-    <dgm:cxn modelId="{8DF4DE35-9281-45E6-84BF-FB23CD261E55}" type="presOf" srcId="{74D2B66C-A75A-4853-B4F0-3B1F136FC023}" destId="{B2D2E7C7-A742-4586-8A0E-2B612AA3D8BB}" srcOrd="0" destOrd="0" presId="urn:microsoft.com/office/officeart/2005/8/layout/chevron2"/>
-    <dgm:cxn modelId="{CD926D03-DEA0-47E5-BA55-5642EBB1B08D}" srcId="{C5BE56B8-E998-4994-AB6D-D53C001808F8}" destId="{74D2B66C-A75A-4853-B4F0-3B1F136FC023}" srcOrd="0" destOrd="0" parTransId="{DCFDEAD7-0C83-4E6E-81E4-56FD471A2C39}" sibTransId="{90C6B325-0417-4364-95EA-7E7253BC9524}"/>
-    <dgm:cxn modelId="{B0344854-BE65-4ED4-8D72-4C6FB05E2716}" type="presOf" srcId="{D9890230-8E9A-4334-87C3-5C2EF50BBCF6}" destId="{4FB34F54-3797-4D4F-9F09-182089D5CB8E}" srcOrd="0" destOrd="0" presId="urn:microsoft.com/office/officeart/2005/8/layout/chevron2"/>
-    <dgm:cxn modelId="{C996E261-68FA-440B-9FA3-BBE3F5240799}" type="presOf" srcId="{9AD6B979-877E-4A34-A507-055B0020E11F}" destId="{4C385E69-E824-47C4-92B7-98C08F4FE795}" srcOrd="0" destOrd="0" presId="urn:microsoft.com/office/officeart/2005/8/layout/chevron2"/>
-    <dgm:cxn modelId="{380DAB43-02E1-40C2-B3DB-0BB46CB4F75E}" srcId="{D9890230-8E9A-4334-87C3-5C2EF50BBCF6}" destId="{64606DBA-29EC-4F5E-BF5D-F0B923FB34A7}" srcOrd="4" destOrd="0" parTransId="{2CCDE401-15B0-47B2-AE59-A91899E62292}" sibTransId="{92E86BE7-9308-45CB-852F-28EB8687EA45}"/>
-    <dgm:cxn modelId="{D3FDA964-5DA9-4816-97A0-8B000EC6312E}" srcId="{D9890230-8E9A-4334-87C3-5C2EF50BBCF6}" destId="{B1389AA1-4F50-41C7-BDAF-28EE93F9478B}" srcOrd="6" destOrd="0" parTransId="{FF279693-2EC6-479A-9836-56C5369036FE}" sibTransId="{1F8D2F55-69A3-456E-88DB-A7D9F9BE991F}"/>
-    <dgm:cxn modelId="{D3DF5E9D-F114-4FFF-AE0A-41E78EF793E2}" srcId="{D9890230-8E9A-4334-87C3-5C2EF50BBCF6}" destId="{5A28F3F4-5BBD-4E33-A71C-03A2E9049957}" srcOrd="5" destOrd="0" parTransId="{9F02E0A3-378F-4A03-8B0A-C07DA249754D}" sibTransId="{8F9E13FF-BD27-4116-A5DC-BA69EA1C130B}"/>
-    <dgm:cxn modelId="{C73ED5C4-0EB4-4D2B-84F1-5731B03FC4BD}" type="presOf" srcId="{643278C1-DC07-425B-82AB-F8A204C7EA80}" destId="{D904E67A-2D65-4C8F-A661-2173B3B9B2AD}" srcOrd="0" destOrd="0" presId="urn:microsoft.com/office/officeart/2005/8/layout/chevron2"/>
-    <dgm:cxn modelId="{77FE077E-B089-4588-817C-88D1CFF8A672}" srcId="{64606DBA-29EC-4F5E-BF5D-F0B923FB34A7}" destId="{7366CD37-DA49-4525-AC13-116241659A95}" srcOrd="0" destOrd="0" parTransId="{5FA333EC-8335-4994-B6AC-1170F3F0DBC5}" sibTransId="{2CF5DE81-BCF7-4D6C-949A-F9DAEE711BA9}"/>
+    <dgm:cxn modelId="{B7A99A54-56A7-4B98-9C3A-F5B0292C9EA1}" srcId="{B1389AA1-4F50-41C7-BDAF-28EE93F9478B}" destId="{9AD6B979-877E-4A34-A507-055B0020E11F}" srcOrd="0" destOrd="0" parTransId="{8B8D9D8E-A442-4608-91C0-A153A022DD46}" sibTransId="{D3EC2C15-D7FE-4E0E-BEBA-D29F178F6494}"/>
     <dgm:cxn modelId="{ED37A523-E22B-421E-AEB7-6C0C24CD3FAD}" type="presParOf" srcId="{4FB34F54-3797-4D4F-9F09-182089D5CB8E}" destId="{9AA67446-3295-418C-B4E3-79172F4DB0EF}" srcOrd="0" destOrd="0" presId="urn:microsoft.com/office/officeart/2005/8/layout/chevron2"/>
     <dgm:cxn modelId="{907C4DE2-63D0-4DBB-B5D3-9F1A78BF9D24}" type="presParOf" srcId="{9AA67446-3295-418C-B4E3-79172F4DB0EF}" destId="{2AB58C2D-4664-457C-A832-27293074B7DD}" srcOrd="0" destOrd="0" presId="urn:microsoft.com/office/officeart/2005/8/layout/chevron2"/>
     <dgm:cxn modelId="{4F86FE7C-6967-4871-BB90-A6D752660D15}" type="presParOf" srcId="{9AA67446-3295-418C-B4E3-79172F4DB0EF}" destId="{B2D2E7C7-A742-4586-8A0E-2B612AA3D8BB}" srcOrd="1" destOrd="0" presId="urn:microsoft.com/office/officeart/2005/8/layout/chevron2"/>
@@ -5734,7 +5751,7 @@
   <dgm:whole/>
   <dgm:extLst>
     <a:ext uri="http://schemas.microsoft.com/office/drawing/2008/diagram">
-      <dsp:dataModelExt xmlns:dsp="http://schemas.microsoft.com/office/drawing/2008/diagram" relId="rId6" minVer="http://schemas.openxmlformats.org/drawingml/2006/diagram"/>
+      <dsp:dataModelExt xmlns:dsp="http://schemas.microsoft.com/office/drawing/2008/diagram" xmlns="" relId="rId6" minVer="http://schemas.openxmlformats.org/drawingml/2006/diagram"/>
     </a:ext>
   </dgm:extLst>
 </dgm:dataModel>
@@ -6336,29 +6353,29 @@
     </dgm:pt>
   </dgm:ptLst>
   <dgm:cxnLst>
-    <dgm:cxn modelId="{FFD4D0E8-219C-4539-9FE3-3734536CC822}" srcId="{19A0D38A-D322-4543-8056-37A10230C398}" destId="{D68D858E-A70D-4F5F-B8D3-CCDF2138FF67}" srcOrd="0" destOrd="0" parTransId="{87B43C5F-C163-40B2-9587-CAF7DAF05A7D}" sibTransId="{19082720-7BAA-44ED-9001-928E3BC28421}"/>
-    <dgm:cxn modelId="{65E720A7-71FF-4190-8458-00B096D539D0}" type="presOf" srcId="{D4E8C719-475A-42A1-ACF1-4A86C52106F1}" destId="{8EE46F37-689A-441A-9015-E03840A8C83D}" srcOrd="0" destOrd="3" presId="urn:microsoft.com/office/officeart/2005/8/layout/hList1"/>
-    <dgm:cxn modelId="{8975EB47-993E-4D6E-B925-665D88AECCD0}" srcId="{80CDF562-CB02-4095-80C5-37211637FC6B}" destId="{25B7A9CC-BD46-4046-A718-75DAD713B985}" srcOrd="0" destOrd="0" parTransId="{2B1E5655-DF46-479A-AA4B-0FF3D2243A09}" sibTransId="{E36E0AC3-85CE-42EF-BE6A-7DD546B85051}"/>
+    <dgm:cxn modelId="{24326729-2C65-48A7-A53B-8394E3692B92}" srcId="{D68D858E-A70D-4F5F-B8D3-CCDF2138FF67}" destId="{D4E8C719-475A-42A1-ACF1-4A86C52106F1}" srcOrd="3" destOrd="0" parTransId="{D75FDC54-DE71-41AE-83E1-023983BB047B}" sibTransId="{306D8A2D-CD48-4C55-B2E1-380740470406}"/>
+    <dgm:cxn modelId="{4856306E-1937-4368-999D-71EDE3823A3F}" srcId="{25B7A9CC-BD46-4046-A718-75DAD713B985}" destId="{F1E0486E-3E8D-42E5-9810-8013F82242C5}" srcOrd="1" destOrd="0" parTransId="{8EA3A75E-FBE6-4808-A7BA-37186343C012}" sibTransId="{03799E0C-E388-4A15-87A9-ABD6ED110D8E}"/>
+    <dgm:cxn modelId="{10B0B0EE-EC5F-481F-B8A6-F733B0317EFA}" type="presOf" srcId="{4CB50070-E22A-4EB0-AA8D-2C76D6970002}" destId="{0CB536DE-E607-493D-A295-103CD6F84F62}" srcOrd="0" destOrd="1" presId="urn:microsoft.com/office/officeart/2005/8/layout/hList1"/>
+    <dgm:cxn modelId="{94393167-6B6B-45E5-9130-9A8FEFD086F7}" type="presOf" srcId="{FF752928-BF9A-4194-BD40-4AAE429EAC2B}" destId="{8EE46F37-689A-441A-9015-E03840A8C83D}" srcOrd="0" destOrd="1" presId="urn:microsoft.com/office/officeart/2005/8/layout/hList1"/>
     <dgm:cxn modelId="{2248B8E4-5AAF-4BC6-8C08-B835260B915E}" type="presOf" srcId="{A31D104B-D7DC-4554-A5EB-FEA804FEFF70}" destId="{0CB536DE-E607-493D-A295-103CD6F84F62}" srcOrd="0" destOrd="4" presId="urn:microsoft.com/office/officeart/2005/8/layout/hList1"/>
-    <dgm:cxn modelId="{24326729-2C65-48A7-A53B-8394E3692B92}" srcId="{D68D858E-A70D-4F5F-B8D3-CCDF2138FF67}" destId="{D4E8C719-475A-42A1-ACF1-4A86C52106F1}" srcOrd="3" destOrd="0" parTransId="{D75FDC54-DE71-41AE-83E1-023983BB047B}" sibTransId="{306D8A2D-CD48-4C55-B2E1-380740470406}"/>
+    <dgm:cxn modelId="{17F9DCDD-298C-4D17-8506-321B95E6B2BF}" srcId="{D68D858E-A70D-4F5F-B8D3-CCDF2138FF67}" destId="{31876832-1730-49A6-A3F2-E9EC8DDDEBCC}" srcOrd="2" destOrd="0" parTransId="{F794BF57-25E1-438E-825C-18F3316EED41}" sibTransId="{B954FE82-63C2-4CB6-A5FD-E9524B001430}"/>
+    <dgm:cxn modelId="{CAC3EA9D-7EEF-4B37-AC32-FFAEE52B4AE3}" type="presOf" srcId="{F1E0486E-3E8D-42E5-9810-8013F82242C5}" destId="{0CB536DE-E607-493D-A295-103CD6F84F62}" srcOrd="0" destOrd="2" presId="urn:microsoft.com/office/officeart/2005/8/layout/hList1"/>
     <dgm:cxn modelId="{EE9E42CE-1171-458A-8630-68C641AB3AF3}" type="presOf" srcId="{19A0D38A-D322-4543-8056-37A10230C398}" destId="{3E479795-9848-42BC-9FB0-86E2ECF12A4F}" srcOrd="0" destOrd="0" presId="urn:microsoft.com/office/officeart/2005/8/layout/hList1"/>
-    <dgm:cxn modelId="{CAC3EA9D-7EEF-4B37-AC32-FFAEE52B4AE3}" type="presOf" srcId="{F1E0486E-3E8D-42E5-9810-8013F82242C5}" destId="{0CB536DE-E607-493D-A295-103CD6F84F62}" srcOrd="0" destOrd="2" presId="urn:microsoft.com/office/officeart/2005/8/layout/hList1"/>
+    <dgm:cxn modelId="{5B661BE3-FF33-463C-B545-5FF889DB71B3}" srcId="{D68D858E-A70D-4F5F-B8D3-CCDF2138FF67}" destId="{FF752928-BF9A-4194-BD40-4AAE429EAC2B}" srcOrd="1" destOrd="0" parTransId="{F2AEF220-A3B5-4FB2-9DEA-AF8238E5C79B}" sibTransId="{ED9F00F9-0670-433C-A5B2-267D16AF0B6D}"/>
+    <dgm:cxn modelId="{BF0DC8DE-3ECD-40A6-BF9A-1B92A86621B4}" type="presOf" srcId="{F398B586-1D5B-42E9-99B3-0C3728ABC7ED}" destId="{0CB536DE-E607-493D-A295-103CD6F84F62}" srcOrd="0" destOrd="3" presId="urn:microsoft.com/office/officeart/2005/8/layout/hList1"/>
     <dgm:cxn modelId="{60630F75-792D-4FAB-8E61-5EFF29705ACB}" srcId="{19A0D38A-D322-4543-8056-37A10230C398}" destId="{80CDF562-CB02-4095-80C5-37211637FC6B}" srcOrd="1" destOrd="0" parTransId="{A3A3CC65-05D0-4556-B1A4-DFD032CB790A}" sibTransId="{C590E4EF-D96A-484D-A987-96CD80DD4B8E}"/>
     <dgm:cxn modelId="{D25BDE3C-B86A-40B9-8D43-844543E72343}" type="presOf" srcId="{31876832-1730-49A6-A3F2-E9EC8DDDEBCC}" destId="{8EE46F37-689A-441A-9015-E03840A8C83D}" srcOrd="0" destOrd="2" presId="urn:microsoft.com/office/officeart/2005/8/layout/hList1"/>
-    <dgm:cxn modelId="{BF0DC8DE-3ECD-40A6-BF9A-1B92A86621B4}" type="presOf" srcId="{F398B586-1D5B-42E9-99B3-0C3728ABC7ED}" destId="{0CB536DE-E607-493D-A295-103CD6F84F62}" srcOrd="0" destOrd="3" presId="urn:microsoft.com/office/officeart/2005/8/layout/hList1"/>
+    <dgm:cxn modelId="{106FE383-37C1-485C-9D3B-B419698E9DA3}" type="presOf" srcId="{25B7A9CC-BD46-4046-A718-75DAD713B985}" destId="{0CB536DE-E607-493D-A295-103CD6F84F62}" srcOrd="0" destOrd="0" presId="urn:microsoft.com/office/officeart/2005/8/layout/hList1"/>
+    <dgm:cxn modelId="{535D9A22-BDB3-45D1-94B2-B592E4C57375}" srcId="{80CDF562-CB02-4095-80C5-37211637FC6B}" destId="{A31D104B-D7DC-4554-A5EB-FEA804FEFF70}" srcOrd="2" destOrd="0" parTransId="{339C9004-914F-4C6C-A7EA-E8894B355F19}" sibTransId="{CCA7B8E2-D026-46DF-859A-65AE749B6422}"/>
     <dgm:cxn modelId="{D290917F-09E2-47FE-8264-F7479E8D4705}" type="presOf" srcId="{D68D858E-A70D-4F5F-B8D3-CCDF2138FF67}" destId="{5C791DC2-0636-4F43-86F7-709972657369}" srcOrd="0" destOrd="0" presId="urn:microsoft.com/office/officeart/2005/8/layout/hList1"/>
+    <dgm:cxn modelId="{65E720A7-71FF-4190-8458-00B096D539D0}" type="presOf" srcId="{D4E8C719-475A-42A1-ACF1-4A86C52106F1}" destId="{8EE46F37-689A-441A-9015-E03840A8C83D}" srcOrd="0" destOrd="3" presId="urn:microsoft.com/office/officeart/2005/8/layout/hList1"/>
+    <dgm:cxn modelId="{CA9596F2-F651-4DA0-83A5-1A0682320A32}" type="presOf" srcId="{80CDF562-CB02-4095-80C5-37211637FC6B}" destId="{B96FD785-8435-4F05-A5D4-902D5A3A8CB2}" srcOrd="0" destOrd="0" presId="urn:microsoft.com/office/officeart/2005/8/layout/hList1"/>
+    <dgm:cxn modelId="{48E57D6D-169D-4A1F-A8F5-C78383B010EE}" srcId="{80CDF562-CB02-4095-80C5-37211637FC6B}" destId="{F398B586-1D5B-42E9-99B3-0C3728ABC7ED}" srcOrd="1" destOrd="0" parTransId="{095EF990-834E-43DC-9244-C43292E530DF}" sibTransId="{779F37B1-5DE1-4B90-88E0-8FA658D4E9FE}"/>
+    <dgm:cxn modelId="{84530E64-DE60-42A9-8384-69F04126F1C9}" srcId="{25B7A9CC-BD46-4046-A718-75DAD713B985}" destId="{4CB50070-E22A-4EB0-AA8D-2C76D6970002}" srcOrd="0" destOrd="0" parTransId="{1849018E-BDF0-4E60-8439-2CCCD2307E04}" sibTransId="{8D112C13-EA6B-4D0F-8486-35F50466C67D}"/>
+    <dgm:cxn modelId="{AFFF602F-65B4-478A-8FE6-493794CF3468}" srcId="{D68D858E-A70D-4F5F-B8D3-CCDF2138FF67}" destId="{7CDC5EF8-6B72-4FB8-B34D-2ECFDFB9BBA6}" srcOrd="0" destOrd="0" parTransId="{FDBAA1E1-6F7D-4BB5-BE8C-CC2DCA0998D1}" sibTransId="{E75FB626-2BBA-4E33-A9FE-1A1114AB5B08}"/>
+    <dgm:cxn modelId="{8975EB47-993E-4D6E-B925-665D88AECCD0}" srcId="{80CDF562-CB02-4095-80C5-37211637FC6B}" destId="{25B7A9CC-BD46-4046-A718-75DAD713B985}" srcOrd="0" destOrd="0" parTransId="{2B1E5655-DF46-479A-AA4B-0FF3D2243A09}" sibTransId="{E36E0AC3-85CE-42EF-BE6A-7DD546B85051}"/>
+    <dgm:cxn modelId="{FFD4D0E8-219C-4539-9FE3-3734536CC822}" srcId="{19A0D38A-D322-4543-8056-37A10230C398}" destId="{D68D858E-A70D-4F5F-B8D3-CCDF2138FF67}" srcOrd="0" destOrd="0" parTransId="{87B43C5F-C163-40B2-9587-CAF7DAF05A7D}" sibTransId="{19082720-7BAA-44ED-9001-928E3BC28421}"/>
     <dgm:cxn modelId="{F19B66F6-9730-41D9-BE16-D6802FB54E41}" type="presOf" srcId="{7CDC5EF8-6B72-4FB8-B34D-2ECFDFB9BBA6}" destId="{8EE46F37-689A-441A-9015-E03840A8C83D}" srcOrd="0" destOrd="0" presId="urn:microsoft.com/office/officeart/2005/8/layout/hList1"/>
-    <dgm:cxn modelId="{5B661BE3-FF33-463C-B545-5FF889DB71B3}" srcId="{D68D858E-A70D-4F5F-B8D3-CCDF2138FF67}" destId="{FF752928-BF9A-4194-BD40-4AAE429EAC2B}" srcOrd="1" destOrd="0" parTransId="{F2AEF220-A3B5-4FB2-9DEA-AF8238E5C79B}" sibTransId="{ED9F00F9-0670-433C-A5B2-267D16AF0B6D}"/>
-    <dgm:cxn modelId="{48E57D6D-169D-4A1F-A8F5-C78383B010EE}" srcId="{80CDF562-CB02-4095-80C5-37211637FC6B}" destId="{F398B586-1D5B-42E9-99B3-0C3728ABC7ED}" srcOrd="1" destOrd="0" parTransId="{095EF990-834E-43DC-9244-C43292E530DF}" sibTransId="{779F37B1-5DE1-4B90-88E0-8FA658D4E9FE}"/>
-    <dgm:cxn modelId="{10B0B0EE-EC5F-481F-B8A6-F733B0317EFA}" type="presOf" srcId="{4CB50070-E22A-4EB0-AA8D-2C76D6970002}" destId="{0CB536DE-E607-493D-A295-103CD6F84F62}" srcOrd="0" destOrd="1" presId="urn:microsoft.com/office/officeart/2005/8/layout/hList1"/>
-    <dgm:cxn modelId="{17F9DCDD-298C-4D17-8506-321B95E6B2BF}" srcId="{D68D858E-A70D-4F5F-B8D3-CCDF2138FF67}" destId="{31876832-1730-49A6-A3F2-E9EC8DDDEBCC}" srcOrd="2" destOrd="0" parTransId="{F794BF57-25E1-438E-825C-18F3316EED41}" sibTransId="{B954FE82-63C2-4CB6-A5FD-E9524B001430}"/>
-    <dgm:cxn modelId="{AFFF602F-65B4-478A-8FE6-493794CF3468}" srcId="{D68D858E-A70D-4F5F-B8D3-CCDF2138FF67}" destId="{7CDC5EF8-6B72-4FB8-B34D-2ECFDFB9BBA6}" srcOrd="0" destOrd="0" parTransId="{FDBAA1E1-6F7D-4BB5-BE8C-CC2DCA0998D1}" sibTransId="{E75FB626-2BBA-4E33-A9FE-1A1114AB5B08}"/>
-    <dgm:cxn modelId="{535D9A22-BDB3-45D1-94B2-B592E4C57375}" srcId="{80CDF562-CB02-4095-80C5-37211637FC6B}" destId="{A31D104B-D7DC-4554-A5EB-FEA804FEFF70}" srcOrd="2" destOrd="0" parTransId="{339C9004-914F-4C6C-A7EA-E8894B355F19}" sibTransId="{CCA7B8E2-D026-46DF-859A-65AE749B6422}"/>
-    <dgm:cxn modelId="{84530E64-DE60-42A9-8384-69F04126F1C9}" srcId="{25B7A9CC-BD46-4046-A718-75DAD713B985}" destId="{4CB50070-E22A-4EB0-AA8D-2C76D6970002}" srcOrd="0" destOrd="0" parTransId="{1849018E-BDF0-4E60-8439-2CCCD2307E04}" sibTransId="{8D112C13-EA6B-4D0F-8486-35F50466C67D}"/>
-    <dgm:cxn modelId="{106FE383-37C1-485C-9D3B-B419698E9DA3}" type="presOf" srcId="{25B7A9CC-BD46-4046-A718-75DAD713B985}" destId="{0CB536DE-E607-493D-A295-103CD6F84F62}" srcOrd="0" destOrd="0" presId="urn:microsoft.com/office/officeart/2005/8/layout/hList1"/>
-    <dgm:cxn modelId="{94393167-6B6B-45E5-9130-9A8FEFD086F7}" type="presOf" srcId="{FF752928-BF9A-4194-BD40-4AAE429EAC2B}" destId="{8EE46F37-689A-441A-9015-E03840A8C83D}" srcOrd="0" destOrd="1" presId="urn:microsoft.com/office/officeart/2005/8/layout/hList1"/>
-    <dgm:cxn modelId="{4856306E-1937-4368-999D-71EDE3823A3F}" srcId="{25B7A9CC-BD46-4046-A718-75DAD713B985}" destId="{F1E0486E-3E8D-42E5-9810-8013F82242C5}" srcOrd="1" destOrd="0" parTransId="{8EA3A75E-FBE6-4808-A7BA-37186343C012}" sibTransId="{03799E0C-E388-4A15-87A9-ABD6ED110D8E}"/>
-    <dgm:cxn modelId="{CA9596F2-F651-4DA0-83A5-1A0682320A32}" type="presOf" srcId="{80CDF562-CB02-4095-80C5-37211637FC6B}" destId="{B96FD785-8435-4F05-A5D4-902D5A3A8CB2}" srcOrd="0" destOrd="0" presId="urn:microsoft.com/office/officeart/2005/8/layout/hList1"/>
     <dgm:cxn modelId="{D0D05784-2BDE-41E9-90EF-43AA4E5FC02F}" type="presParOf" srcId="{3E479795-9848-42BC-9FB0-86E2ECF12A4F}" destId="{DD0029D3-23F6-4284-A52A-7CADDBE0A83E}" srcOrd="0" destOrd="0" presId="urn:microsoft.com/office/officeart/2005/8/layout/hList1"/>
     <dgm:cxn modelId="{51E87F51-0C48-4FF0-9475-DD45E05A3213}" type="presParOf" srcId="{DD0029D3-23F6-4284-A52A-7CADDBE0A83E}" destId="{5C791DC2-0636-4F43-86F7-709972657369}" srcOrd="0" destOrd="0" presId="urn:microsoft.com/office/officeart/2005/8/layout/hList1"/>
     <dgm:cxn modelId="{BF28B892-AF55-43D3-93DB-179BC978990C}" type="presParOf" srcId="{DD0029D3-23F6-4284-A52A-7CADDBE0A83E}" destId="{8EE46F37-689A-441A-9015-E03840A8C83D}" srcOrd="1" destOrd="0" presId="urn:microsoft.com/office/officeart/2005/8/layout/hList1"/>
@@ -6371,7 +6388,7 @@
   <dgm:whole/>
   <dgm:extLst>
     <a:ext uri="http://schemas.microsoft.com/office/drawing/2008/diagram">
-      <dsp:dataModelExt xmlns:dsp="http://schemas.microsoft.com/office/drawing/2008/diagram" relId="rId6" minVer="http://schemas.openxmlformats.org/drawingml/2006/diagram"/>
+      <dsp:dataModelExt xmlns:dsp="http://schemas.microsoft.com/office/drawing/2008/diagram" xmlns="" relId="rId6" minVer="http://schemas.openxmlformats.org/drawingml/2006/diagram"/>
     </a:ext>
   </dgm:extLst>
 </dgm:dataModel>
@@ -6600,15 +6617,15 @@
     </dgm:pt>
   </dgm:ptLst>
   <dgm:cxnLst>
-    <dgm:cxn modelId="{2EF31856-3E8E-4685-962B-B1143C11F583}" type="presOf" srcId="{1111AA11-34CC-48ED-8840-752F66B39C3E}" destId="{4A6CDFC6-B2FF-4EB0-A010-D6084927542B}" srcOrd="0" destOrd="0" presId="urn:microsoft.com/office/officeart/2005/8/layout/hList1"/>
     <dgm:cxn modelId="{918EA669-EFCA-40A2-88AF-BACE7199D46F}" type="presOf" srcId="{48278B33-D05A-4F5D-9870-7951BCA975DA}" destId="{4A6CDFC6-B2FF-4EB0-A010-D6084927542B}" srcOrd="0" destOrd="1" presId="urn:microsoft.com/office/officeart/2005/8/layout/hList1"/>
-    <dgm:cxn modelId="{73D46557-1D34-4E70-B9A4-29B0A3932A06}" srcId="{07B0C82C-E708-4497-86D0-77D31CA73AA2}" destId="{DBC9DFB6-0A48-4293-9BAB-018A4D9C225C}" srcOrd="0" destOrd="0" parTransId="{6DD8E580-DAAB-40E9-AC28-3A30B9B1A0E0}" sibTransId="{A8BEB215-4983-40B0-A1AF-B25F0DE306C3}"/>
-    <dgm:cxn modelId="{93848122-B21E-4D42-ADEF-3A0BA5FF711B}" srcId="{DBC9DFB6-0A48-4293-9BAB-018A4D9C225C}" destId="{70702E96-61C2-4F09-9FA7-834CE4010C6E}" srcOrd="2" destOrd="0" parTransId="{B3924572-F550-40C8-AC55-C09D18BE5997}" sibTransId="{0704DFCA-3DAE-4D5A-A13C-7BD5545D4C49}"/>
+    <dgm:cxn modelId="{12F7CEEE-BF1B-4038-A70F-59946EA5B17B}" srcId="{DBC9DFB6-0A48-4293-9BAB-018A4D9C225C}" destId="{48278B33-D05A-4F5D-9870-7951BCA975DA}" srcOrd="1" destOrd="0" parTransId="{80F69202-EE7E-4FB2-A768-6FC51D4F1890}" sibTransId="{C30BBA77-5AF6-43BE-B15D-6ECDBA6E6851}"/>
     <dgm:cxn modelId="{D48CB60F-3EC3-4331-B4C0-164C27722F2A}" type="presOf" srcId="{07B0C82C-E708-4497-86D0-77D31CA73AA2}" destId="{8B101EAE-75A4-4448-B16C-7C850C190802}" srcOrd="0" destOrd="0" presId="urn:microsoft.com/office/officeart/2005/8/layout/hList1"/>
     <dgm:cxn modelId="{0B0381EA-CE7F-417B-84CD-A39309FC60A5}" type="presOf" srcId="{DBC9DFB6-0A48-4293-9BAB-018A4D9C225C}" destId="{00F3AF14-E21F-4001-998F-7568669D62AF}" srcOrd="0" destOrd="0" presId="urn:microsoft.com/office/officeart/2005/8/layout/hList1"/>
-    <dgm:cxn modelId="{12F7CEEE-BF1B-4038-A70F-59946EA5B17B}" srcId="{DBC9DFB6-0A48-4293-9BAB-018A4D9C225C}" destId="{48278B33-D05A-4F5D-9870-7951BCA975DA}" srcOrd="1" destOrd="0" parTransId="{80F69202-EE7E-4FB2-A768-6FC51D4F1890}" sibTransId="{C30BBA77-5AF6-43BE-B15D-6ECDBA6E6851}"/>
+    <dgm:cxn modelId="{93848122-B21E-4D42-ADEF-3A0BA5FF711B}" srcId="{DBC9DFB6-0A48-4293-9BAB-018A4D9C225C}" destId="{70702E96-61C2-4F09-9FA7-834CE4010C6E}" srcOrd="2" destOrd="0" parTransId="{B3924572-F550-40C8-AC55-C09D18BE5997}" sibTransId="{0704DFCA-3DAE-4D5A-A13C-7BD5545D4C49}"/>
+    <dgm:cxn modelId="{F6C995E1-FC0E-4B93-8A82-58DD136F3CA3}" srcId="{DBC9DFB6-0A48-4293-9BAB-018A4D9C225C}" destId="{1111AA11-34CC-48ED-8840-752F66B39C3E}" srcOrd="0" destOrd="0" parTransId="{0B458925-B362-4E59-A795-CDB8D75C3EE5}" sibTransId="{00F2567C-7F0C-4A10-A7F7-51AF2567A7BE}"/>
     <dgm:cxn modelId="{DF833866-78FE-451D-BC39-F83128DF9125}" type="presOf" srcId="{70702E96-61C2-4F09-9FA7-834CE4010C6E}" destId="{4A6CDFC6-B2FF-4EB0-A010-D6084927542B}" srcOrd="0" destOrd="2" presId="urn:microsoft.com/office/officeart/2005/8/layout/hList1"/>
-    <dgm:cxn modelId="{F6C995E1-FC0E-4B93-8A82-58DD136F3CA3}" srcId="{DBC9DFB6-0A48-4293-9BAB-018A4D9C225C}" destId="{1111AA11-34CC-48ED-8840-752F66B39C3E}" srcOrd="0" destOrd="0" parTransId="{0B458925-B362-4E59-A795-CDB8D75C3EE5}" sibTransId="{00F2567C-7F0C-4A10-A7F7-51AF2567A7BE}"/>
+    <dgm:cxn modelId="{73D46557-1D34-4E70-B9A4-29B0A3932A06}" srcId="{07B0C82C-E708-4497-86D0-77D31CA73AA2}" destId="{DBC9DFB6-0A48-4293-9BAB-018A4D9C225C}" srcOrd="0" destOrd="0" parTransId="{6DD8E580-DAAB-40E9-AC28-3A30B9B1A0E0}" sibTransId="{A8BEB215-4983-40B0-A1AF-B25F0DE306C3}"/>
+    <dgm:cxn modelId="{2EF31856-3E8E-4685-962B-B1143C11F583}" type="presOf" srcId="{1111AA11-34CC-48ED-8840-752F66B39C3E}" destId="{4A6CDFC6-B2FF-4EB0-A010-D6084927542B}" srcOrd="0" destOrd="0" presId="urn:microsoft.com/office/officeart/2005/8/layout/hList1"/>
     <dgm:cxn modelId="{1F5B22E0-6D38-409A-8BD9-B69AD6D8F785}" type="presParOf" srcId="{8B101EAE-75A4-4448-B16C-7C850C190802}" destId="{BE21A1C2-F7E7-4F41-8DB9-589F598DE63D}" srcOrd="0" destOrd="0" presId="urn:microsoft.com/office/officeart/2005/8/layout/hList1"/>
     <dgm:cxn modelId="{B5510696-07CD-404B-9C98-B20DDCDFCA0F}" type="presParOf" srcId="{BE21A1C2-F7E7-4F41-8DB9-589F598DE63D}" destId="{00F3AF14-E21F-4001-998F-7568669D62AF}" srcOrd="0" destOrd="0" presId="urn:microsoft.com/office/officeart/2005/8/layout/hList1"/>
     <dgm:cxn modelId="{92655E56-E2CB-43C2-B8A6-92363716D328}" type="presParOf" srcId="{BE21A1C2-F7E7-4F41-8DB9-589F598DE63D}" destId="{4A6CDFC6-B2FF-4EB0-A010-D6084927542B}" srcOrd="1" destOrd="0" presId="urn:microsoft.com/office/officeart/2005/8/layout/hList1"/>
@@ -6617,7 +6634,7 @@
   <dgm:whole/>
   <dgm:extLst>
     <a:ext uri="http://schemas.microsoft.com/office/drawing/2008/diagram">
-      <dsp:dataModelExt xmlns:dsp="http://schemas.microsoft.com/office/drawing/2008/diagram" relId="rId11" minVer="http://schemas.openxmlformats.org/drawingml/2006/diagram"/>
+      <dsp:dataModelExt xmlns:dsp="http://schemas.microsoft.com/office/drawing/2008/diagram" xmlns="" relId="rId11" minVer="http://schemas.openxmlformats.org/drawingml/2006/diagram"/>
     </a:ext>
   </dgm:extLst>
 </dgm:dataModel>
@@ -7037,23 +7054,23 @@
     </dgm:pt>
   </dgm:ptLst>
   <dgm:cxnLst>
-    <dgm:cxn modelId="{E7CF42FA-BB3C-4FAB-B6BF-F4F1BD42425C}" type="presOf" srcId="{E2F20CE0-64AC-4EA1-A5BD-B33A1DDE623D}" destId="{DF627311-7BB5-4644-A1D9-1C0A4FB64FC2}" srcOrd="0" destOrd="2" presId="urn:microsoft.com/office/officeart/2005/8/layout/hList1"/>
+    <dgm:cxn modelId="{AF564332-FE8F-4448-8B5D-72A9B2E1DD56}" srcId="{B9EEAE60-8FF3-42D7-87B2-F619278CB88D}" destId="{1F9E5AB9-9EEB-47E1-937E-63FAE218055B}" srcOrd="0" destOrd="0" parTransId="{D905576E-9D3E-40F3-B82B-00383626092E}" sibTransId="{9B99A5E1-8409-42FC-8BE5-EA969DC98BA9}"/>
+    <dgm:cxn modelId="{F7CEC14B-8A7A-459D-8E56-B6DF3F4515E3}" type="presOf" srcId="{3558F555-174B-427E-BB44-D93701D9070F}" destId="{CF4C1E38-3F92-44FE-B543-1F75CA0F215C}" srcOrd="0" destOrd="2" presId="urn:microsoft.com/office/officeart/2005/8/layout/hList1"/>
+    <dgm:cxn modelId="{2BCA6E03-DA0D-450F-9DEA-23F9AC235939}" type="presOf" srcId="{5A18CE9A-3EC6-4F16-8AB7-903CB2EF7E2B}" destId="{CF4C1E38-3F92-44FE-B543-1F75CA0F215C}" srcOrd="0" destOrd="1" presId="urn:microsoft.com/office/officeart/2005/8/layout/hList1"/>
+    <dgm:cxn modelId="{44B46A88-54E0-4953-AD1F-E48A9D5B026A}" srcId="{30FA8E27-B4BF-489C-ADAA-9E3BA3685280}" destId="{B9EEAE60-8FF3-42D7-87B2-F619278CB88D}" srcOrd="0" destOrd="0" parTransId="{FEB11886-2549-4FCA-AF0D-C5BA3CB50846}" sibTransId="{AAF94D6B-9E1E-42B4-AA12-4239C9147080}"/>
+    <dgm:cxn modelId="{65CEE3D5-936B-492C-BD35-C6E90A14584A}" srcId="{CC3183F7-EAE9-423C-A735-659AB0E3C263}" destId="{5A18CE9A-3EC6-4F16-8AB7-903CB2EF7E2B}" srcOrd="1" destOrd="0" parTransId="{07BF2383-DD45-4C7A-810D-9FBD4C1D2AEE}" sibTransId="{8B3EC48D-D519-4E04-A230-FE56760AAF47}"/>
+    <dgm:cxn modelId="{818B1762-2119-4086-932C-54395D3C1DAF}" srcId="{30FA8E27-B4BF-489C-ADAA-9E3BA3685280}" destId="{CC3183F7-EAE9-423C-A735-659AB0E3C263}" srcOrd="1" destOrd="0" parTransId="{171FE3F7-B49F-4B19-A671-B15ECA6B5EFB}" sibTransId="{2C0B0E78-3064-4E20-AFC3-2F15AD452465}"/>
     <dgm:cxn modelId="{C121A8F7-A481-4821-84D0-A2EA13F7C327}" srcId="{B9EEAE60-8FF3-42D7-87B2-F619278CB88D}" destId="{11ACFDA5-A530-48C6-AA58-8945B07A7E7C}" srcOrd="1" destOrd="0" parTransId="{32312AE7-345A-494C-A0B2-6F7CD1837F72}" sibTransId="{51F74196-FD36-44C8-A682-254B8F7E4D2A}"/>
-    <dgm:cxn modelId="{818B1762-2119-4086-932C-54395D3C1DAF}" srcId="{30FA8E27-B4BF-489C-ADAA-9E3BA3685280}" destId="{CC3183F7-EAE9-423C-A735-659AB0E3C263}" srcOrd="1" destOrd="0" parTransId="{171FE3F7-B49F-4B19-A671-B15ECA6B5EFB}" sibTransId="{2C0B0E78-3064-4E20-AFC3-2F15AD452465}"/>
-    <dgm:cxn modelId="{B8B69AF3-06FB-40E6-8BAA-D77DF6C8C2CD}" type="presOf" srcId="{6AD28C7C-A8F8-4D9F-BC28-29F7B02885DE}" destId="{CF4C1E38-3F92-44FE-B543-1F75CA0F215C}" srcOrd="0" destOrd="0" presId="urn:microsoft.com/office/officeart/2005/8/layout/hList1"/>
-    <dgm:cxn modelId="{44B46A88-54E0-4953-AD1F-E48A9D5B026A}" srcId="{30FA8E27-B4BF-489C-ADAA-9E3BA3685280}" destId="{B9EEAE60-8FF3-42D7-87B2-F619278CB88D}" srcOrd="0" destOrd="0" parTransId="{FEB11886-2549-4FCA-AF0D-C5BA3CB50846}" sibTransId="{AAF94D6B-9E1E-42B4-AA12-4239C9147080}"/>
+    <dgm:cxn modelId="{617D12FF-A450-4C7B-A42F-5491C64A3C14}" type="presOf" srcId="{30FA8E27-B4BF-489C-ADAA-9E3BA3685280}" destId="{3DEF40A4-D700-47AA-8F78-8BA4DB6534A4}" srcOrd="0" destOrd="0" presId="urn:microsoft.com/office/officeart/2005/8/layout/hList1"/>
+    <dgm:cxn modelId="{81057119-C62A-46B3-AC04-E78F9E6644E9}" srcId="{B9EEAE60-8FF3-42D7-87B2-F619278CB88D}" destId="{E2F20CE0-64AC-4EA1-A5BD-B33A1DDE623D}" srcOrd="2" destOrd="0" parTransId="{03C7B490-167E-43C9-96B4-318D76B472D9}" sibTransId="{42AB27F5-CF74-4032-9A3F-2711058A58DE}"/>
     <dgm:cxn modelId="{34750DCC-C7A2-4DF2-BCD9-A2786E85883C}" type="presOf" srcId="{B9EEAE60-8FF3-42D7-87B2-F619278CB88D}" destId="{AE087654-4E95-4B2F-B173-2F2E01D222FB}" srcOrd="0" destOrd="0" presId="urn:microsoft.com/office/officeart/2005/8/layout/hList1"/>
     <dgm:cxn modelId="{F9751F63-42BA-42B3-B7E6-3E6157397AEA}" type="presOf" srcId="{11ACFDA5-A530-48C6-AA58-8945B07A7E7C}" destId="{DF627311-7BB5-4644-A1D9-1C0A4FB64FC2}" srcOrd="0" destOrd="1" presId="urn:microsoft.com/office/officeart/2005/8/layout/hList1"/>
-    <dgm:cxn modelId="{AF564332-FE8F-4448-8B5D-72A9B2E1DD56}" srcId="{B9EEAE60-8FF3-42D7-87B2-F619278CB88D}" destId="{1F9E5AB9-9EEB-47E1-937E-63FAE218055B}" srcOrd="0" destOrd="0" parTransId="{D905576E-9D3E-40F3-B82B-00383626092E}" sibTransId="{9B99A5E1-8409-42FC-8BE5-EA969DC98BA9}"/>
+    <dgm:cxn modelId="{462141CC-70CB-457C-AC1C-E6FDAE0AC95B}" type="presOf" srcId="{1F9E5AB9-9EEB-47E1-937E-63FAE218055B}" destId="{DF627311-7BB5-4644-A1D9-1C0A4FB64FC2}" srcOrd="0" destOrd="0" presId="urn:microsoft.com/office/officeart/2005/8/layout/hList1"/>
+    <dgm:cxn modelId="{3499481B-E67A-49C1-B32B-7902F987EFCD}" type="presOf" srcId="{CC3183F7-EAE9-423C-A735-659AB0E3C263}" destId="{D1A7D8D4-B177-40C0-B4CB-8A066EF22632}" srcOrd="0" destOrd="0" presId="urn:microsoft.com/office/officeart/2005/8/layout/hList1"/>
     <dgm:cxn modelId="{BC47F6B9-454F-41CA-9D17-9EB32E5D7FA0}" srcId="{CC3183F7-EAE9-423C-A735-659AB0E3C263}" destId="{6AD28C7C-A8F8-4D9F-BC28-29F7B02885DE}" srcOrd="0" destOrd="0" parTransId="{1B7440A6-28DA-426F-BF3C-6031DCB31B40}" sibTransId="{50A87265-0C32-41FD-95B8-75A19CE5F88A}"/>
+    <dgm:cxn modelId="{E7CF42FA-BB3C-4FAB-B6BF-F4F1BD42425C}" type="presOf" srcId="{E2F20CE0-64AC-4EA1-A5BD-B33A1DDE623D}" destId="{DF627311-7BB5-4644-A1D9-1C0A4FB64FC2}" srcOrd="0" destOrd="2" presId="urn:microsoft.com/office/officeart/2005/8/layout/hList1"/>
     <dgm:cxn modelId="{C9400FF6-BD8D-4633-8C27-33574FDA01A9}" srcId="{CC3183F7-EAE9-423C-A735-659AB0E3C263}" destId="{3558F555-174B-427E-BB44-D93701D9070F}" srcOrd="2" destOrd="0" parTransId="{57668F5B-3677-40F8-BAC4-15FDA81815E9}" sibTransId="{6A4E6077-31D0-45D4-9C0F-19CAF8586269}"/>
-    <dgm:cxn modelId="{617D12FF-A450-4C7B-A42F-5491C64A3C14}" type="presOf" srcId="{30FA8E27-B4BF-489C-ADAA-9E3BA3685280}" destId="{3DEF40A4-D700-47AA-8F78-8BA4DB6534A4}" srcOrd="0" destOrd="0" presId="urn:microsoft.com/office/officeart/2005/8/layout/hList1"/>
-    <dgm:cxn modelId="{2BCA6E03-DA0D-450F-9DEA-23F9AC235939}" type="presOf" srcId="{5A18CE9A-3EC6-4F16-8AB7-903CB2EF7E2B}" destId="{CF4C1E38-3F92-44FE-B543-1F75CA0F215C}" srcOrd="0" destOrd="1" presId="urn:microsoft.com/office/officeart/2005/8/layout/hList1"/>
-    <dgm:cxn modelId="{65CEE3D5-936B-492C-BD35-C6E90A14584A}" srcId="{CC3183F7-EAE9-423C-A735-659AB0E3C263}" destId="{5A18CE9A-3EC6-4F16-8AB7-903CB2EF7E2B}" srcOrd="1" destOrd="0" parTransId="{07BF2383-DD45-4C7A-810D-9FBD4C1D2AEE}" sibTransId="{8B3EC48D-D519-4E04-A230-FE56760AAF47}"/>
-    <dgm:cxn modelId="{462141CC-70CB-457C-AC1C-E6FDAE0AC95B}" type="presOf" srcId="{1F9E5AB9-9EEB-47E1-937E-63FAE218055B}" destId="{DF627311-7BB5-4644-A1D9-1C0A4FB64FC2}" srcOrd="0" destOrd="0" presId="urn:microsoft.com/office/officeart/2005/8/layout/hList1"/>
-    <dgm:cxn modelId="{81057119-C62A-46B3-AC04-E78F9E6644E9}" srcId="{B9EEAE60-8FF3-42D7-87B2-F619278CB88D}" destId="{E2F20CE0-64AC-4EA1-A5BD-B33A1DDE623D}" srcOrd="2" destOrd="0" parTransId="{03C7B490-167E-43C9-96B4-318D76B472D9}" sibTransId="{42AB27F5-CF74-4032-9A3F-2711058A58DE}"/>
-    <dgm:cxn modelId="{3499481B-E67A-49C1-B32B-7902F987EFCD}" type="presOf" srcId="{CC3183F7-EAE9-423C-A735-659AB0E3C263}" destId="{D1A7D8D4-B177-40C0-B4CB-8A066EF22632}" srcOrd="0" destOrd="0" presId="urn:microsoft.com/office/officeart/2005/8/layout/hList1"/>
-    <dgm:cxn modelId="{F7CEC14B-8A7A-459D-8E56-B6DF3F4515E3}" type="presOf" srcId="{3558F555-174B-427E-BB44-D93701D9070F}" destId="{CF4C1E38-3F92-44FE-B543-1F75CA0F215C}" srcOrd="0" destOrd="2" presId="urn:microsoft.com/office/officeart/2005/8/layout/hList1"/>
+    <dgm:cxn modelId="{B8B69AF3-06FB-40E6-8BAA-D77DF6C8C2CD}" type="presOf" srcId="{6AD28C7C-A8F8-4D9F-BC28-29F7B02885DE}" destId="{CF4C1E38-3F92-44FE-B543-1F75CA0F215C}" srcOrd="0" destOrd="0" presId="urn:microsoft.com/office/officeart/2005/8/layout/hList1"/>
     <dgm:cxn modelId="{B9645378-0FAE-4883-8FB5-729B3DEE045A}" type="presParOf" srcId="{3DEF40A4-D700-47AA-8F78-8BA4DB6534A4}" destId="{15D377C7-C2A3-4021-A839-562CC2BBB53D}" srcOrd="0" destOrd="0" presId="urn:microsoft.com/office/officeart/2005/8/layout/hList1"/>
     <dgm:cxn modelId="{BCE0FF54-608F-452B-8F65-9A82E0F8A0E2}" type="presParOf" srcId="{15D377C7-C2A3-4021-A839-562CC2BBB53D}" destId="{AE087654-4E95-4B2F-B173-2F2E01D222FB}" srcOrd="0" destOrd="0" presId="urn:microsoft.com/office/officeart/2005/8/layout/hList1"/>
     <dgm:cxn modelId="{829120B6-B4B0-4CEF-864B-F5EEFD956107}" type="presParOf" srcId="{15D377C7-C2A3-4021-A839-562CC2BBB53D}" destId="{DF627311-7BB5-4644-A1D9-1C0A4FB64FC2}" srcOrd="1" destOrd="0" presId="urn:microsoft.com/office/officeart/2005/8/layout/hList1"/>
@@ -7066,7 +7083,7 @@
   <dgm:whole/>
   <dgm:extLst>
     <a:ext uri="http://schemas.microsoft.com/office/drawing/2008/diagram">
-      <dsp:dataModelExt xmlns:dsp="http://schemas.microsoft.com/office/drawing/2008/diagram" relId="rId6" minVer="http://schemas.openxmlformats.org/drawingml/2006/diagram"/>
+      <dsp:dataModelExt xmlns:dsp="http://schemas.microsoft.com/office/drawing/2008/diagram" xmlns="" relId="rId6" minVer="http://schemas.openxmlformats.org/drawingml/2006/diagram"/>
     </a:ext>
   </dgm:extLst>
 </dgm:dataModel>
@@ -7437,23 +7454,23 @@
     </dgm:pt>
   </dgm:ptLst>
   <dgm:cxnLst>
+    <dgm:cxn modelId="{83A8BB8C-EABE-4DB1-9657-440A133AE863}" type="presOf" srcId="{C8AACE13-EED9-4461-BB24-A9522E159F80}" destId="{6B69AF66-EE4C-44E1-8D21-A24430D0F9F9}" srcOrd="0" destOrd="0" presId="urn:microsoft.com/office/officeart/2005/8/layout/hList1"/>
+    <dgm:cxn modelId="{807E7CD5-17D9-4B19-8BE3-037B624475C9}" srcId="{C8AACE13-EED9-4461-BB24-A9522E159F80}" destId="{F363AC0A-B89C-417D-BCCF-BD11A5A3DFC7}" srcOrd="2" destOrd="0" parTransId="{BD0A6C26-4F0B-4EEA-A3F4-1D139311FAC5}" sibTransId="{0A3EADAC-1D0E-4435-9F1A-8E95945E0EAC}"/>
+    <dgm:cxn modelId="{586B4121-AAD1-4B3F-9DD6-D6785D81ADCA}" srcId="{C8AACE13-EED9-4461-BB24-A9522E159F80}" destId="{C3F22C2F-A06D-40C1-85D8-9019421B9C46}" srcOrd="1" destOrd="0" parTransId="{AE827B19-75E2-4ECC-B9D5-7802B0AF1723}" sibTransId="{22FF370C-09CA-46AB-96BF-0F36F460BAB4}"/>
+    <dgm:cxn modelId="{8F360327-42AC-48F4-ADF4-C8B27813D7E8}" srcId="{2B759378-08E5-4C9A-9F56-A5E134720413}" destId="{AB107BE2-32B0-468D-96A3-6944CD40F2DF}" srcOrd="0" destOrd="0" parTransId="{A94CAA56-3620-4E41-8047-4D5B07EE99D3}" sibTransId="{EB5AE23D-6310-41C4-8CA1-49576AF208D6}"/>
+    <dgm:cxn modelId="{97DD3802-411A-4F80-B331-6F28C768F5E8}" type="presOf" srcId="{2B759378-08E5-4C9A-9F56-A5E134720413}" destId="{625747C0-5010-4937-A3EC-BF3002D070F8}" srcOrd="0" destOrd="0" presId="urn:microsoft.com/office/officeart/2005/8/layout/hList1"/>
+    <dgm:cxn modelId="{01F34D9D-71BE-4DC4-9D55-D4B164E35EA9}" srcId="{72D796F3-40C7-46F7-BB83-7B73DF1BF9AE}" destId="{FDED7243-A4AE-4835-A941-5B69D3C56881}" srcOrd="0" destOrd="0" parTransId="{BF79089D-B272-4BAD-BD94-52B69E12BED5}" sibTransId="{3ACAD70F-26A1-4C33-8928-3182B91DDE1D}"/>
+    <dgm:cxn modelId="{241A36B2-768E-466B-B296-FEE71CD7811D}" type="presOf" srcId="{AB107BE2-32B0-468D-96A3-6944CD40F2DF}" destId="{1110A0BE-D284-440B-9275-42463CFC7AB3}" srcOrd="0" destOrd="0" presId="urn:microsoft.com/office/officeart/2005/8/layout/hList1"/>
+    <dgm:cxn modelId="{50C9B90D-45F2-42F3-A259-DD692F306624}" type="presOf" srcId="{F363AC0A-B89C-417D-BCCF-BD11A5A3DFC7}" destId="{6B69AF66-EE4C-44E1-8D21-A24430D0F9F9}" srcOrd="0" destOrd="3" presId="urn:microsoft.com/office/officeart/2005/8/layout/hList1"/>
+    <dgm:cxn modelId="{64B4B69A-B222-476F-8C32-4B35F36E3D1D}" srcId="{72D796F3-40C7-46F7-BB83-7B73DF1BF9AE}" destId="{2A2B95D2-B5FE-477E-A38F-DB149F1FD7BE}" srcOrd="1" destOrd="0" parTransId="{F6AA0E89-5C54-4661-9110-12A71600AF99}" sibTransId="{BB03AA5B-EDE4-4AC8-A2C5-099F3C25C83B}"/>
     <dgm:cxn modelId="{1849595D-EEBA-4E6A-B720-A444A6C9B238}" type="presOf" srcId="{0F793B99-E1C8-42F9-AA64-98DC449D1BA9}" destId="{6B69AF66-EE4C-44E1-8D21-A24430D0F9F9}" srcOrd="0" destOrd="1" presId="urn:microsoft.com/office/officeart/2005/8/layout/hList1"/>
-    <dgm:cxn modelId="{97DD3802-411A-4F80-B331-6F28C768F5E8}" type="presOf" srcId="{2B759378-08E5-4C9A-9F56-A5E134720413}" destId="{625747C0-5010-4937-A3EC-BF3002D070F8}" srcOrd="0" destOrd="0" presId="urn:microsoft.com/office/officeart/2005/8/layout/hList1"/>
     <dgm:cxn modelId="{4F77BA2B-4068-4023-A29F-6655C1BDB482}" srcId="{AB107BE2-32B0-468D-96A3-6944CD40F2DF}" destId="{C8AACE13-EED9-4461-BB24-A9522E159F80}" srcOrd="0" destOrd="0" parTransId="{B5CA10A4-B96E-4621-AE52-447940791333}" sibTransId="{436313A2-239D-4E70-ABC4-9EE554FFC7F9}"/>
-    <dgm:cxn modelId="{01F34D9D-71BE-4DC4-9D55-D4B164E35EA9}" srcId="{72D796F3-40C7-46F7-BB83-7B73DF1BF9AE}" destId="{FDED7243-A4AE-4835-A941-5B69D3C56881}" srcOrd="0" destOrd="0" parTransId="{BF79089D-B272-4BAD-BD94-52B69E12BED5}" sibTransId="{3ACAD70F-26A1-4C33-8928-3182B91DDE1D}"/>
+    <dgm:cxn modelId="{EC7794DD-AA75-4174-83B3-AC32E6FC09DC}" type="presOf" srcId="{C3F22C2F-A06D-40C1-85D8-9019421B9C46}" destId="{6B69AF66-EE4C-44E1-8D21-A24430D0F9F9}" srcOrd="0" destOrd="2" presId="urn:microsoft.com/office/officeart/2005/8/layout/hList1"/>
+    <dgm:cxn modelId="{BD688B42-8224-4ADE-9766-76F237841349}" srcId="{AB107BE2-32B0-468D-96A3-6944CD40F2DF}" destId="{72D796F3-40C7-46F7-BB83-7B73DF1BF9AE}" srcOrd="1" destOrd="0" parTransId="{2A55E112-A8BD-4775-8CCB-7DF767B07ADE}" sibTransId="{5219E7D1-DE52-401F-AF50-B4E89D8063BF}"/>
+    <dgm:cxn modelId="{477244F8-E341-4AFF-8C26-0E6D68F55DB7}" srcId="{C8AACE13-EED9-4461-BB24-A9522E159F80}" destId="{0F793B99-E1C8-42F9-AA64-98DC449D1BA9}" srcOrd="0" destOrd="0" parTransId="{C7AEA404-F322-424B-BF15-B3E699CB3315}" sibTransId="{BC329EEE-1144-429D-8C6A-148A60E28A77}"/>
     <dgm:cxn modelId="{74CD6B68-4402-4227-B670-3230005CB15F}" type="presOf" srcId="{2A2B95D2-B5FE-477E-A38F-DB149F1FD7BE}" destId="{6B69AF66-EE4C-44E1-8D21-A24430D0F9F9}" srcOrd="0" destOrd="6" presId="urn:microsoft.com/office/officeart/2005/8/layout/hList1"/>
-    <dgm:cxn modelId="{64B4B69A-B222-476F-8C32-4B35F36E3D1D}" srcId="{72D796F3-40C7-46F7-BB83-7B73DF1BF9AE}" destId="{2A2B95D2-B5FE-477E-A38F-DB149F1FD7BE}" srcOrd="1" destOrd="0" parTransId="{F6AA0E89-5C54-4661-9110-12A71600AF99}" sibTransId="{BB03AA5B-EDE4-4AC8-A2C5-099F3C25C83B}"/>
-    <dgm:cxn modelId="{50C9B90D-45F2-42F3-A259-DD692F306624}" type="presOf" srcId="{F363AC0A-B89C-417D-BCCF-BD11A5A3DFC7}" destId="{6B69AF66-EE4C-44E1-8D21-A24430D0F9F9}" srcOrd="0" destOrd="3" presId="urn:microsoft.com/office/officeart/2005/8/layout/hList1"/>
-    <dgm:cxn modelId="{586B4121-AAD1-4B3F-9DD6-D6785D81ADCA}" srcId="{C8AACE13-EED9-4461-BB24-A9522E159F80}" destId="{C3F22C2F-A06D-40C1-85D8-9019421B9C46}" srcOrd="1" destOrd="0" parTransId="{AE827B19-75E2-4ECC-B9D5-7802B0AF1723}" sibTransId="{22FF370C-09CA-46AB-96BF-0F36F460BAB4}"/>
-    <dgm:cxn modelId="{241A36B2-768E-466B-B296-FEE71CD7811D}" type="presOf" srcId="{AB107BE2-32B0-468D-96A3-6944CD40F2DF}" destId="{1110A0BE-D284-440B-9275-42463CFC7AB3}" srcOrd="0" destOrd="0" presId="urn:microsoft.com/office/officeart/2005/8/layout/hList1"/>
-    <dgm:cxn modelId="{477244F8-E341-4AFF-8C26-0E6D68F55DB7}" srcId="{C8AACE13-EED9-4461-BB24-A9522E159F80}" destId="{0F793B99-E1C8-42F9-AA64-98DC449D1BA9}" srcOrd="0" destOrd="0" parTransId="{C7AEA404-F322-424B-BF15-B3E699CB3315}" sibTransId="{BC329EEE-1144-429D-8C6A-148A60E28A77}"/>
     <dgm:cxn modelId="{ECDC47C5-1CA8-42ED-9177-7137D7C77D01}" type="presOf" srcId="{FDED7243-A4AE-4835-A941-5B69D3C56881}" destId="{6B69AF66-EE4C-44E1-8D21-A24430D0F9F9}" srcOrd="0" destOrd="5" presId="urn:microsoft.com/office/officeart/2005/8/layout/hList1"/>
-    <dgm:cxn modelId="{83A8BB8C-EABE-4DB1-9657-440A133AE863}" type="presOf" srcId="{C8AACE13-EED9-4461-BB24-A9522E159F80}" destId="{6B69AF66-EE4C-44E1-8D21-A24430D0F9F9}" srcOrd="0" destOrd="0" presId="urn:microsoft.com/office/officeart/2005/8/layout/hList1"/>
-    <dgm:cxn modelId="{EC7794DD-AA75-4174-83B3-AC32E6FC09DC}" type="presOf" srcId="{C3F22C2F-A06D-40C1-85D8-9019421B9C46}" destId="{6B69AF66-EE4C-44E1-8D21-A24430D0F9F9}" srcOrd="0" destOrd="2" presId="urn:microsoft.com/office/officeart/2005/8/layout/hList1"/>
     <dgm:cxn modelId="{F817CF9D-383B-40B4-A856-B3B38F2936F4}" type="presOf" srcId="{72D796F3-40C7-46F7-BB83-7B73DF1BF9AE}" destId="{6B69AF66-EE4C-44E1-8D21-A24430D0F9F9}" srcOrd="0" destOrd="4" presId="urn:microsoft.com/office/officeart/2005/8/layout/hList1"/>
-    <dgm:cxn modelId="{8F360327-42AC-48F4-ADF4-C8B27813D7E8}" srcId="{2B759378-08E5-4C9A-9F56-A5E134720413}" destId="{AB107BE2-32B0-468D-96A3-6944CD40F2DF}" srcOrd="0" destOrd="0" parTransId="{A94CAA56-3620-4E41-8047-4D5B07EE99D3}" sibTransId="{EB5AE23D-6310-41C4-8CA1-49576AF208D6}"/>
-    <dgm:cxn modelId="{807E7CD5-17D9-4B19-8BE3-037B624475C9}" srcId="{C8AACE13-EED9-4461-BB24-A9522E159F80}" destId="{F363AC0A-B89C-417D-BCCF-BD11A5A3DFC7}" srcOrd="2" destOrd="0" parTransId="{BD0A6C26-4F0B-4EEA-A3F4-1D139311FAC5}" sibTransId="{0A3EADAC-1D0E-4435-9F1A-8E95945E0EAC}"/>
-    <dgm:cxn modelId="{BD688B42-8224-4ADE-9766-76F237841349}" srcId="{AB107BE2-32B0-468D-96A3-6944CD40F2DF}" destId="{72D796F3-40C7-46F7-BB83-7B73DF1BF9AE}" srcOrd="1" destOrd="0" parTransId="{2A55E112-A8BD-4775-8CCB-7DF767B07ADE}" sibTransId="{5219E7D1-DE52-401F-AF50-B4E89D8063BF}"/>
     <dgm:cxn modelId="{B363181D-65FB-41C4-85C6-F33D111E6DBA}" type="presParOf" srcId="{625747C0-5010-4937-A3EC-BF3002D070F8}" destId="{3A6EA6F3-6EE5-4A33-9842-BD3C50A2568E}" srcOrd="0" destOrd="0" presId="urn:microsoft.com/office/officeart/2005/8/layout/hList1"/>
     <dgm:cxn modelId="{9002401B-4E07-410C-85E8-A63015C6DB92}" type="presParOf" srcId="{3A6EA6F3-6EE5-4A33-9842-BD3C50A2568E}" destId="{1110A0BE-D284-440B-9275-42463CFC7AB3}" srcOrd="0" destOrd="0" presId="urn:microsoft.com/office/officeart/2005/8/layout/hList1"/>
     <dgm:cxn modelId="{14D3098F-1203-4947-A82E-2BA9E2024154}" type="presParOf" srcId="{3A6EA6F3-6EE5-4A33-9842-BD3C50A2568E}" destId="{6B69AF66-EE4C-44E1-8D21-A24430D0F9F9}" srcOrd="1" destOrd="0" presId="urn:microsoft.com/office/officeart/2005/8/layout/hList1"/>
@@ -7462,7 +7479,7 @@
   <dgm:whole/>
   <dgm:extLst>
     <a:ext uri="http://schemas.microsoft.com/office/drawing/2008/diagram">
-      <dsp:dataModelExt xmlns:dsp="http://schemas.microsoft.com/office/drawing/2008/diagram" relId="rId11" minVer="http://schemas.openxmlformats.org/drawingml/2006/diagram"/>
+      <dsp:dataModelExt xmlns:dsp="http://schemas.microsoft.com/office/drawing/2008/diagram" xmlns="" relId="rId11" minVer="http://schemas.openxmlformats.org/drawingml/2006/diagram"/>
     </a:ext>
   </dgm:extLst>
 </dgm:dataModel>
@@ -8080,29 +8097,29 @@
     </dgm:pt>
   </dgm:ptLst>
   <dgm:cxnLst>
+    <dgm:cxn modelId="{7F40274B-30E0-494D-9827-EA7C33A177B8}" type="presOf" srcId="{7BC84EE2-D899-4737-846F-70CEFD3F0A80}" destId="{0026F19E-B0D6-4A6C-943D-6B47E28D1EB3}" srcOrd="0" destOrd="1" presId="urn:microsoft.com/office/officeart/2005/8/layout/vList2"/>
+    <dgm:cxn modelId="{2EF723FA-35A5-4A36-AA82-F85923C6C219}" srcId="{982F42A4-24B3-43B0-924C-E3BD6C6E7869}" destId="{0CD6A03F-3B8C-4E37-8F45-E4088F458603}" srcOrd="0" destOrd="0" parTransId="{F4F3DE81-8BBA-43AA-8893-25C933ABCF2B}" sibTransId="{DEEC573A-35CB-47F8-A195-4290F9C304BF}"/>
+    <dgm:cxn modelId="{7567A02E-E749-41B2-910E-5B9B8E59D552}" type="presOf" srcId="{894C4D23-E2A3-4C3C-8200-250DFF2CEBC2}" destId="{72E39A59-1424-4875-95B4-DB0D91C56F8A}" srcOrd="0" destOrd="0" presId="urn:microsoft.com/office/officeart/2005/8/layout/vList2"/>
+    <dgm:cxn modelId="{CE71340F-CACC-4465-997D-40864843B2D5}" type="presOf" srcId="{F9B87A83-2C55-4A68-BF23-0B4E66A54FEE}" destId="{45E1BD41-C25F-49BE-856B-DA67C6CE395A}" srcOrd="0" destOrd="0" presId="urn:microsoft.com/office/officeart/2005/8/layout/vList2"/>
+    <dgm:cxn modelId="{0B2DFE80-50AD-46FE-AEC0-8A8E99B0431A}" srcId="{79F8C1F8-E525-4802-B41A-D8056BCD388B}" destId="{DB4FD1C8-5282-464E-BEC4-8D5D1F6C2E31}" srcOrd="0" destOrd="0" parTransId="{78C2B223-B1D8-4A59-B19F-22727DC8B7B0}" sibTransId="{F376F185-7BC2-4F26-B755-7A193D731EC5}"/>
     <dgm:cxn modelId="{701AEC3D-FBF4-4EE8-B8D5-1949B2ACB73C}" srcId="{041761A3-2EBA-4115-8F78-DD18E208EEFC}" destId="{1153731D-F020-47E9-888D-4B9606387D15}" srcOrd="1" destOrd="0" parTransId="{098B61E8-58AD-45EB-8DA9-AE82FB03BBDD}" sibTransId="{387A88B6-651A-458F-8BAD-6670A19871E5}"/>
+    <dgm:cxn modelId="{BBF6D1D8-EE69-46C8-9EE3-5B79FEC09C69}" srcId="{894C4D23-E2A3-4C3C-8200-250DFF2CEBC2}" destId="{982F42A4-24B3-43B0-924C-E3BD6C6E7869}" srcOrd="0" destOrd="0" parTransId="{4A0C779E-C794-42F1-867E-98533D014499}" sibTransId="{EC3F88CE-0B71-44AD-970F-7281AF473D6A}"/>
+    <dgm:cxn modelId="{127E4503-40FD-43C4-BF51-BE55541ED645}" srcId="{894C4D23-E2A3-4C3C-8200-250DFF2CEBC2}" destId="{79F8C1F8-E525-4802-B41A-D8056BCD388B}" srcOrd="1" destOrd="0" parTransId="{246050A3-48A2-4E6C-B174-7B39C3EDFE00}" sibTransId="{714FAC92-397D-494C-990B-44BEAB00FD31}"/>
+    <dgm:cxn modelId="{656BC70D-250F-4715-A192-15D43510E8A9}" type="presOf" srcId="{19319D74-6F59-4022-B515-A0C6AC300208}" destId="{721482F0-D801-4B67-A207-5B0B3EC5FF1E}" srcOrd="0" destOrd="2" presId="urn:microsoft.com/office/officeart/2005/8/layout/vList2"/>
+    <dgm:cxn modelId="{B5E31A19-56E0-41A6-91A7-E8F0BAB5E24B}" srcId="{041761A3-2EBA-4115-8F78-DD18E208EEFC}" destId="{F9B87A83-2C55-4A68-BF23-0B4E66A54FEE}" srcOrd="0" destOrd="0" parTransId="{225A27F9-4F70-48FE-B965-F73A3BFA0EF0}" sibTransId="{993DE258-A0F6-4B2F-81A9-597680B0B75E}"/>
+    <dgm:cxn modelId="{94BD955A-B0E8-4396-9608-485EBD4D13BC}" srcId="{982F42A4-24B3-43B0-924C-E3BD6C6E7869}" destId="{7BC84EE2-D899-4737-846F-70CEFD3F0A80}" srcOrd="1" destOrd="0" parTransId="{FFF5CD9F-FCBC-4156-9815-74245532A97D}" sibTransId="{CAF6AE16-5DE2-4418-87F1-A01177297F50}"/>
+    <dgm:cxn modelId="{61F21DAB-E7F5-40A8-9228-CE9B1B9FB4A4}" srcId="{982F42A4-24B3-43B0-924C-E3BD6C6E7869}" destId="{0A816BFB-FA68-44D5-8F1B-809D2980EB63}" srcOrd="2" destOrd="0" parTransId="{44428571-75A1-486A-93C2-29F9E32E58BD}" sibTransId="{43B9A2EE-15F0-41DE-B978-C292E15CE1D9}"/>
+    <dgm:cxn modelId="{2A7BE505-B0F0-4498-A6EF-6E47BF8A30F7}" srcId="{894C4D23-E2A3-4C3C-8200-250DFF2CEBC2}" destId="{041761A3-2EBA-4115-8F78-DD18E208EEFC}" srcOrd="2" destOrd="0" parTransId="{35B12439-5D6B-42BF-8E5B-1F7F63782690}" sibTransId="{E34C8A04-4363-4ED9-AB21-C2BABC5A6472}"/>
     <dgm:cxn modelId="{64FD802E-BF1A-4EE3-BDA5-1999420A5289}" type="presOf" srcId="{0CD6A03F-3B8C-4E37-8F45-E4088F458603}" destId="{0026F19E-B0D6-4A6C-943D-6B47E28D1EB3}" srcOrd="0" destOrd="0" presId="urn:microsoft.com/office/officeart/2005/8/layout/vList2"/>
-    <dgm:cxn modelId="{2A7BE505-B0F0-4498-A6EF-6E47BF8A30F7}" srcId="{894C4D23-E2A3-4C3C-8200-250DFF2CEBC2}" destId="{041761A3-2EBA-4115-8F78-DD18E208EEFC}" srcOrd="2" destOrd="0" parTransId="{35B12439-5D6B-42BF-8E5B-1F7F63782690}" sibTransId="{E34C8A04-4363-4ED9-AB21-C2BABC5A6472}"/>
-    <dgm:cxn modelId="{61F21DAB-E7F5-40A8-9228-CE9B1B9FB4A4}" srcId="{982F42A4-24B3-43B0-924C-E3BD6C6E7869}" destId="{0A816BFB-FA68-44D5-8F1B-809D2980EB63}" srcOrd="2" destOrd="0" parTransId="{44428571-75A1-486A-93C2-29F9E32E58BD}" sibTransId="{43B9A2EE-15F0-41DE-B978-C292E15CE1D9}"/>
-    <dgm:cxn modelId="{CE71340F-CACC-4465-997D-40864843B2D5}" type="presOf" srcId="{F9B87A83-2C55-4A68-BF23-0B4E66A54FEE}" destId="{45E1BD41-C25F-49BE-856B-DA67C6CE395A}" srcOrd="0" destOrd="0" presId="urn:microsoft.com/office/officeart/2005/8/layout/vList2"/>
+    <dgm:cxn modelId="{BED018AB-57E7-4C97-B625-F0C7B6A105E3}" srcId="{79F8C1F8-E525-4802-B41A-D8056BCD388B}" destId="{7578EF37-69A0-4E3F-88F2-9FB489186C72}" srcOrd="1" destOrd="0" parTransId="{EF5F334B-CD54-4F8C-A85E-6FC5726FE5CC}" sibTransId="{873E212E-7772-4DA0-B323-51D7B41368FD}"/>
+    <dgm:cxn modelId="{16FA2F46-0032-4537-92F5-904BDB1F5311}" type="presOf" srcId="{982F42A4-24B3-43B0-924C-E3BD6C6E7869}" destId="{023DA921-F375-4606-9BFC-271B8C03E20B}" srcOrd="0" destOrd="0" presId="urn:microsoft.com/office/officeart/2005/8/layout/vList2"/>
+    <dgm:cxn modelId="{EF8CE1F3-058E-4A87-B397-2B9E327674C3}" type="presOf" srcId="{0A816BFB-FA68-44D5-8F1B-809D2980EB63}" destId="{0026F19E-B0D6-4A6C-943D-6B47E28D1EB3}" srcOrd="0" destOrd="2" presId="urn:microsoft.com/office/officeart/2005/8/layout/vList2"/>
     <dgm:cxn modelId="{4EEA088F-CBF6-46DD-A1AB-E8C6500797AE}" type="presOf" srcId="{7578EF37-69A0-4E3F-88F2-9FB489186C72}" destId="{721482F0-D801-4B67-A207-5B0B3EC5FF1E}" srcOrd="0" destOrd="1" presId="urn:microsoft.com/office/officeart/2005/8/layout/vList2"/>
-    <dgm:cxn modelId="{656BC70D-250F-4715-A192-15D43510E8A9}" type="presOf" srcId="{19319D74-6F59-4022-B515-A0C6AC300208}" destId="{721482F0-D801-4B67-A207-5B0B3EC5FF1E}" srcOrd="0" destOrd="2" presId="urn:microsoft.com/office/officeart/2005/8/layout/vList2"/>
-    <dgm:cxn modelId="{94BD955A-B0E8-4396-9608-485EBD4D13BC}" srcId="{982F42A4-24B3-43B0-924C-E3BD6C6E7869}" destId="{7BC84EE2-D899-4737-846F-70CEFD3F0A80}" srcOrd="1" destOrd="0" parTransId="{FFF5CD9F-FCBC-4156-9815-74245532A97D}" sibTransId="{CAF6AE16-5DE2-4418-87F1-A01177297F50}"/>
-    <dgm:cxn modelId="{127E4503-40FD-43C4-BF51-BE55541ED645}" srcId="{894C4D23-E2A3-4C3C-8200-250DFF2CEBC2}" destId="{79F8C1F8-E525-4802-B41A-D8056BCD388B}" srcOrd="1" destOrd="0" parTransId="{246050A3-48A2-4E6C-B174-7B39C3EDFE00}" sibTransId="{714FAC92-397D-494C-990B-44BEAB00FD31}"/>
-    <dgm:cxn modelId="{7F40274B-30E0-494D-9827-EA7C33A177B8}" type="presOf" srcId="{7BC84EE2-D899-4737-846F-70CEFD3F0A80}" destId="{0026F19E-B0D6-4A6C-943D-6B47E28D1EB3}" srcOrd="0" destOrd="1" presId="urn:microsoft.com/office/officeart/2005/8/layout/vList2"/>
-    <dgm:cxn modelId="{0B2DFE80-50AD-46FE-AEC0-8A8E99B0431A}" srcId="{79F8C1F8-E525-4802-B41A-D8056BCD388B}" destId="{DB4FD1C8-5282-464E-BEC4-8D5D1F6C2E31}" srcOrd="0" destOrd="0" parTransId="{78C2B223-B1D8-4A59-B19F-22727DC8B7B0}" sibTransId="{F376F185-7BC2-4F26-B755-7A193D731EC5}"/>
-    <dgm:cxn modelId="{BBF6D1D8-EE69-46C8-9EE3-5B79FEC09C69}" srcId="{894C4D23-E2A3-4C3C-8200-250DFF2CEBC2}" destId="{982F42A4-24B3-43B0-924C-E3BD6C6E7869}" srcOrd="0" destOrd="0" parTransId="{4A0C779E-C794-42F1-867E-98533D014499}" sibTransId="{EC3F88CE-0B71-44AD-970F-7281AF473D6A}"/>
-    <dgm:cxn modelId="{7567A02E-E749-41B2-910E-5B9B8E59D552}" type="presOf" srcId="{894C4D23-E2A3-4C3C-8200-250DFF2CEBC2}" destId="{72E39A59-1424-4875-95B4-DB0D91C56F8A}" srcOrd="0" destOrd="0" presId="urn:microsoft.com/office/officeart/2005/8/layout/vList2"/>
     <dgm:cxn modelId="{1B0A22B7-6C41-462A-BF51-97A0E5A8742C}" type="presOf" srcId="{79F8C1F8-E525-4802-B41A-D8056BCD388B}" destId="{C4492511-E5AA-4ABD-B23D-8C50809D4FE7}" srcOrd="0" destOrd="0" presId="urn:microsoft.com/office/officeart/2005/8/layout/vList2"/>
-    <dgm:cxn modelId="{2EF723FA-35A5-4A36-AA82-F85923C6C219}" srcId="{982F42A4-24B3-43B0-924C-E3BD6C6E7869}" destId="{0CD6A03F-3B8C-4E37-8F45-E4088F458603}" srcOrd="0" destOrd="0" parTransId="{F4F3DE81-8BBA-43AA-8893-25C933ABCF2B}" sibTransId="{DEEC573A-35CB-47F8-A195-4290F9C304BF}"/>
-    <dgm:cxn modelId="{16FA2F46-0032-4537-92F5-904BDB1F5311}" type="presOf" srcId="{982F42A4-24B3-43B0-924C-E3BD6C6E7869}" destId="{023DA921-F375-4606-9BFC-271B8C03E20B}" srcOrd="0" destOrd="0" presId="urn:microsoft.com/office/officeart/2005/8/layout/vList2"/>
     <dgm:cxn modelId="{06004DBC-4BAC-4E7E-A3E7-C11934993BD5}" type="presOf" srcId="{1153731D-F020-47E9-888D-4B9606387D15}" destId="{45E1BD41-C25F-49BE-856B-DA67C6CE395A}" srcOrd="0" destOrd="1" presId="urn:microsoft.com/office/officeart/2005/8/layout/vList2"/>
     <dgm:cxn modelId="{7A7F74AD-6A38-45D5-BE9B-38A3E4BBA52D}" type="presOf" srcId="{041761A3-2EBA-4115-8F78-DD18E208EEFC}" destId="{D08F9FAB-9CBE-4AEF-93AA-47F52A25FF42}" srcOrd="0" destOrd="0" presId="urn:microsoft.com/office/officeart/2005/8/layout/vList2"/>
-    <dgm:cxn modelId="{EF8CE1F3-058E-4A87-B397-2B9E327674C3}" type="presOf" srcId="{0A816BFB-FA68-44D5-8F1B-809D2980EB63}" destId="{0026F19E-B0D6-4A6C-943D-6B47E28D1EB3}" srcOrd="0" destOrd="2" presId="urn:microsoft.com/office/officeart/2005/8/layout/vList2"/>
     <dgm:cxn modelId="{892E4258-C107-4E6C-8B14-92041A207CE6}" type="presOf" srcId="{DB4FD1C8-5282-464E-BEC4-8D5D1F6C2E31}" destId="{721482F0-D801-4B67-A207-5B0B3EC5FF1E}" srcOrd="0" destOrd="0" presId="urn:microsoft.com/office/officeart/2005/8/layout/vList2"/>
     <dgm:cxn modelId="{91072A02-3D17-4E43-B3AC-64728C173980}" srcId="{79F8C1F8-E525-4802-B41A-D8056BCD388B}" destId="{19319D74-6F59-4022-B515-A0C6AC300208}" srcOrd="2" destOrd="0" parTransId="{AEBA7C6C-B2E4-4598-8ED2-CE736D03432A}" sibTransId="{CB8229B6-8BA9-4BBD-BA61-2A9FF1CF049B}"/>
-    <dgm:cxn modelId="{B5E31A19-56E0-41A6-91A7-E8F0BAB5E24B}" srcId="{041761A3-2EBA-4115-8F78-DD18E208EEFC}" destId="{F9B87A83-2C55-4A68-BF23-0B4E66A54FEE}" srcOrd="0" destOrd="0" parTransId="{225A27F9-4F70-48FE-B965-F73A3BFA0EF0}" sibTransId="{993DE258-A0F6-4B2F-81A9-597680B0B75E}"/>
-    <dgm:cxn modelId="{BED018AB-57E7-4C97-B625-F0C7B6A105E3}" srcId="{79F8C1F8-E525-4802-B41A-D8056BCD388B}" destId="{7578EF37-69A0-4E3F-88F2-9FB489186C72}" srcOrd="1" destOrd="0" parTransId="{EF5F334B-CD54-4F8C-A85E-6FC5726FE5CC}" sibTransId="{873E212E-7772-4DA0-B323-51D7B41368FD}"/>
     <dgm:cxn modelId="{5E20FAE6-912A-440C-857C-37D8F22C74AB}" type="presParOf" srcId="{72E39A59-1424-4875-95B4-DB0D91C56F8A}" destId="{023DA921-F375-4606-9BFC-271B8C03E20B}" srcOrd="0" destOrd="0" presId="urn:microsoft.com/office/officeart/2005/8/layout/vList2"/>
     <dgm:cxn modelId="{99672856-9195-4831-A6DB-8C1368148310}" type="presParOf" srcId="{72E39A59-1424-4875-95B4-DB0D91C56F8A}" destId="{0026F19E-B0D6-4A6C-943D-6B47E28D1EB3}" srcOrd="1" destOrd="0" presId="urn:microsoft.com/office/officeart/2005/8/layout/vList2"/>
     <dgm:cxn modelId="{8DD11E1B-C872-4A61-A43C-58EF66FFF69A}" type="presParOf" srcId="{72E39A59-1424-4875-95B4-DB0D91C56F8A}" destId="{C4492511-E5AA-4ABD-B23D-8C50809D4FE7}" srcOrd="2" destOrd="0" presId="urn:microsoft.com/office/officeart/2005/8/layout/vList2"/>
@@ -8114,14 +8131,14 @@
   <dgm:whole/>
   <dgm:extLst>
     <a:ext uri="http://schemas.microsoft.com/office/drawing/2008/diagram">
-      <dsp:dataModelExt xmlns:dsp="http://schemas.microsoft.com/office/drawing/2008/diagram" relId="rId6" minVer="http://schemas.openxmlformats.org/drawingml/2006/diagram"/>
+      <dsp:dataModelExt xmlns:dsp="http://schemas.microsoft.com/office/drawing/2008/diagram" xmlns="" relId="rId6" minVer="http://schemas.openxmlformats.org/drawingml/2006/diagram"/>
     </a:ext>
   </dgm:extLst>
 </dgm:dataModel>
 </file>
 
 <file path=ppt/diagrams/drawing1.xml><?xml version="1.0" encoding="utf-8"?>
-<dsp:drawing xmlns:dgm="http://schemas.openxmlformats.org/drawingml/2006/diagram" xmlns:dsp="http://schemas.microsoft.com/office/drawing/2008/diagram" xmlns:a="http://schemas.openxmlformats.org/drawingml/2006/main">
+<dsp:drawing xmlns:dgm="http://schemas.openxmlformats.org/drawingml/2006/diagram" xmlns:a="http://schemas.openxmlformats.org/drawingml/2006/main" xmlns:dsp="http://schemas.microsoft.com/office/drawing/2008/diagram">
   <dsp:spTree>
     <dsp:nvGrpSpPr>
       <dsp:cNvPr id="0" name=""/>
@@ -8201,9 +8218,9 @@
           <a:endParaRPr lang="de-DE" sz="2000" kern="1200" dirty="0"/>
         </a:p>
       </dsp:txBody>
-      <dsp:txXfrm rot="-5400000">
-        <a:off x="1" y="295089"/>
-        <a:ext cx="582836" cy="249787"/>
+      <dsp:txXfrm rot="5400000">
+        <a:off x="-124893" y="128565"/>
+        <a:ext cx="832623" cy="582836"/>
       </dsp:txXfrm>
     </dsp:sp>
     <dsp:sp modelId="{B2D2E7C7-A742-4586-8A0E-2B612AA3D8BB}">
@@ -8274,14 +8291,14 @@
           </a:pPr>
           <a:r>
             <a:rPr lang="de-DE" sz="1800" kern="1200" dirty="0" smtClean="0"/>
-            <a:t>Zielbestimmung und Produkteinsatz – Mario</a:t>
+            <a:t>Zielbestimmung und Produkteinsatz </a:t>
           </a:r>
           <a:endParaRPr lang="de-DE" sz="1800" kern="1200" dirty="0"/>
         </a:p>
       </dsp:txBody>
-      <dsp:txXfrm rot="-5400000">
-        <a:off x="582837" y="30105"/>
-        <a:ext cx="7455230" cy="488623"/>
+      <dsp:txXfrm rot="5400000">
+        <a:off x="4052923" y="-3466414"/>
+        <a:ext cx="541489" cy="7481663"/>
       </dsp:txXfrm>
     </dsp:sp>
     <dsp:sp modelId="{E3F19936-8B71-4FA3-AD5C-430CF09D137E}">
@@ -8357,9 +8374,9 @@
           <a:endParaRPr lang="de-DE" sz="2000" kern="1200" dirty="0" smtClean="0"/>
         </a:p>
       </dsp:txBody>
-      <dsp:txXfrm rot="-5400000">
-        <a:off x="1" y="1044095"/>
-        <a:ext cx="582836" cy="249787"/>
+      <dsp:txXfrm rot="5400000">
+        <a:off x="-124893" y="877571"/>
+        <a:ext cx="832623" cy="582836"/>
       </dsp:txXfrm>
     </dsp:sp>
     <dsp:sp modelId="{C01B44A7-DD34-4A5C-9EAE-1FFC3BB31F39}">
@@ -8429,15 +8446,19 @@
             <a:buChar char="••"/>
           </a:pPr>
           <a:r>
-            <a:rPr lang="de-DE" sz="1800" kern="1200" smtClean="0"/>
-            <a:t>Produkt- und Entwicklungsumgebung - Denis</a:t>
+            <a:rPr lang="de-DE" sz="1800" kern="1200" dirty="0" smtClean="0"/>
+            <a:t>Produkt- und </a:t>
+          </a:r>
+          <a:r>
+            <a:rPr lang="de-DE" sz="1800" kern="1200" dirty="0" smtClean="0"/>
+            <a:t>Entwicklungsumgebung</a:t>
           </a:r>
           <a:endParaRPr lang="de-DE" sz="1800" kern="1200" dirty="0" smtClean="0"/>
         </a:p>
       </dsp:txBody>
-      <dsp:txXfrm rot="-5400000">
-        <a:off x="582837" y="779096"/>
-        <a:ext cx="7455244" cy="488367"/>
+      <dsp:txXfrm rot="5400000">
+        <a:off x="4053065" y="-2717551"/>
+        <a:ext cx="541205" cy="7481663"/>
       </dsp:txXfrm>
     </dsp:sp>
     <dsp:sp modelId="{6F6599AB-DC4B-4490-B40B-40D454984C6F}">
@@ -8513,9 +8534,9 @@
           <a:endParaRPr lang="de-DE" sz="2000" kern="1200" dirty="0" smtClean="0"/>
         </a:p>
       </dsp:txBody>
-      <dsp:txXfrm rot="-5400000">
-        <a:off x="1" y="1793100"/>
-        <a:ext cx="582836" cy="249787"/>
+      <dsp:txXfrm rot="5400000">
+        <a:off x="-124893" y="1626576"/>
+        <a:ext cx="832623" cy="582836"/>
       </dsp:txXfrm>
     </dsp:sp>
     <dsp:sp modelId="{894A46E6-703C-436E-AA2E-287279148530}">
@@ -8594,13 +8615,13 @@
           </a:r>
           <a:r>
             <a:rPr lang="de-DE" sz="1800" kern="1200" dirty="0" smtClean="0"/>
-            <a:t> –Denis &amp; Hannes</a:t>
+            <a:t> </a:t>
           </a:r>
         </a:p>
       </dsp:txBody>
-      <dsp:txXfrm rot="-5400000">
-        <a:off x="582837" y="1528101"/>
-        <a:ext cx="7455244" cy="488367"/>
+      <dsp:txXfrm rot="5400000">
+        <a:off x="4053065" y="-1968546"/>
+        <a:ext cx="541205" cy="7481663"/>
       </dsp:txXfrm>
     </dsp:sp>
     <dsp:sp modelId="{F3740BEB-E70D-49FF-9B2A-9F10CEB82215}">
@@ -8676,9 +8697,9 @@
           <a:endParaRPr lang="de-DE" sz="2000" kern="1200" dirty="0" smtClean="0"/>
         </a:p>
       </dsp:txBody>
-      <dsp:txXfrm rot="-5400000">
-        <a:off x="1" y="2542105"/>
-        <a:ext cx="582836" cy="249787"/>
+      <dsp:txXfrm rot="5400000">
+        <a:off x="-124893" y="2375581"/>
+        <a:ext cx="832623" cy="582836"/>
       </dsp:txXfrm>
     </dsp:sp>
     <dsp:sp modelId="{1B73F951-1DDC-4C3A-833E-8CEC648AEA5A}">
@@ -8749,13 +8770,13 @@
           </a:pPr>
           <a:r>
             <a:rPr lang="de-DE" sz="1800" kern="1200" dirty="0" smtClean="0"/>
-            <a:t>Produktfunktionen und Nutzungsoberfläche – Hannes &amp; Anna</a:t>
+            <a:t>Produktfunktionen und Nutzungsoberfläche </a:t>
           </a:r>
         </a:p>
       </dsp:txBody>
-      <dsp:txXfrm rot="-5400000">
-        <a:off x="582837" y="2277107"/>
-        <a:ext cx="7455244" cy="488367"/>
+      <dsp:txXfrm rot="5400000">
+        <a:off x="4053065" y="-1219540"/>
+        <a:ext cx="541205" cy="7481663"/>
       </dsp:txXfrm>
     </dsp:sp>
     <dsp:sp modelId="{9526EA86-AF28-4CAD-9F0E-9E238425486E}">
@@ -8831,9 +8852,9 @@
           <a:endParaRPr lang="de-DE" sz="2000" kern="1200" dirty="0" smtClean="0"/>
         </a:p>
       </dsp:txBody>
-      <dsp:txXfrm rot="-5400000">
-        <a:off x="1" y="3291111"/>
-        <a:ext cx="582836" cy="249787"/>
+      <dsp:txXfrm rot="5400000">
+        <a:off x="-124893" y="3124587"/>
+        <a:ext cx="832623" cy="582836"/>
       </dsp:txXfrm>
     </dsp:sp>
     <dsp:sp modelId="{68BA67DE-E77A-4C02-A1CE-28F3246103E1}">
@@ -8904,13 +8925,18 @@
           </a:pPr>
           <a:r>
             <a:rPr lang="de-DE" sz="1800" kern="1200" dirty="0" smtClean="0"/>
-            <a:t>Qualitätsbestimmungen und Testszenarien - Christian</a:t>
+            <a:t>Qualitätsbestimmungen und </a:t>
           </a:r>
+          <a:r>
+            <a:rPr lang="de-DE" sz="1800" kern="1200" dirty="0" smtClean="0"/>
+            <a:t>Testszenarien</a:t>
+          </a:r>
+          <a:endParaRPr lang="de-DE" sz="1800" kern="1200" dirty="0" smtClean="0"/>
         </a:p>
       </dsp:txBody>
-      <dsp:txXfrm rot="-5400000">
-        <a:off x="582837" y="3026112"/>
-        <a:ext cx="7455244" cy="488367"/>
+      <dsp:txXfrm rot="5400000">
+        <a:off x="4053065" y="-470535"/>
+        <a:ext cx="541205" cy="7481663"/>
       </dsp:txXfrm>
     </dsp:sp>
     <dsp:sp modelId="{E3001D05-152A-4029-8EE4-34737AC02E20}">
@@ -8986,9 +9012,9 @@
           <a:endParaRPr lang="de-DE" sz="2000" kern="1200" dirty="0" smtClean="0"/>
         </a:p>
       </dsp:txBody>
-      <dsp:txXfrm rot="-5400000">
-        <a:off x="1" y="4040116"/>
-        <a:ext cx="582836" cy="249787"/>
+      <dsp:txXfrm rot="5400000">
+        <a:off x="-124893" y="3873592"/>
+        <a:ext cx="832623" cy="582836"/>
       </dsp:txXfrm>
     </dsp:sp>
     <dsp:sp modelId="{D904E67A-2D65-4C8F-A661-2173B3B9B2AD}">
@@ -9058,15 +9084,19 @@
             <a:buChar char="••"/>
           </a:pPr>
           <a:r>
-            <a:rPr lang="de-DE" sz="1800" kern="1200" smtClean="0"/>
-            <a:t>Projektplan und Kostenvoranschlag –Christian, Mario</a:t>
+            <a:rPr lang="de-DE" sz="1800" kern="1200" dirty="0" smtClean="0"/>
+            <a:t>Projektplan und </a:t>
+          </a:r>
+          <a:r>
+            <a:rPr lang="de-DE" sz="1800" kern="1200" dirty="0" smtClean="0"/>
+            <a:t>Kostenvoranschlag</a:t>
           </a:r>
           <a:endParaRPr lang="de-DE" sz="1800" kern="1200" dirty="0" smtClean="0"/>
         </a:p>
       </dsp:txBody>
-      <dsp:txXfrm rot="-5400000">
-        <a:off x="582837" y="3775117"/>
-        <a:ext cx="7455244" cy="488367"/>
+      <dsp:txXfrm rot="5400000">
+        <a:off x="4053065" y="278469"/>
+        <a:ext cx="541205" cy="7481663"/>
       </dsp:txXfrm>
     </dsp:sp>
     <dsp:sp modelId="{9A897EE7-A5B6-43E9-86F9-591C2E9894C4}">
@@ -9142,9 +9172,9 @@
           <a:endParaRPr lang="de-DE" sz="2000" kern="1200" dirty="0" smtClean="0"/>
         </a:p>
       </dsp:txBody>
-      <dsp:txXfrm rot="-5400000">
-        <a:off x="1" y="4789121"/>
-        <a:ext cx="582836" cy="249787"/>
+      <dsp:txXfrm rot="5400000">
+        <a:off x="-124893" y="4622597"/>
+        <a:ext cx="832623" cy="582836"/>
       </dsp:txXfrm>
     </dsp:sp>
     <dsp:sp modelId="{4C385E69-E824-47C4-92B7-98C08F4FE795}">
@@ -9214,15 +9244,19 @@
             <a:buChar char="••"/>
           </a:pPr>
           <a:r>
-            <a:rPr lang="de-DE" sz="1800" kern="1200" smtClean="0"/>
-            <a:t>Innensicht des Projekts -Anna</a:t>
+            <a:rPr lang="de-DE" sz="1800" kern="1200" dirty="0" smtClean="0"/>
+            <a:t>Innensicht des </a:t>
+          </a:r>
+          <a:r>
+            <a:rPr lang="de-DE" sz="1800" kern="1200" dirty="0" smtClean="0"/>
+            <a:t>Projekts</a:t>
           </a:r>
           <a:endParaRPr lang="de-DE" sz="1800" kern="1200" dirty="0" smtClean="0"/>
         </a:p>
       </dsp:txBody>
-      <dsp:txXfrm rot="-5400000">
-        <a:off x="582837" y="4524123"/>
-        <a:ext cx="7455244" cy="488367"/>
+      <dsp:txXfrm rot="5400000">
+        <a:off x="4053065" y="1027475"/>
+        <a:ext cx="541205" cy="7481663"/>
       </dsp:txXfrm>
     </dsp:sp>
   </dsp:spTree>
@@ -9230,2023 +9264,61 @@
 </file>
 
 <file path=ppt/diagrams/drawing2.xml><?xml version="1.0" encoding="utf-8"?>
-<dsp:drawing xmlns:dgm="http://schemas.openxmlformats.org/drawingml/2006/diagram" xmlns:dsp="http://schemas.microsoft.com/office/drawing/2008/diagram" xmlns:a="http://schemas.openxmlformats.org/drawingml/2006/main">
+<dsp:drawing xmlns:dgm="http://schemas.openxmlformats.org/drawingml/2006/diagram" xmlns:a="http://schemas.openxmlformats.org/drawingml/2006/main" xmlns:dsp="http://schemas.microsoft.com/office/drawing/2008/diagram">
   <dsp:spTree>
     <dsp:nvGrpSpPr>
       <dsp:cNvPr id="0" name=""/>
       <dsp:cNvGrpSpPr/>
     </dsp:nvGrpSpPr>
     <dsp:grpSpPr/>
-    <dsp:sp modelId="{5C791DC2-0636-4F43-86F7-709972657369}">
-      <dsp:nvSpPr>
-        <dsp:cNvPr id="0" name=""/>
-        <dsp:cNvSpPr/>
-      </dsp:nvSpPr>
-      <dsp:spPr>
-        <a:xfrm>
-          <a:off x="8011" y="268985"/>
-          <a:ext cx="3572674" cy="433849"/>
-        </a:xfrm>
-        <a:prstGeom prst="rect">
-          <a:avLst/>
-        </a:prstGeom>
-        <a:solidFill>
-          <a:schemeClr val="dk2">
-            <a:hueOff val="0"/>
-            <a:satOff val="0"/>
-            <a:lumOff val="0"/>
-            <a:alphaOff val="0"/>
-          </a:schemeClr>
-        </a:solidFill>
-        <a:ln w="25400" cap="flat" cmpd="sng" algn="ctr">
-          <a:solidFill>
-            <a:schemeClr val="dk2">
-              <a:hueOff val="0"/>
-              <a:satOff val="0"/>
-              <a:lumOff val="0"/>
-              <a:alphaOff val="0"/>
-            </a:schemeClr>
-          </a:solidFill>
-          <a:prstDash val="solid"/>
-        </a:ln>
-        <a:effectLst/>
-      </dsp:spPr>
-      <dsp:style>
-        <a:lnRef idx="2">
-          <a:scrgbClr r="0" g="0" b="0"/>
-        </a:lnRef>
-        <a:fillRef idx="1">
-          <a:scrgbClr r="0" g="0" b="0"/>
-        </a:fillRef>
-        <a:effectRef idx="0">
-          <a:scrgbClr r="0" g="0" b="0"/>
-        </a:effectRef>
-        <a:fontRef idx="minor">
-          <a:schemeClr val="lt1"/>
-        </a:fontRef>
-      </dsp:style>
-      <dsp:txBody>
-        <a:bodyPr spcFirstLastPara="0" vert="horz" wrap="square" lIns="142240" tIns="81280" rIns="142240" bIns="81280" numCol="1" spcCol="1270" anchor="ctr" anchorCtr="0">
-          <a:noAutofit/>
-        </a:bodyPr>
-        <a:lstStyle/>
-        <a:p>
-          <a:pPr lvl="0" algn="ctr" defTabSz="889000">
-            <a:lnSpc>
-              <a:spcPct val="90000"/>
-            </a:lnSpc>
-            <a:spcBef>
-              <a:spcPct val="0"/>
-            </a:spcBef>
-            <a:spcAft>
-              <a:spcPct val="35000"/>
-            </a:spcAft>
-          </a:pPr>
-          <a:r>
-            <a:rPr lang="de-DE" sz="2000" b="1" kern="1200" dirty="0" smtClean="0"/>
-            <a:t>Software – Produkt:</a:t>
-          </a:r>
-          <a:endParaRPr lang="de-DE" sz="2000" b="1" kern="1200" dirty="0"/>
-        </a:p>
-      </dsp:txBody>
-      <dsp:txXfrm>
-        <a:off x="8011" y="268985"/>
-        <a:ext cx="3572674" cy="433849"/>
-      </dsp:txXfrm>
-    </dsp:sp>
-    <dsp:sp modelId="{8EE46F37-689A-441A-9015-E03840A8C83D}">
-      <dsp:nvSpPr>
-        <dsp:cNvPr id="0" name=""/>
-        <dsp:cNvSpPr/>
-      </dsp:nvSpPr>
-      <dsp:spPr>
-        <a:xfrm>
-          <a:off x="8011" y="702834"/>
-          <a:ext cx="3572674" cy="3362625"/>
-        </a:xfrm>
-        <a:prstGeom prst="rect">
-          <a:avLst/>
-        </a:prstGeom>
-        <a:solidFill>
-          <a:schemeClr val="dk2">
-            <a:alpha val="90000"/>
-            <a:tint val="40000"/>
-            <a:hueOff val="0"/>
-            <a:satOff val="0"/>
-            <a:lumOff val="0"/>
-            <a:alphaOff val="0"/>
-          </a:schemeClr>
-        </a:solidFill>
-        <a:ln w="25400" cap="flat" cmpd="sng" algn="ctr">
-          <a:solidFill>
-            <a:schemeClr val="dk2">
-              <a:alpha val="90000"/>
-              <a:tint val="40000"/>
-              <a:hueOff val="0"/>
-              <a:satOff val="0"/>
-              <a:lumOff val="0"/>
-              <a:alphaOff val="0"/>
-            </a:schemeClr>
-          </a:solidFill>
-          <a:prstDash val="solid"/>
-        </a:ln>
-        <a:effectLst/>
-      </dsp:spPr>
-      <dsp:style>
-        <a:lnRef idx="2">
-          <a:scrgbClr r="0" g="0" b="0"/>
-        </a:lnRef>
-        <a:fillRef idx="1">
-          <a:scrgbClr r="0" g="0" b="0"/>
-        </a:fillRef>
-        <a:effectRef idx="0">
-          <a:scrgbClr r="0" g="0" b="0"/>
-        </a:effectRef>
-        <a:fontRef idx="minor"/>
-      </dsp:style>
-      <dsp:txBody>
-        <a:bodyPr spcFirstLastPara="0" vert="horz" wrap="square" lIns="106680" tIns="106680" rIns="142240" bIns="160020" numCol="1" spcCol="1270" anchor="t" anchorCtr="0">
-          <a:noAutofit/>
-        </a:bodyPr>
-        <a:lstStyle/>
-        <a:p>
-          <a:pPr marL="228600" lvl="1" indent="-228600" algn="l" defTabSz="889000">
-            <a:lnSpc>
-              <a:spcPct val="90000"/>
-            </a:lnSpc>
-            <a:spcBef>
-              <a:spcPct val="0"/>
-            </a:spcBef>
-            <a:spcAft>
-              <a:spcPct val="15000"/>
-            </a:spcAft>
-            <a:buChar char="••"/>
-          </a:pPr>
-          <a:r>
-            <a:rPr lang="de-DE" sz="2000" kern="1200" dirty="0" smtClean="0"/>
-            <a:t>Betriebssystem: Windows 7 Professional (inkl. Updates)</a:t>
-          </a:r>
-          <a:endParaRPr lang="de-DE" sz="2000" kern="1200" dirty="0"/>
-        </a:p>
-        <a:p>
-          <a:pPr marL="228600" lvl="1" indent="-228600" algn="l" defTabSz="889000">
-            <a:lnSpc>
-              <a:spcPct val="90000"/>
-            </a:lnSpc>
-            <a:spcBef>
-              <a:spcPct val="0"/>
-            </a:spcBef>
-            <a:spcAft>
-              <a:spcPct val="15000"/>
-            </a:spcAft>
-            <a:buChar char="••"/>
-          </a:pPr>
-          <a:r>
-            <a:rPr lang="de-DE" sz="2000" kern="1200" dirty="0" smtClean="0"/>
-            <a:t>Laufzeitumgebung: Java JVM – JRE Version 7.0 (inkl. Systempfade)</a:t>
-          </a:r>
-        </a:p>
-        <a:p>
-          <a:pPr marL="228600" lvl="1" indent="-228600" algn="l" defTabSz="889000">
-            <a:lnSpc>
-              <a:spcPct val="90000"/>
-            </a:lnSpc>
-            <a:spcBef>
-              <a:spcPct val="0"/>
-            </a:spcBef>
-            <a:spcAft>
-              <a:spcPct val="15000"/>
-            </a:spcAft>
-            <a:buChar char="••"/>
-          </a:pPr>
-          <a:r>
-            <a:rPr lang="de-DE" sz="2000" kern="1200" dirty="0" smtClean="0"/>
-            <a:t>Datenbank: </a:t>
-          </a:r>
-          <a:r>
-            <a:rPr lang="de-DE" sz="2000" kern="1200" dirty="0" err="1" smtClean="0"/>
-            <a:t>PostgreSQL</a:t>
-          </a:r>
-          <a:r>
-            <a:rPr lang="de-DE" sz="2000" kern="1200" dirty="0" smtClean="0"/>
-            <a:t> 9.2.1. (Clients auf </a:t>
-          </a:r>
-          <a:r>
-            <a:rPr lang="de-DE" sz="2000" kern="1200" dirty="0" err="1" smtClean="0"/>
-            <a:t>Whitelist</a:t>
-          </a:r>
-          <a:r>
-            <a:rPr lang="de-DE" sz="2000" kern="1200" dirty="0" smtClean="0"/>
-            <a:t>)</a:t>
-          </a:r>
-        </a:p>
-        <a:p>
-          <a:pPr marL="228600" lvl="1" indent="-228600" algn="l" defTabSz="889000">
-            <a:lnSpc>
-              <a:spcPct val="90000"/>
-            </a:lnSpc>
-            <a:spcBef>
-              <a:spcPct val="0"/>
-            </a:spcBef>
-            <a:spcAft>
-              <a:spcPct val="15000"/>
-            </a:spcAft>
-            <a:buChar char="••"/>
-          </a:pPr>
-          <a:r>
-            <a:rPr lang="de-DE" sz="2000" kern="1200" dirty="0" smtClean="0"/>
-            <a:t>Windows-Shell</a:t>
-          </a:r>
-        </a:p>
-      </dsp:txBody>
-      <dsp:txXfrm>
-        <a:off x="8011" y="702834"/>
-        <a:ext cx="3572674" cy="3362625"/>
-      </dsp:txXfrm>
-    </dsp:sp>
-    <dsp:sp modelId="{B96FD785-8435-4F05-A5D4-902D5A3A8CB2}">
-      <dsp:nvSpPr>
-        <dsp:cNvPr id="0" name=""/>
-        <dsp:cNvSpPr/>
-      </dsp:nvSpPr>
-      <dsp:spPr>
-        <a:xfrm>
-          <a:off x="3935645" y="268985"/>
-          <a:ext cx="3862429" cy="433849"/>
-        </a:xfrm>
-        <a:prstGeom prst="rect">
-          <a:avLst/>
-        </a:prstGeom>
-        <a:solidFill>
-          <a:schemeClr val="dk2">
-            <a:hueOff val="0"/>
-            <a:satOff val="0"/>
-            <a:lumOff val="0"/>
-            <a:alphaOff val="0"/>
-          </a:schemeClr>
-        </a:solidFill>
-        <a:ln w="25400" cap="flat" cmpd="sng" algn="ctr">
-          <a:solidFill>
-            <a:schemeClr val="dk2">
-              <a:hueOff val="0"/>
-              <a:satOff val="0"/>
-              <a:lumOff val="0"/>
-              <a:alphaOff val="0"/>
-            </a:schemeClr>
-          </a:solidFill>
-          <a:prstDash val="solid"/>
-        </a:ln>
-        <a:effectLst/>
-      </dsp:spPr>
-      <dsp:style>
-        <a:lnRef idx="2">
-          <a:scrgbClr r="0" g="0" b="0"/>
-        </a:lnRef>
-        <a:fillRef idx="1">
-          <a:scrgbClr r="0" g="0" b="0"/>
-        </a:fillRef>
-        <a:effectRef idx="0">
-          <a:scrgbClr r="0" g="0" b="0"/>
-        </a:effectRef>
-        <a:fontRef idx="minor">
-          <a:schemeClr val="lt1"/>
-        </a:fontRef>
-      </dsp:style>
-      <dsp:txBody>
-        <a:bodyPr spcFirstLastPara="0" vert="horz" wrap="square" lIns="142240" tIns="81280" rIns="142240" bIns="81280" numCol="1" spcCol="1270" anchor="ctr" anchorCtr="0">
-          <a:noAutofit/>
-        </a:bodyPr>
-        <a:lstStyle/>
-        <a:p>
-          <a:pPr lvl="0" algn="ctr" defTabSz="889000">
-            <a:lnSpc>
-              <a:spcPct val="90000"/>
-            </a:lnSpc>
-            <a:spcBef>
-              <a:spcPct val="0"/>
-            </a:spcBef>
-            <a:spcAft>
-              <a:spcPct val="35000"/>
-            </a:spcAft>
-          </a:pPr>
-          <a:r>
-            <a:rPr lang="de-DE" sz="2000" b="1" kern="1200" dirty="0" smtClean="0"/>
-            <a:t>Software – Entwicklung:</a:t>
-          </a:r>
-          <a:endParaRPr lang="de-DE" sz="2000" b="1" kern="1200" dirty="0"/>
-        </a:p>
-      </dsp:txBody>
-      <dsp:txXfrm>
-        <a:off x="3935645" y="268985"/>
-        <a:ext cx="3862429" cy="433849"/>
-      </dsp:txXfrm>
-    </dsp:sp>
-    <dsp:sp modelId="{0CB536DE-E607-493D-A295-103CD6F84F62}">
-      <dsp:nvSpPr>
-        <dsp:cNvPr id="0" name=""/>
-        <dsp:cNvSpPr/>
-      </dsp:nvSpPr>
-      <dsp:spPr>
-        <a:xfrm>
-          <a:off x="3935645" y="702834"/>
-          <a:ext cx="3862429" cy="3362625"/>
-        </a:xfrm>
-        <a:prstGeom prst="rect">
-          <a:avLst/>
-        </a:prstGeom>
-        <a:solidFill>
-          <a:schemeClr val="dk2">
-            <a:alpha val="90000"/>
-            <a:tint val="40000"/>
-            <a:hueOff val="0"/>
-            <a:satOff val="0"/>
-            <a:lumOff val="0"/>
-            <a:alphaOff val="0"/>
-          </a:schemeClr>
-        </a:solidFill>
-        <a:ln w="25400" cap="flat" cmpd="sng" algn="ctr">
-          <a:solidFill>
-            <a:schemeClr val="dk2">
-              <a:alpha val="90000"/>
-              <a:tint val="40000"/>
-              <a:hueOff val="0"/>
-              <a:satOff val="0"/>
-              <a:lumOff val="0"/>
-              <a:alphaOff val="0"/>
-            </a:schemeClr>
-          </a:solidFill>
-          <a:prstDash val="solid"/>
-        </a:ln>
-        <a:effectLst/>
-      </dsp:spPr>
-      <dsp:style>
-        <a:lnRef idx="2">
-          <a:scrgbClr r="0" g="0" b="0"/>
-        </a:lnRef>
-        <a:fillRef idx="1">
-          <a:scrgbClr r="0" g="0" b="0"/>
-        </a:fillRef>
-        <a:effectRef idx="0">
-          <a:scrgbClr r="0" g="0" b="0"/>
-        </a:effectRef>
-        <a:fontRef idx="minor"/>
-      </dsp:style>
-      <dsp:txBody>
-        <a:bodyPr spcFirstLastPara="0" vert="horz" wrap="square" lIns="106680" tIns="106680" rIns="142240" bIns="160020" numCol="1" spcCol="1270" anchor="t" anchorCtr="0">
-          <a:noAutofit/>
-        </a:bodyPr>
-        <a:lstStyle/>
-        <a:p>
-          <a:pPr marL="228600" lvl="1" indent="-228600" algn="l" defTabSz="889000">
-            <a:lnSpc>
-              <a:spcPct val="90000"/>
-            </a:lnSpc>
-            <a:spcBef>
-              <a:spcPct val="0"/>
-            </a:spcBef>
-            <a:spcAft>
-              <a:spcPct val="15000"/>
-            </a:spcAft>
-            <a:buChar char="••"/>
-          </a:pPr>
-          <a:r>
-            <a:rPr lang="de-DE" sz="2000" kern="1200" dirty="0" smtClean="0"/>
-            <a:t>Programmierung:</a:t>
-          </a:r>
-          <a:endParaRPr lang="de-DE" sz="2000" kern="1200" dirty="0"/>
-        </a:p>
-        <a:p>
-          <a:pPr marL="457200" lvl="2" indent="-228600" algn="l" defTabSz="889000">
-            <a:lnSpc>
-              <a:spcPct val="90000"/>
-            </a:lnSpc>
-            <a:spcBef>
-              <a:spcPct val="0"/>
-            </a:spcBef>
-            <a:spcAft>
-              <a:spcPct val="15000"/>
-            </a:spcAft>
-            <a:buChar char="••"/>
-          </a:pPr>
-          <a:r>
-            <a:rPr lang="de-DE" sz="2000" kern="1200" dirty="0" smtClean="0"/>
-            <a:t>JAVA JDK Version 7.0 &amp; Java Code </a:t>
-          </a:r>
-          <a:r>
-            <a:rPr lang="de-DE" sz="2000" kern="1200" dirty="0" err="1" smtClean="0"/>
-            <a:t>Conventions</a:t>
-          </a:r>
-          <a:r>
-            <a:rPr lang="de-DE" sz="2000" kern="1200" dirty="0" smtClean="0"/>
-            <a:t> (Sun)</a:t>
-          </a:r>
-          <a:endParaRPr lang="de-DE" sz="2000" kern="1200" dirty="0"/>
-        </a:p>
-        <a:p>
-          <a:pPr marL="457200" lvl="2" indent="-228600" algn="l" defTabSz="889000">
-            <a:lnSpc>
-              <a:spcPct val="90000"/>
-            </a:lnSpc>
-            <a:spcBef>
-              <a:spcPct val="0"/>
-            </a:spcBef>
-            <a:spcAft>
-              <a:spcPct val="15000"/>
-            </a:spcAft>
-            <a:buChar char="••"/>
-          </a:pPr>
-          <a:r>
-            <a:rPr lang="de-DE" sz="2000" kern="1200" dirty="0" err="1" smtClean="0"/>
-            <a:t>Eclipse</a:t>
-          </a:r>
-          <a:r>
-            <a:rPr lang="de-DE" sz="2000" kern="1200" dirty="0" smtClean="0"/>
-            <a:t> 4.2 (</a:t>
-          </a:r>
-          <a:r>
-            <a:rPr lang="de-DE" sz="2000" kern="1200" dirty="0" err="1" smtClean="0"/>
-            <a:t>Window</a:t>
-          </a:r>
-          <a:r>
-            <a:rPr lang="de-DE" sz="2000" kern="1200" dirty="0" smtClean="0"/>
-            <a:t> </a:t>
-          </a:r>
-          <a:r>
-            <a:rPr lang="de-DE" sz="2000" kern="1200" dirty="0" err="1" smtClean="0"/>
-            <a:t>Builder</a:t>
-          </a:r>
-          <a:r>
-            <a:rPr lang="de-DE" sz="2000" kern="1200" dirty="0" smtClean="0"/>
-            <a:t>)</a:t>
-          </a:r>
-        </a:p>
-        <a:p>
-          <a:pPr marL="228600" lvl="1" indent="-228600" algn="l" defTabSz="889000">
-            <a:lnSpc>
-              <a:spcPct val="90000"/>
-            </a:lnSpc>
-            <a:spcBef>
-              <a:spcPct val="0"/>
-            </a:spcBef>
-            <a:spcAft>
-              <a:spcPct val="15000"/>
-            </a:spcAft>
-            <a:buChar char="••"/>
-          </a:pPr>
-          <a:r>
-            <a:rPr lang="de-DE" sz="2000" kern="1200" dirty="0" smtClean="0"/>
-            <a:t>Kommunikation/Teamarbeit: </a:t>
-          </a:r>
-          <a:r>
-            <a:rPr lang="de-DE" sz="2000" kern="1200" dirty="0" err="1" smtClean="0"/>
-            <a:t>TortoiseSVN</a:t>
-          </a:r>
-          <a:r>
-            <a:rPr lang="de-DE" sz="2000" kern="1200" dirty="0" smtClean="0"/>
-            <a:t> 1.7.10 &amp; Skype</a:t>
-          </a:r>
-        </a:p>
-        <a:p>
-          <a:pPr marL="228600" lvl="1" indent="-228600" algn="l" defTabSz="889000">
-            <a:lnSpc>
-              <a:spcPct val="90000"/>
-            </a:lnSpc>
-            <a:spcBef>
-              <a:spcPct val="0"/>
-            </a:spcBef>
-            <a:spcAft>
-              <a:spcPct val="15000"/>
-            </a:spcAft>
-            <a:buChar char="••"/>
-          </a:pPr>
-          <a:r>
-            <a:rPr lang="de-DE" sz="2000" kern="1200" dirty="0" smtClean="0"/>
-            <a:t>Organisation: </a:t>
-          </a:r>
-          <a:r>
-            <a:rPr lang="de-DE" sz="2000" kern="1200" dirty="0" err="1" smtClean="0"/>
-            <a:t>LaTeX</a:t>
-          </a:r>
-          <a:r>
-            <a:rPr lang="de-DE" sz="2000" kern="1200" dirty="0" smtClean="0"/>
-            <a:t>, MS Project, </a:t>
-          </a:r>
-          <a:r>
-            <a:rPr lang="de-DE" sz="2000" kern="1200" dirty="0" err="1" smtClean="0"/>
-            <a:t>Dropbox</a:t>
-          </a:r>
-          <a:endParaRPr lang="de-DE" sz="2000" kern="1200" dirty="0" smtClean="0"/>
-        </a:p>
-      </dsp:txBody>
-      <dsp:txXfrm>
-        <a:off x="3935645" y="702834"/>
-        <a:ext cx="3862429" cy="3362625"/>
-      </dsp:txXfrm>
-    </dsp:sp>
   </dsp:spTree>
 </dsp:drawing>
 </file>
 
 <file path=ppt/diagrams/drawing3.xml><?xml version="1.0" encoding="utf-8"?>
-<dsp:drawing xmlns:dgm="http://schemas.openxmlformats.org/drawingml/2006/diagram" xmlns:dsp="http://schemas.microsoft.com/office/drawing/2008/diagram" xmlns:a="http://schemas.openxmlformats.org/drawingml/2006/main">
+<dsp:drawing xmlns:dgm="http://schemas.openxmlformats.org/drawingml/2006/diagram" xmlns:a="http://schemas.openxmlformats.org/drawingml/2006/main" xmlns:dsp="http://schemas.microsoft.com/office/drawing/2008/diagram">
   <dsp:spTree>
     <dsp:nvGrpSpPr>
       <dsp:cNvPr id="0" name=""/>
       <dsp:cNvGrpSpPr/>
     </dsp:nvGrpSpPr>
     <dsp:grpSpPr/>
-    <dsp:sp modelId="{00F3AF14-E21F-4001-998F-7568669D62AF}">
-      <dsp:nvSpPr>
-        <dsp:cNvPr id="0" name=""/>
-        <dsp:cNvSpPr/>
-      </dsp:nvSpPr>
-      <dsp:spPr>
-        <a:xfrm>
-          <a:off x="0" y="77583"/>
-          <a:ext cx="7813301" cy="364865"/>
-        </a:xfrm>
-        <a:prstGeom prst="rect">
-          <a:avLst/>
-        </a:prstGeom>
-        <a:solidFill>
-          <a:schemeClr val="dk2">
-            <a:hueOff val="0"/>
-            <a:satOff val="0"/>
-            <a:lumOff val="0"/>
-            <a:alphaOff val="0"/>
-          </a:schemeClr>
-        </a:solidFill>
-        <a:ln w="25400" cap="flat" cmpd="sng" algn="ctr">
-          <a:solidFill>
-            <a:schemeClr val="dk2">
-              <a:hueOff val="0"/>
-              <a:satOff val="0"/>
-              <a:lumOff val="0"/>
-              <a:alphaOff val="0"/>
-            </a:schemeClr>
-          </a:solidFill>
-          <a:prstDash val="solid"/>
-        </a:ln>
-        <a:effectLst/>
-      </dsp:spPr>
-      <dsp:style>
-        <a:lnRef idx="2">
-          <a:scrgbClr r="0" g="0" b="0"/>
-        </a:lnRef>
-        <a:fillRef idx="1">
-          <a:scrgbClr r="0" g="0" b="0"/>
-        </a:fillRef>
-        <a:effectRef idx="0">
-          <a:scrgbClr r="0" g="0" b="0"/>
-        </a:effectRef>
-        <a:fontRef idx="minor">
-          <a:schemeClr val="lt1"/>
-        </a:fontRef>
-      </dsp:style>
-      <dsp:txBody>
-        <a:bodyPr spcFirstLastPara="0" vert="horz" wrap="square" lIns="142240" tIns="81280" rIns="142240" bIns="81280" numCol="1" spcCol="1270" anchor="ctr" anchorCtr="0">
-          <a:noAutofit/>
-        </a:bodyPr>
-        <a:lstStyle/>
-        <a:p>
-          <a:pPr lvl="0" algn="ctr" defTabSz="889000">
-            <a:lnSpc>
-              <a:spcPct val="90000"/>
-            </a:lnSpc>
-            <a:spcBef>
-              <a:spcPct val="0"/>
-            </a:spcBef>
-            <a:spcAft>
-              <a:spcPct val="35000"/>
-            </a:spcAft>
-          </a:pPr>
-          <a:r>
-            <a:rPr lang="de-DE" sz="2000" b="1" kern="1200" smtClean="0"/>
-            <a:t>Hardware</a:t>
-          </a:r>
-          <a:endParaRPr lang="de-DE" sz="2000" b="1" kern="1200"/>
-        </a:p>
-      </dsp:txBody>
-      <dsp:txXfrm>
-        <a:off x="0" y="77583"/>
-        <a:ext cx="7813301" cy="364865"/>
-      </dsp:txXfrm>
-    </dsp:sp>
-    <dsp:sp modelId="{4A6CDFC6-B2FF-4EB0-A010-D6084927542B}">
-      <dsp:nvSpPr>
-        <dsp:cNvPr id="0" name=""/>
-        <dsp:cNvSpPr/>
-      </dsp:nvSpPr>
-      <dsp:spPr>
-        <a:xfrm>
-          <a:off x="0" y="443266"/>
-          <a:ext cx="7813301" cy="1161134"/>
-        </a:xfrm>
-        <a:prstGeom prst="rect">
-          <a:avLst/>
-        </a:prstGeom>
-        <a:solidFill>
-          <a:schemeClr val="dk2">
-            <a:alpha val="90000"/>
-            <a:tint val="40000"/>
-            <a:hueOff val="0"/>
-            <a:satOff val="0"/>
-            <a:lumOff val="0"/>
-            <a:alphaOff val="0"/>
-          </a:schemeClr>
-        </a:solidFill>
-        <a:ln w="25400" cap="flat" cmpd="sng" algn="ctr">
-          <a:solidFill>
-            <a:schemeClr val="dk2">
-              <a:alpha val="90000"/>
-              <a:tint val="40000"/>
-              <a:hueOff val="0"/>
-              <a:satOff val="0"/>
-              <a:lumOff val="0"/>
-              <a:alphaOff val="0"/>
-            </a:schemeClr>
-          </a:solidFill>
-          <a:prstDash val="solid"/>
-        </a:ln>
-        <a:effectLst/>
-      </dsp:spPr>
-      <dsp:style>
-        <a:lnRef idx="2">
-          <a:scrgbClr r="0" g="0" b="0"/>
-        </a:lnRef>
-        <a:fillRef idx="1">
-          <a:scrgbClr r="0" g="0" b="0"/>
-        </a:fillRef>
-        <a:effectRef idx="0">
-          <a:scrgbClr r="0" g="0" b="0"/>
-        </a:effectRef>
-        <a:fontRef idx="minor"/>
-      </dsp:style>
-      <dsp:txBody>
-        <a:bodyPr spcFirstLastPara="0" vert="horz" wrap="square" lIns="106680" tIns="106680" rIns="142240" bIns="160020" numCol="1" spcCol="1270" anchor="t" anchorCtr="0">
-          <a:noAutofit/>
-        </a:bodyPr>
-        <a:lstStyle/>
-        <a:p>
-          <a:pPr marL="228600" lvl="1" indent="-228600" algn="l" defTabSz="889000">
-            <a:lnSpc>
-              <a:spcPct val="90000"/>
-            </a:lnSpc>
-            <a:spcBef>
-              <a:spcPct val="0"/>
-            </a:spcBef>
-            <a:spcAft>
-              <a:spcPct val="15000"/>
-            </a:spcAft>
-            <a:buChar char="••"/>
-          </a:pPr>
-          <a:r>
-            <a:rPr lang="de-DE" sz="2000" kern="1200" dirty="0" smtClean="0"/>
-            <a:t>IBM kompatibler PC (CPU: 1Ghz, RAM: 1GB, HDD: 100MB)</a:t>
-          </a:r>
-          <a:endParaRPr lang="de-DE" sz="2000" kern="1200" dirty="0"/>
-        </a:p>
-        <a:p>
-          <a:pPr marL="228600" lvl="1" indent="-228600" algn="l" defTabSz="889000">
-            <a:lnSpc>
-              <a:spcPct val="90000"/>
-            </a:lnSpc>
-            <a:spcBef>
-              <a:spcPct val="0"/>
-            </a:spcBef>
-            <a:spcAft>
-              <a:spcPct val="15000"/>
-            </a:spcAft>
-            <a:buChar char="••"/>
-          </a:pPr>
-          <a:r>
-            <a:rPr lang="de-DE" sz="2000" kern="1200" dirty="0" smtClean="0"/>
-            <a:t>Peripherie: Maus &amp; Tastatur</a:t>
-          </a:r>
-          <a:endParaRPr lang="de-DE" sz="2000" kern="1200" dirty="0"/>
-        </a:p>
-        <a:p>
-          <a:pPr marL="228600" lvl="1" indent="-228600" algn="l" defTabSz="889000">
-            <a:lnSpc>
-              <a:spcPct val="90000"/>
-            </a:lnSpc>
-            <a:spcBef>
-              <a:spcPct val="0"/>
-            </a:spcBef>
-            <a:spcAft>
-              <a:spcPct val="15000"/>
-            </a:spcAft>
-            <a:buChar char="••"/>
-          </a:pPr>
-          <a:r>
-            <a:rPr lang="de-DE" sz="2000" kern="1200" dirty="0" smtClean="0"/>
-            <a:t>Netzwerkanschluss</a:t>
-          </a:r>
-        </a:p>
-      </dsp:txBody>
-      <dsp:txXfrm>
-        <a:off x="0" y="443266"/>
-        <a:ext cx="7813301" cy="1161134"/>
-      </dsp:txXfrm>
-    </dsp:sp>
   </dsp:spTree>
 </dsp:drawing>
 </file>
 
 <file path=ppt/diagrams/drawing4.xml><?xml version="1.0" encoding="utf-8"?>
-<dsp:drawing xmlns:dgm="http://schemas.openxmlformats.org/drawingml/2006/diagram" xmlns:dsp="http://schemas.microsoft.com/office/drawing/2008/diagram" xmlns:a="http://schemas.openxmlformats.org/drawingml/2006/main">
+<dsp:drawing xmlns:dgm="http://schemas.openxmlformats.org/drawingml/2006/diagram" xmlns:a="http://schemas.openxmlformats.org/drawingml/2006/main" xmlns:dsp="http://schemas.microsoft.com/office/drawing/2008/diagram">
   <dsp:spTree>
     <dsp:nvGrpSpPr>
       <dsp:cNvPr id="0" name=""/>
       <dsp:cNvGrpSpPr/>
     </dsp:nvGrpSpPr>
     <dsp:grpSpPr/>
-    <dsp:sp modelId="{AE087654-4E95-4B2F-B173-2F2E01D222FB}">
-      <dsp:nvSpPr>
-        <dsp:cNvPr id="0" name=""/>
-        <dsp:cNvSpPr/>
-      </dsp:nvSpPr>
-      <dsp:spPr>
-        <a:xfrm>
-          <a:off x="38" y="13075"/>
-          <a:ext cx="3687563" cy="518400"/>
-        </a:xfrm>
-        <a:prstGeom prst="rect">
-          <a:avLst/>
-        </a:prstGeom>
-        <a:solidFill>
-          <a:schemeClr val="dk2">
-            <a:hueOff val="0"/>
-            <a:satOff val="0"/>
-            <a:lumOff val="0"/>
-            <a:alphaOff val="0"/>
-          </a:schemeClr>
-        </a:solidFill>
-        <a:ln w="25400" cap="flat" cmpd="sng" algn="ctr">
-          <a:solidFill>
-            <a:schemeClr val="dk2">
-              <a:hueOff val="0"/>
-              <a:satOff val="0"/>
-              <a:lumOff val="0"/>
-              <a:alphaOff val="0"/>
-            </a:schemeClr>
-          </a:solidFill>
-          <a:prstDash val="solid"/>
-        </a:ln>
-        <a:effectLst/>
-      </dsp:spPr>
-      <dsp:style>
-        <a:lnRef idx="2">
-          <a:scrgbClr r="0" g="0" b="0"/>
-        </a:lnRef>
-        <a:fillRef idx="1">
-          <a:scrgbClr r="0" g="0" b="0"/>
-        </a:fillRef>
-        <a:effectRef idx="0">
-          <a:scrgbClr r="0" g="0" b="0"/>
-        </a:effectRef>
-        <a:fontRef idx="minor">
-          <a:schemeClr val="lt1"/>
-        </a:fontRef>
-      </dsp:style>
-      <dsp:txBody>
-        <a:bodyPr spcFirstLastPara="0" vert="horz" wrap="square" lIns="142240" tIns="81280" rIns="142240" bIns="81280" numCol="1" spcCol="1270" anchor="ctr" anchorCtr="0">
-          <a:noAutofit/>
-        </a:bodyPr>
-        <a:lstStyle/>
-        <a:p>
-          <a:pPr lvl="0" algn="ctr" defTabSz="889000">
-            <a:lnSpc>
-              <a:spcPct val="90000"/>
-            </a:lnSpc>
-            <a:spcBef>
-              <a:spcPct val="0"/>
-            </a:spcBef>
-            <a:spcAft>
-              <a:spcPct val="35000"/>
-            </a:spcAft>
-          </a:pPr>
-          <a:r>
-            <a:rPr lang="de-DE" sz="2000" b="1" kern="1200" dirty="0" smtClean="0"/>
-            <a:t>Produkt-Schnittstellen</a:t>
-          </a:r>
-          <a:endParaRPr lang="de-DE" sz="2000" b="1" kern="1200" dirty="0"/>
-        </a:p>
-      </dsp:txBody>
-      <dsp:txXfrm>
-        <a:off x="38" y="13075"/>
-        <a:ext cx="3687563" cy="518400"/>
-      </dsp:txXfrm>
-    </dsp:sp>
-    <dsp:sp modelId="{DF627311-7BB5-4644-A1D9-1C0A4FB64FC2}">
-      <dsp:nvSpPr>
-        <dsp:cNvPr id="0" name=""/>
-        <dsp:cNvSpPr/>
-      </dsp:nvSpPr>
-      <dsp:spPr>
-        <a:xfrm>
-          <a:off x="38" y="531475"/>
-          <a:ext cx="3687563" cy="1976399"/>
-        </a:xfrm>
-        <a:prstGeom prst="rect">
-          <a:avLst/>
-        </a:prstGeom>
-        <a:solidFill>
-          <a:schemeClr val="dk2">
-            <a:alpha val="90000"/>
-            <a:tint val="40000"/>
-            <a:hueOff val="0"/>
-            <a:satOff val="0"/>
-            <a:lumOff val="0"/>
-            <a:alphaOff val="0"/>
-          </a:schemeClr>
-        </a:solidFill>
-        <a:ln w="25400" cap="flat" cmpd="sng" algn="ctr">
-          <a:solidFill>
-            <a:schemeClr val="dk2">
-              <a:alpha val="90000"/>
-              <a:tint val="40000"/>
-              <a:hueOff val="0"/>
-              <a:satOff val="0"/>
-              <a:lumOff val="0"/>
-              <a:alphaOff val="0"/>
-            </a:schemeClr>
-          </a:solidFill>
-          <a:prstDash val="solid"/>
-        </a:ln>
-        <a:effectLst/>
-      </dsp:spPr>
-      <dsp:style>
-        <a:lnRef idx="2">
-          <a:scrgbClr r="0" g="0" b="0"/>
-        </a:lnRef>
-        <a:fillRef idx="1">
-          <a:scrgbClr r="0" g="0" b="0"/>
-        </a:fillRef>
-        <a:effectRef idx="0">
-          <a:scrgbClr r="0" g="0" b="0"/>
-        </a:effectRef>
-        <a:fontRef idx="minor"/>
-      </dsp:style>
-      <dsp:txBody>
-        <a:bodyPr spcFirstLastPara="0" vert="horz" wrap="square" lIns="106680" tIns="106680" rIns="142240" bIns="160020" numCol="1" spcCol="1270" anchor="t" anchorCtr="0">
-          <a:noAutofit/>
-        </a:bodyPr>
-        <a:lstStyle/>
-        <a:p>
-          <a:pPr marL="228600" lvl="1" indent="-228600" algn="l" defTabSz="889000">
-            <a:lnSpc>
-              <a:spcPct val="90000"/>
-            </a:lnSpc>
-            <a:spcBef>
-              <a:spcPct val="0"/>
-            </a:spcBef>
-            <a:spcAft>
-              <a:spcPct val="15000"/>
-            </a:spcAft>
-            <a:buChar char="••"/>
-          </a:pPr>
-          <a:r>
-            <a:rPr lang="de-DE" sz="2000" kern="1200" dirty="0" smtClean="0"/>
-            <a:t>Keine </a:t>
-          </a:r>
-          <a:r>
-            <a:rPr lang="de-DE" sz="2000" b="0" kern="1200" dirty="0" smtClean="0"/>
-            <a:t>Schnittstelle</a:t>
-          </a:r>
-          <a:r>
-            <a:rPr lang="de-DE" sz="2000" kern="1200" dirty="0" smtClean="0"/>
-            <a:t> zwischen den einzelnen ausgeführten Instanzen</a:t>
-          </a:r>
-        </a:p>
-        <a:p>
-          <a:pPr marL="228600" lvl="1" indent="-228600" algn="l" defTabSz="889000">
-            <a:lnSpc>
-              <a:spcPct val="90000"/>
-            </a:lnSpc>
-            <a:spcBef>
-              <a:spcPct val="0"/>
-            </a:spcBef>
-            <a:spcAft>
-              <a:spcPct val="15000"/>
-            </a:spcAft>
-            <a:buChar char="••"/>
-          </a:pPr>
-          <a:r>
-            <a:rPr lang="de-DE" sz="2000" kern="1200" dirty="0" smtClean="0"/>
-            <a:t>Datenaustausch über Datenbank</a:t>
-          </a:r>
-        </a:p>
-        <a:p>
-          <a:pPr marL="228600" lvl="1" indent="-228600" algn="l" defTabSz="889000">
-            <a:lnSpc>
-              <a:spcPct val="90000"/>
-            </a:lnSpc>
-            <a:spcBef>
-              <a:spcPct val="0"/>
-            </a:spcBef>
-            <a:spcAft>
-              <a:spcPct val="15000"/>
-            </a:spcAft>
-            <a:buChar char="••"/>
-          </a:pPr>
-          <a:r>
-            <a:rPr lang="de-DE" sz="2000" kern="1200" dirty="0" smtClean="0"/>
-            <a:t>Zugriffmöglichkeit per Web&amp;</a:t>
-          </a:r>
-        </a:p>
-      </dsp:txBody>
-      <dsp:txXfrm>
-        <a:off x="38" y="531475"/>
-        <a:ext cx="3687563" cy="1976399"/>
-      </dsp:txXfrm>
-    </dsp:sp>
-    <dsp:sp modelId="{D1A7D8D4-B177-40C0-B4CB-8A066EF22632}">
-      <dsp:nvSpPr>
-        <dsp:cNvPr id="0" name=""/>
-        <dsp:cNvSpPr/>
-      </dsp:nvSpPr>
-      <dsp:spPr>
-        <a:xfrm>
-          <a:off x="4203860" y="13075"/>
-          <a:ext cx="3687563" cy="518400"/>
-        </a:xfrm>
-        <a:prstGeom prst="rect">
-          <a:avLst/>
-        </a:prstGeom>
-        <a:solidFill>
-          <a:schemeClr val="dk2">
-            <a:hueOff val="0"/>
-            <a:satOff val="0"/>
-            <a:lumOff val="0"/>
-            <a:alphaOff val="0"/>
-          </a:schemeClr>
-        </a:solidFill>
-        <a:ln w="25400" cap="flat" cmpd="sng" algn="ctr">
-          <a:solidFill>
-            <a:schemeClr val="dk2">
-              <a:hueOff val="0"/>
-              <a:satOff val="0"/>
-              <a:lumOff val="0"/>
-              <a:alphaOff val="0"/>
-            </a:schemeClr>
-          </a:solidFill>
-          <a:prstDash val="solid"/>
-        </a:ln>
-        <a:effectLst/>
-      </dsp:spPr>
-      <dsp:style>
-        <a:lnRef idx="2">
-          <a:scrgbClr r="0" g="0" b="0"/>
-        </a:lnRef>
-        <a:fillRef idx="1">
-          <a:scrgbClr r="0" g="0" b="0"/>
-        </a:fillRef>
-        <a:effectRef idx="0">
-          <a:scrgbClr r="0" g="0" b="0"/>
-        </a:effectRef>
-        <a:fontRef idx="minor">
-          <a:schemeClr val="lt1"/>
-        </a:fontRef>
-      </dsp:style>
-      <dsp:txBody>
-        <a:bodyPr spcFirstLastPara="0" vert="horz" wrap="square" lIns="142240" tIns="81280" rIns="142240" bIns="81280" numCol="1" spcCol="1270" anchor="ctr" anchorCtr="0">
-          <a:noAutofit/>
-        </a:bodyPr>
-        <a:lstStyle/>
-        <a:p>
-          <a:pPr lvl="0" algn="ctr" defTabSz="889000">
-            <a:lnSpc>
-              <a:spcPct val="90000"/>
-            </a:lnSpc>
-            <a:spcBef>
-              <a:spcPct val="0"/>
-            </a:spcBef>
-            <a:spcAft>
-              <a:spcPct val="35000"/>
-            </a:spcAft>
-          </a:pPr>
-          <a:r>
-            <a:rPr lang="de-DE" sz="2000" b="1" kern="1200" dirty="0" smtClean="0"/>
-            <a:t>Zukünftige</a:t>
-          </a:r>
-          <a:r>
-            <a:rPr lang="de-DE" sz="2000" kern="1200" dirty="0" smtClean="0"/>
-            <a:t> </a:t>
-          </a:r>
-          <a:r>
-            <a:rPr lang="de-DE" sz="2000" b="1" kern="1200" dirty="0" smtClean="0"/>
-            <a:t>Entwicklungen</a:t>
-          </a:r>
-        </a:p>
-      </dsp:txBody>
-      <dsp:txXfrm>
-        <a:off x="4203860" y="13075"/>
-        <a:ext cx="3687563" cy="518400"/>
-      </dsp:txXfrm>
-    </dsp:sp>
-    <dsp:sp modelId="{CF4C1E38-3F92-44FE-B543-1F75CA0F215C}">
-      <dsp:nvSpPr>
-        <dsp:cNvPr id="0" name=""/>
-        <dsp:cNvSpPr/>
-      </dsp:nvSpPr>
-      <dsp:spPr>
-        <a:xfrm>
-          <a:off x="4203860" y="531475"/>
-          <a:ext cx="3687563" cy="1976399"/>
-        </a:xfrm>
-        <a:prstGeom prst="rect">
-          <a:avLst/>
-        </a:prstGeom>
-        <a:solidFill>
-          <a:schemeClr val="dk2">
-            <a:alpha val="90000"/>
-            <a:tint val="40000"/>
-            <a:hueOff val="0"/>
-            <a:satOff val="0"/>
-            <a:lumOff val="0"/>
-            <a:alphaOff val="0"/>
-          </a:schemeClr>
-        </a:solidFill>
-        <a:ln w="25400" cap="flat" cmpd="sng" algn="ctr">
-          <a:solidFill>
-            <a:schemeClr val="dk2">
-              <a:alpha val="90000"/>
-              <a:tint val="40000"/>
-              <a:hueOff val="0"/>
-              <a:satOff val="0"/>
-              <a:lumOff val="0"/>
-              <a:alphaOff val="0"/>
-            </a:schemeClr>
-          </a:solidFill>
-          <a:prstDash val="solid"/>
-        </a:ln>
-        <a:effectLst/>
-      </dsp:spPr>
-      <dsp:style>
-        <a:lnRef idx="2">
-          <a:scrgbClr r="0" g="0" b="0"/>
-        </a:lnRef>
-        <a:fillRef idx="1">
-          <a:scrgbClr r="0" g="0" b="0"/>
-        </a:fillRef>
-        <a:effectRef idx="0">
-          <a:scrgbClr r="0" g="0" b="0"/>
-        </a:effectRef>
-        <a:fontRef idx="minor"/>
-      </dsp:style>
-      <dsp:txBody>
-        <a:bodyPr spcFirstLastPara="0" vert="horz" wrap="square" lIns="106680" tIns="106680" rIns="142240" bIns="160020" numCol="1" spcCol="1270" anchor="t" anchorCtr="0">
-          <a:noAutofit/>
-        </a:bodyPr>
-        <a:lstStyle/>
-        <a:p>
-          <a:pPr marL="228600" lvl="1" indent="-228600" algn="l" defTabSz="889000">
-            <a:lnSpc>
-              <a:spcPct val="90000"/>
-            </a:lnSpc>
-            <a:spcBef>
-              <a:spcPct val="0"/>
-            </a:spcBef>
-            <a:spcAft>
-              <a:spcPct val="15000"/>
-            </a:spcAft>
-            <a:buChar char="••"/>
-          </a:pPr>
-          <a:r>
-            <a:rPr lang="de-DE" sz="2000" kern="1200" dirty="0" smtClean="0"/>
-            <a:t>Standortausweitung</a:t>
-          </a:r>
-        </a:p>
-        <a:p>
-          <a:pPr marL="228600" lvl="1" indent="-228600" algn="l" defTabSz="889000">
-            <a:lnSpc>
-              <a:spcPct val="90000"/>
-            </a:lnSpc>
-            <a:spcBef>
-              <a:spcPct val="0"/>
-            </a:spcBef>
-            <a:spcAft>
-              <a:spcPct val="15000"/>
-            </a:spcAft>
-            <a:buChar char="••"/>
-          </a:pPr>
-          <a:r>
-            <a:rPr lang="de-DE" sz="2000" kern="1200" dirty="0" smtClean="0"/>
-            <a:t>Webzugriff &amp; mobile Geräte</a:t>
-          </a:r>
-        </a:p>
-        <a:p>
-          <a:pPr marL="228600" lvl="1" indent="-228600" algn="l" defTabSz="889000">
-            <a:lnSpc>
-              <a:spcPct val="90000"/>
-            </a:lnSpc>
-            <a:spcBef>
-              <a:spcPct val="0"/>
-            </a:spcBef>
-            <a:spcAft>
-              <a:spcPct val="15000"/>
-            </a:spcAft>
-            <a:buChar char="••"/>
-          </a:pPr>
-          <a:r>
-            <a:rPr lang="de-DE" sz="2000" kern="1200" dirty="0" smtClean="0"/>
-            <a:t>durch entsprechende Dokumentation des Quellcodes</a:t>
-          </a:r>
-        </a:p>
-      </dsp:txBody>
-      <dsp:txXfrm>
-        <a:off x="4203860" y="531475"/>
-        <a:ext cx="3687563" cy="1976399"/>
-      </dsp:txXfrm>
-    </dsp:sp>
   </dsp:spTree>
 </dsp:drawing>
 </file>
 
 <file path=ppt/diagrams/drawing5.xml><?xml version="1.0" encoding="utf-8"?>
-<dsp:drawing xmlns:dgm="http://schemas.openxmlformats.org/drawingml/2006/diagram" xmlns:dsp="http://schemas.microsoft.com/office/drawing/2008/diagram" xmlns:a="http://schemas.openxmlformats.org/drawingml/2006/main">
+<dsp:drawing xmlns:dgm="http://schemas.openxmlformats.org/drawingml/2006/diagram" xmlns:a="http://schemas.openxmlformats.org/drawingml/2006/main" xmlns:dsp="http://schemas.microsoft.com/office/drawing/2008/diagram">
   <dsp:spTree>
     <dsp:nvGrpSpPr>
       <dsp:cNvPr id="0" name=""/>
       <dsp:cNvGrpSpPr/>
     </dsp:nvGrpSpPr>
     <dsp:grpSpPr/>
-    <dsp:sp modelId="{1110A0BE-D284-440B-9275-42463CFC7AB3}">
-      <dsp:nvSpPr>
-        <dsp:cNvPr id="0" name=""/>
-        <dsp:cNvSpPr/>
-      </dsp:nvSpPr>
-      <dsp:spPr>
-        <a:xfrm>
-          <a:off x="3839" y="25781"/>
-          <a:ext cx="7855210" cy="362399"/>
-        </a:xfrm>
-        <a:prstGeom prst="rect">
-          <a:avLst/>
-        </a:prstGeom>
-        <a:solidFill>
-          <a:schemeClr val="dk2">
-            <a:hueOff val="0"/>
-            <a:satOff val="0"/>
-            <a:lumOff val="0"/>
-            <a:alphaOff val="0"/>
-          </a:schemeClr>
-        </a:solidFill>
-        <a:ln w="25400" cap="flat" cmpd="sng" algn="ctr">
-          <a:solidFill>
-            <a:schemeClr val="dk2">
-              <a:hueOff val="0"/>
-              <a:satOff val="0"/>
-              <a:lumOff val="0"/>
-              <a:alphaOff val="0"/>
-            </a:schemeClr>
-          </a:solidFill>
-          <a:prstDash val="solid"/>
-        </a:ln>
-        <a:effectLst/>
-      </dsp:spPr>
-      <dsp:style>
-        <a:lnRef idx="2">
-          <a:scrgbClr r="0" g="0" b="0"/>
-        </a:lnRef>
-        <a:fillRef idx="1">
-          <a:scrgbClr r="0" g="0" b="0"/>
-        </a:fillRef>
-        <a:effectRef idx="0">
-          <a:scrgbClr r="0" g="0" b="0"/>
-        </a:effectRef>
-        <a:fontRef idx="minor">
-          <a:schemeClr val="lt1"/>
-        </a:fontRef>
-      </dsp:style>
-      <dsp:txBody>
-        <a:bodyPr spcFirstLastPara="0" vert="horz" wrap="square" lIns="142240" tIns="81280" rIns="142240" bIns="81280" numCol="1" spcCol="1270" anchor="ctr" anchorCtr="0">
-          <a:noAutofit/>
-        </a:bodyPr>
-        <a:lstStyle/>
-        <a:p>
-          <a:pPr lvl="0" algn="ctr" defTabSz="889000">
-            <a:lnSpc>
-              <a:spcPct val="90000"/>
-            </a:lnSpc>
-            <a:spcBef>
-              <a:spcPct val="0"/>
-            </a:spcBef>
-            <a:spcAft>
-              <a:spcPct val="35000"/>
-            </a:spcAft>
-          </a:pPr>
-          <a:r>
-            <a:rPr lang="de-DE" sz="2000" b="1" kern="1200" smtClean="0"/>
-            <a:t>Orgware</a:t>
-          </a:r>
-          <a:endParaRPr lang="de-DE" sz="2000" b="1" kern="1200"/>
-        </a:p>
-      </dsp:txBody>
-      <dsp:txXfrm>
-        <a:off x="3839" y="25781"/>
-        <a:ext cx="7855210" cy="362399"/>
-      </dsp:txXfrm>
-    </dsp:sp>
-    <dsp:sp modelId="{6B69AF66-EE4C-44E1-8D21-A24430D0F9F9}">
-      <dsp:nvSpPr>
-        <dsp:cNvPr id="0" name=""/>
-        <dsp:cNvSpPr/>
-      </dsp:nvSpPr>
-      <dsp:spPr>
-        <a:xfrm>
-          <a:off x="3839" y="396925"/>
-          <a:ext cx="7855210" cy="2635199"/>
-        </a:xfrm>
-        <a:prstGeom prst="rect">
-          <a:avLst/>
-        </a:prstGeom>
-        <a:solidFill>
-          <a:schemeClr val="dk2">
-            <a:alpha val="90000"/>
-            <a:tint val="40000"/>
-            <a:hueOff val="0"/>
-            <a:satOff val="0"/>
-            <a:lumOff val="0"/>
-            <a:alphaOff val="0"/>
-          </a:schemeClr>
-        </a:solidFill>
-        <a:ln w="25400" cap="flat" cmpd="sng" algn="ctr">
-          <a:solidFill>
-            <a:schemeClr val="dk2">
-              <a:alpha val="90000"/>
-              <a:tint val="40000"/>
-              <a:hueOff val="0"/>
-              <a:satOff val="0"/>
-              <a:lumOff val="0"/>
-              <a:alphaOff val="0"/>
-            </a:schemeClr>
-          </a:solidFill>
-          <a:prstDash val="solid"/>
-        </a:ln>
-        <a:effectLst/>
-      </dsp:spPr>
-      <dsp:style>
-        <a:lnRef idx="2">
-          <a:scrgbClr r="0" g="0" b="0"/>
-        </a:lnRef>
-        <a:fillRef idx="1">
-          <a:scrgbClr r="0" g="0" b="0"/>
-        </a:fillRef>
-        <a:effectRef idx="0">
-          <a:scrgbClr r="0" g="0" b="0"/>
-        </a:effectRef>
-        <a:fontRef idx="minor"/>
-      </dsp:style>
-      <dsp:txBody>
-        <a:bodyPr spcFirstLastPara="0" vert="horz" wrap="square" lIns="106680" tIns="106680" rIns="142240" bIns="160020" numCol="1" spcCol="1270" anchor="t" anchorCtr="0">
-          <a:noAutofit/>
-        </a:bodyPr>
-        <a:lstStyle/>
-        <a:p>
-          <a:pPr marL="228600" lvl="1" indent="-228600" algn="l" defTabSz="889000">
-            <a:lnSpc>
-              <a:spcPct val="90000"/>
-            </a:lnSpc>
-            <a:spcBef>
-              <a:spcPct val="0"/>
-            </a:spcBef>
-            <a:spcAft>
-              <a:spcPct val="15000"/>
-            </a:spcAft>
-            <a:buChar char="••"/>
-          </a:pPr>
-          <a:r>
-            <a:rPr lang="de-DE" sz="2000" kern="1200" dirty="0" smtClean="0"/>
-            <a:t>Seitens der Universität:</a:t>
-          </a:r>
-        </a:p>
-        <a:p>
-          <a:pPr marL="457200" lvl="2" indent="-228600" algn="l" defTabSz="889000">
-            <a:lnSpc>
-              <a:spcPct val="90000"/>
-            </a:lnSpc>
-            <a:spcBef>
-              <a:spcPct val="0"/>
-            </a:spcBef>
-            <a:spcAft>
-              <a:spcPct val="15000"/>
-            </a:spcAft>
-            <a:buChar char="••"/>
-          </a:pPr>
-          <a:r>
-            <a:rPr lang="de-DE" sz="2000" kern="1200" dirty="0" smtClean="0"/>
-            <a:t>Informationspflicht (auch von Experten für spezifische Fragen) </a:t>
-          </a:r>
-          <a:r>
-            <a:rPr lang="de-DE" sz="2000" kern="1200" dirty="0" smtClean="0">
-              <a:sym typeface="Wingdings" pitchFamily="2" charset="2"/>
-            </a:rPr>
-            <a:t> ständiger Dialog</a:t>
-          </a:r>
-          <a:endParaRPr lang="de-DE" sz="2000" kern="1200" dirty="0" smtClean="0"/>
-        </a:p>
-        <a:p>
-          <a:pPr marL="457200" lvl="2" indent="-228600" algn="l" defTabSz="889000">
-            <a:lnSpc>
-              <a:spcPct val="90000"/>
-            </a:lnSpc>
-            <a:spcBef>
-              <a:spcPct val="0"/>
-            </a:spcBef>
-            <a:spcAft>
-              <a:spcPct val="15000"/>
-            </a:spcAft>
-            <a:buChar char="••"/>
-          </a:pPr>
-          <a:r>
-            <a:rPr lang="de-DE" sz="2000" kern="1200" dirty="0" smtClean="0"/>
-            <a:t>Datenbankservers</a:t>
-          </a:r>
-        </a:p>
-        <a:p>
-          <a:pPr marL="457200" lvl="2" indent="-228600" algn="l" defTabSz="889000">
-            <a:lnSpc>
-              <a:spcPct val="90000"/>
-            </a:lnSpc>
-            <a:spcBef>
-              <a:spcPct val="0"/>
-            </a:spcBef>
-            <a:spcAft>
-              <a:spcPct val="15000"/>
-            </a:spcAft>
-            <a:buChar char="••"/>
-          </a:pPr>
-          <a:r>
-            <a:rPr lang="de-DE" sz="2000" kern="1200" dirty="0" smtClean="0"/>
-            <a:t>Sonstige Daten einpflegen</a:t>
-          </a:r>
-        </a:p>
-        <a:p>
-          <a:pPr marL="228600" lvl="1" indent="-228600" algn="l" defTabSz="889000">
-            <a:lnSpc>
-              <a:spcPct val="90000"/>
-            </a:lnSpc>
-            <a:spcBef>
-              <a:spcPct val="0"/>
-            </a:spcBef>
-            <a:spcAft>
-              <a:spcPct val="15000"/>
-            </a:spcAft>
-            <a:buChar char="••"/>
-          </a:pPr>
-          <a:r>
-            <a:rPr lang="de-DE" sz="2000" kern="1200" dirty="0" smtClean="0"/>
-            <a:t>Seitens der SF GmbH:</a:t>
-          </a:r>
-        </a:p>
-        <a:p>
-          <a:pPr marL="457200" lvl="2" indent="-228600" algn="l" defTabSz="889000">
-            <a:lnSpc>
-              <a:spcPct val="90000"/>
-            </a:lnSpc>
-            <a:spcBef>
-              <a:spcPct val="0"/>
-            </a:spcBef>
-            <a:spcAft>
-              <a:spcPct val="15000"/>
-            </a:spcAft>
-            <a:buChar char="••"/>
-          </a:pPr>
-          <a:r>
-            <a:rPr lang="de-DE" sz="2000" kern="1200" dirty="0" smtClean="0"/>
-            <a:t>Benutzerhandbücher in elektronischer Form</a:t>
-          </a:r>
-        </a:p>
-        <a:p>
-          <a:pPr marL="457200" lvl="2" indent="-228600" algn="l" defTabSz="889000">
-            <a:lnSpc>
-              <a:spcPct val="90000"/>
-            </a:lnSpc>
-            <a:spcBef>
-              <a:spcPct val="0"/>
-            </a:spcBef>
-            <a:spcAft>
-              <a:spcPct val="15000"/>
-            </a:spcAft>
-            <a:buChar char="••"/>
-          </a:pPr>
-          <a:r>
-            <a:rPr lang="de-DE" sz="2000" kern="1200" dirty="0" smtClean="0"/>
-            <a:t>Entwicklung anhand des Wasserfallmodells</a:t>
-          </a:r>
-        </a:p>
-      </dsp:txBody>
-      <dsp:txXfrm>
-        <a:off x="3839" y="396925"/>
-        <a:ext cx="7855210" cy="2635199"/>
-      </dsp:txXfrm>
-    </dsp:sp>
   </dsp:spTree>
 </dsp:drawing>
 </file>
 
 <file path=ppt/diagrams/drawing6.xml><?xml version="1.0" encoding="utf-8"?>
-<dsp:drawing xmlns:dgm="http://schemas.openxmlformats.org/drawingml/2006/diagram" xmlns:dsp="http://schemas.microsoft.com/office/drawing/2008/diagram" xmlns:a="http://schemas.openxmlformats.org/drawingml/2006/main">
+<dsp:drawing xmlns:dgm="http://schemas.openxmlformats.org/drawingml/2006/diagram" xmlns:a="http://schemas.openxmlformats.org/drawingml/2006/main" xmlns:dsp="http://schemas.microsoft.com/office/drawing/2008/diagram">
   <dsp:spTree>
     <dsp:nvGrpSpPr>
       <dsp:cNvPr id="0" name=""/>
       <dsp:cNvGrpSpPr/>
     </dsp:nvGrpSpPr>
     <dsp:grpSpPr/>
-    <dsp:sp modelId="{023DA921-F375-4606-9BFC-271B8C03E20B}">
-      <dsp:nvSpPr>
-        <dsp:cNvPr id="0" name=""/>
-        <dsp:cNvSpPr/>
-      </dsp:nvSpPr>
-      <dsp:spPr>
-        <a:xfrm>
-          <a:off x="0" y="212709"/>
-          <a:ext cx="7888288" cy="608400"/>
-        </a:xfrm>
-        <a:prstGeom prst="roundRect">
-          <a:avLst/>
-        </a:prstGeom>
-        <a:solidFill>
-          <a:schemeClr val="lt1">
-            <a:hueOff val="0"/>
-            <a:satOff val="0"/>
-            <a:lumOff val="0"/>
-            <a:alphaOff val="0"/>
-          </a:schemeClr>
-        </a:solidFill>
-        <a:ln w="25400" cap="flat" cmpd="sng" algn="ctr">
-          <a:solidFill>
-            <a:schemeClr val="dk2">
-              <a:shade val="80000"/>
-              <a:hueOff val="0"/>
-              <a:satOff val="0"/>
-              <a:lumOff val="0"/>
-              <a:alphaOff val="0"/>
-            </a:schemeClr>
-          </a:solidFill>
-          <a:prstDash val="solid"/>
-        </a:ln>
-        <a:effectLst/>
-      </dsp:spPr>
-      <dsp:style>
-        <a:lnRef idx="2">
-          <a:scrgbClr r="0" g="0" b="0"/>
-        </a:lnRef>
-        <a:fillRef idx="1">
-          <a:scrgbClr r="0" g="0" b="0"/>
-        </a:fillRef>
-        <a:effectRef idx="0">
-          <a:scrgbClr r="0" g="0" b="0"/>
-        </a:effectRef>
-        <a:fontRef idx="minor">
-          <a:schemeClr val="lt1"/>
-        </a:fontRef>
-      </dsp:style>
-      <dsp:txBody>
-        <a:bodyPr spcFirstLastPara="0" vert="horz" wrap="square" lIns="99060" tIns="99060" rIns="99060" bIns="99060" numCol="1" spcCol="1270" anchor="ctr" anchorCtr="0">
-          <a:noAutofit/>
-        </a:bodyPr>
-        <a:lstStyle/>
-        <a:p>
-          <a:pPr lvl="0" algn="l" defTabSz="1155700">
-            <a:lnSpc>
-              <a:spcPct val="90000"/>
-            </a:lnSpc>
-            <a:spcBef>
-              <a:spcPct val="0"/>
-            </a:spcBef>
-            <a:spcAft>
-              <a:spcPct val="35000"/>
-            </a:spcAft>
-          </a:pPr>
-          <a:r>
-            <a:rPr lang="de-DE" sz="2600" kern="1200" dirty="0" smtClean="0"/>
-            <a:t>Gruppenorganisation</a:t>
-          </a:r>
-          <a:endParaRPr lang="de-DE" sz="2600" kern="1200" dirty="0"/>
-        </a:p>
-      </dsp:txBody>
-      <dsp:txXfrm>
-        <a:off x="29700" y="242409"/>
-        <a:ext cx="7828888" cy="549000"/>
-      </dsp:txXfrm>
-    </dsp:sp>
-    <dsp:sp modelId="{0026F19E-B0D6-4A6C-943D-6B47E28D1EB3}">
-      <dsp:nvSpPr>
-        <dsp:cNvPr id="0" name=""/>
-        <dsp:cNvSpPr/>
-      </dsp:nvSpPr>
-      <dsp:spPr>
-        <a:xfrm>
-          <a:off x="0" y="821109"/>
-          <a:ext cx="7888288" cy="995670"/>
-        </a:xfrm>
-        <a:prstGeom prst="rect">
-          <a:avLst/>
-        </a:prstGeom>
-        <a:noFill/>
-        <a:ln>
-          <a:noFill/>
-        </a:ln>
-        <a:effectLst/>
-      </dsp:spPr>
-      <dsp:style>
-        <a:lnRef idx="0">
-          <a:scrgbClr r="0" g="0" b="0"/>
-        </a:lnRef>
-        <a:fillRef idx="0">
-          <a:scrgbClr r="0" g="0" b="0"/>
-        </a:fillRef>
-        <a:effectRef idx="0">
-          <a:scrgbClr r="0" g="0" b="0"/>
-        </a:effectRef>
-        <a:fontRef idx="minor"/>
-      </dsp:style>
-      <dsp:txBody>
-        <a:bodyPr spcFirstLastPara="0" vert="horz" wrap="square" lIns="250453" tIns="33020" rIns="184912" bIns="33020" numCol="1" spcCol="1270" anchor="t" anchorCtr="0">
-          <a:noAutofit/>
-        </a:bodyPr>
-        <a:lstStyle/>
-        <a:p>
-          <a:pPr marL="228600" lvl="1" indent="-228600" algn="l" defTabSz="889000">
-            <a:lnSpc>
-              <a:spcPct val="90000"/>
-            </a:lnSpc>
-            <a:spcBef>
-              <a:spcPct val="0"/>
-            </a:spcBef>
-            <a:spcAft>
-              <a:spcPct val="20000"/>
-            </a:spcAft>
-            <a:buChar char="••"/>
-          </a:pPr>
-          <a:r>
-            <a:rPr lang="de-DE" sz="2000" kern="1200" dirty="0" smtClean="0"/>
-            <a:t>Aufteilung des Pflichtenhefts</a:t>
-          </a:r>
-          <a:endParaRPr lang="de-DE" sz="2000" kern="1200" dirty="0"/>
-        </a:p>
-        <a:p>
-          <a:pPr marL="228600" lvl="1" indent="-228600" algn="l" defTabSz="889000">
-            <a:lnSpc>
-              <a:spcPct val="90000"/>
-            </a:lnSpc>
-            <a:spcBef>
-              <a:spcPct val="0"/>
-            </a:spcBef>
-            <a:spcAft>
-              <a:spcPct val="20000"/>
-            </a:spcAft>
-            <a:buChar char="••"/>
-          </a:pPr>
-          <a:r>
-            <a:rPr lang="de-DE" sz="2000" kern="1200" dirty="0" smtClean="0"/>
-            <a:t>Aufteilung weiterer Aufgaben (GUI, MS Project)</a:t>
-          </a:r>
-          <a:endParaRPr lang="de-DE" sz="2000" kern="1200" dirty="0"/>
-        </a:p>
-        <a:p>
-          <a:pPr marL="228600" lvl="1" indent="-228600" algn="l" defTabSz="889000">
-            <a:lnSpc>
-              <a:spcPct val="90000"/>
-            </a:lnSpc>
-            <a:spcBef>
-              <a:spcPct val="0"/>
-            </a:spcBef>
-            <a:spcAft>
-              <a:spcPct val="20000"/>
-            </a:spcAft>
-            <a:buChar char="••"/>
-          </a:pPr>
-          <a:r>
-            <a:rPr lang="de-DE" sz="2000" kern="1200" dirty="0" smtClean="0"/>
-            <a:t>Gruppentreffen/Gruppen-Skype Dates zur Abstimmung</a:t>
-          </a:r>
-          <a:endParaRPr lang="de-DE" sz="2000" kern="1200" dirty="0"/>
-        </a:p>
-      </dsp:txBody>
-      <dsp:txXfrm>
-        <a:off x="0" y="821109"/>
-        <a:ext cx="7888288" cy="995670"/>
-      </dsp:txXfrm>
-    </dsp:sp>
-    <dsp:sp modelId="{C4492511-E5AA-4ABD-B23D-8C50809D4FE7}">
-      <dsp:nvSpPr>
-        <dsp:cNvPr id="0" name=""/>
-        <dsp:cNvSpPr/>
-      </dsp:nvSpPr>
-      <dsp:spPr>
-        <a:xfrm>
-          <a:off x="0" y="1816779"/>
-          <a:ext cx="7888288" cy="608400"/>
-        </a:xfrm>
-        <a:prstGeom prst="roundRect">
-          <a:avLst/>
-        </a:prstGeom>
-        <a:solidFill>
-          <a:schemeClr val="lt1">
-            <a:hueOff val="0"/>
-            <a:satOff val="0"/>
-            <a:lumOff val="0"/>
-            <a:alphaOff val="0"/>
-          </a:schemeClr>
-        </a:solidFill>
-        <a:ln w="25400" cap="flat" cmpd="sng" algn="ctr">
-          <a:solidFill>
-            <a:schemeClr val="dk2">
-              <a:shade val="80000"/>
-              <a:hueOff val="0"/>
-              <a:satOff val="0"/>
-              <a:lumOff val="0"/>
-              <a:alphaOff val="0"/>
-            </a:schemeClr>
-          </a:solidFill>
-          <a:prstDash val="solid"/>
-        </a:ln>
-        <a:effectLst/>
-      </dsp:spPr>
-      <dsp:style>
-        <a:lnRef idx="2">
-          <a:scrgbClr r="0" g="0" b="0"/>
-        </a:lnRef>
-        <a:fillRef idx="1">
-          <a:scrgbClr r="0" g="0" b="0"/>
-        </a:fillRef>
-        <a:effectRef idx="0">
-          <a:scrgbClr r="0" g="0" b="0"/>
-        </a:effectRef>
-        <a:fontRef idx="minor">
-          <a:schemeClr val="lt1"/>
-        </a:fontRef>
-      </dsp:style>
-      <dsp:txBody>
-        <a:bodyPr spcFirstLastPara="0" vert="horz" wrap="square" lIns="99060" tIns="99060" rIns="99060" bIns="99060" numCol="1" spcCol="1270" anchor="ctr" anchorCtr="0">
-          <a:noAutofit/>
-        </a:bodyPr>
-        <a:lstStyle/>
-        <a:p>
-          <a:pPr lvl="0" algn="l" defTabSz="1155700">
-            <a:lnSpc>
-              <a:spcPct val="90000"/>
-            </a:lnSpc>
-            <a:spcBef>
-              <a:spcPct val="0"/>
-            </a:spcBef>
-            <a:spcAft>
-              <a:spcPct val="35000"/>
-            </a:spcAft>
-          </a:pPr>
-          <a:r>
-            <a:rPr lang="de-DE" sz="2600" kern="1200" dirty="0" smtClean="0"/>
-            <a:t>Technische Werkzeuge</a:t>
-          </a:r>
-          <a:endParaRPr lang="de-DE" sz="2600" kern="1200" dirty="0"/>
-        </a:p>
-      </dsp:txBody>
-      <dsp:txXfrm>
-        <a:off x="29700" y="1846479"/>
-        <a:ext cx="7828888" cy="549000"/>
-      </dsp:txXfrm>
-    </dsp:sp>
-    <dsp:sp modelId="{721482F0-D801-4B67-A207-5B0B3EC5FF1E}">
-      <dsp:nvSpPr>
-        <dsp:cNvPr id="0" name=""/>
-        <dsp:cNvSpPr/>
-      </dsp:nvSpPr>
-      <dsp:spPr>
-        <a:xfrm>
-          <a:off x="0" y="2425179"/>
-          <a:ext cx="7888288" cy="1237860"/>
-        </a:xfrm>
-        <a:prstGeom prst="rect">
-          <a:avLst/>
-        </a:prstGeom>
-        <a:noFill/>
-        <a:ln>
-          <a:noFill/>
-        </a:ln>
-        <a:effectLst/>
-      </dsp:spPr>
-      <dsp:style>
-        <a:lnRef idx="0">
-          <a:scrgbClr r="0" g="0" b="0"/>
-        </a:lnRef>
-        <a:fillRef idx="0">
-          <a:scrgbClr r="0" g="0" b="0"/>
-        </a:fillRef>
-        <a:effectRef idx="0">
-          <a:scrgbClr r="0" g="0" b="0"/>
-        </a:effectRef>
-        <a:fontRef idx="minor"/>
-      </dsp:style>
-      <dsp:txBody>
-        <a:bodyPr spcFirstLastPara="0" vert="horz" wrap="square" lIns="250453" tIns="33020" rIns="184912" bIns="33020" numCol="1" spcCol="1270" anchor="t" anchorCtr="0">
-          <a:noAutofit/>
-        </a:bodyPr>
-        <a:lstStyle/>
-        <a:p>
-          <a:pPr marL="228600" lvl="1" indent="-228600" algn="l" defTabSz="889000">
-            <a:lnSpc>
-              <a:spcPct val="90000"/>
-            </a:lnSpc>
-            <a:spcBef>
-              <a:spcPct val="0"/>
-            </a:spcBef>
-            <a:spcAft>
-              <a:spcPct val="20000"/>
-            </a:spcAft>
-            <a:buChar char="••"/>
-          </a:pPr>
-          <a:r>
-            <a:rPr lang="de-DE" sz="2000" kern="1200" dirty="0" smtClean="0"/>
-            <a:t>Kommunikation: Handy, Skype, </a:t>
-          </a:r>
-          <a:r>
-            <a:rPr lang="de-DE" sz="2000" kern="1200" dirty="0" err="1" smtClean="0"/>
-            <a:t>Whatsapp</a:t>
-          </a:r>
-          <a:endParaRPr lang="de-DE" sz="2000" kern="1200" dirty="0"/>
-        </a:p>
-        <a:p>
-          <a:pPr marL="228600" lvl="1" indent="-228600" algn="l" defTabSz="889000">
-            <a:lnSpc>
-              <a:spcPct val="90000"/>
-            </a:lnSpc>
-            <a:spcBef>
-              <a:spcPct val="0"/>
-            </a:spcBef>
-            <a:spcAft>
-              <a:spcPct val="20000"/>
-            </a:spcAft>
-            <a:buChar char="••"/>
-          </a:pPr>
-          <a:r>
-            <a:rPr lang="de-DE" sz="2000" kern="1200" dirty="0" smtClean="0"/>
-            <a:t>Abstimmung/Teamarbeit: </a:t>
-          </a:r>
-          <a:r>
-            <a:rPr lang="de-DE" sz="2000" kern="1200" dirty="0" err="1" smtClean="0"/>
-            <a:t>TortoiseSVN</a:t>
-          </a:r>
-          <a:r>
-            <a:rPr lang="de-DE" sz="2000" kern="1200" dirty="0" smtClean="0"/>
-            <a:t>, </a:t>
-          </a:r>
-          <a:r>
-            <a:rPr lang="de-DE" sz="2000" kern="1200" dirty="0" err="1" smtClean="0"/>
-            <a:t>Dropbox</a:t>
-          </a:r>
-          <a:r>
-            <a:rPr lang="de-DE" sz="2000" kern="1200" dirty="0" smtClean="0"/>
-            <a:t>, </a:t>
-          </a:r>
-          <a:r>
-            <a:rPr lang="de-DE" sz="2000" kern="1200" dirty="0" err="1" smtClean="0"/>
-            <a:t>GoogleDocs</a:t>
-          </a:r>
-          <a:endParaRPr lang="de-DE" sz="2000" kern="1200" dirty="0"/>
-        </a:p>
-        <a:p>
-          <a:pPr marL="228600" lvl="1" indent="-228600" algn="l" defTabSz="889000">
-            <a:lnSpc>
-              <a:spcPct val="90000"/>
-            </a:lnSpc>
-            <a:spcBef>
-              <a:spcPct val="0"/>
-            </a:spcBef>
-            <a:spcAft>
-              <a:spcPct val="20000"/>
-            </a:spcAft>
-            <a:buChar char="••"/>
-          </a:pPr>
-          <a:r>
-            <a:rPr lang="de-DE" sz="2000" kern="1200" dirty="0" smtClean="0"/>
-            <a:t>Entwicklung/Ausarbeitung: </a:t>
-          </a:r>
-          <a:r>
-            <a:rPr lang="de-DE" sz="2000" kern="1200" dirty="0" err="1" smtClean="0"/>
-            <a:t>Eclipse</a:t>
-          </a:r>
-          <a:r>
-            <a:rPr lang="de-DE" sz="2000" kern="1200" dirty="0" smtClean="0"/>
-            <a:t> (</a:t>
-          </a:r>
-          <a:r>
-            <a:rPr lang="de-DE" sz="2000" kern="1200" dirty="0" err="1" smtClean="0"/>
-            <a:t>Window</a:t>
-          </a:r>
-          <a:r>
-            <a:rPr lang="de-DE" sz="2000" kern="1200" dirty="0" smtClean="0"/>
-            <a:t> </a:t>
-          </a:r>
-          <a:r>
-            <a:rPr lang="de-DE" sz="2000" kern="1200" dirty="0" err="1" smtClean="0"/>
-            <a:t>Builder</a:t>
-          </a:r>
-          <a:r>
-            <a:rPr lang="de-DE" sz="2000" kern="1200" dirty="0" smtClean="0"/>
-            <a:t>), </a:t>
-          </a:r>
-          <a:r>
-            <a:rPr lang="de-DE" sz="2000" kern="1200" dirty="0" err="1" smtClean="0"/>
-            <a:t>LaTex</a:t>
-          </a:r>
-          <a:r>
-            <a:rPr lang="de-DE" sz="2000" kern="1200" dirty="0" smtClean="0"/>
-            <a:t>, </a:t>
-          </a:r>
-          <a:r>
-            <a:rPr lang="de-DE" sz="2000" kern="1200" dirty="0" err="1" smtClean="0"/>
-            <a:t>MSProject</a:t>
-          </a:r>
-          <a:r>
-            <a:rPr lang="de-DE" sz="2000" kern="1200" dirty="0" smtClean="0"/>
-            <a:t>, </a:t>
-          </a:r>
-          <a:r>
-            <a:rPr lang="de-DE" sz="2000" kern="1200" dirty="0" err="1" smtClean="0"/>
-            <a:t>MSPowerPoint</a:t>
-          </a:r>
-          <a:r>
-            <a:rPr lang="de-DE" sz="2000" kern="1200" dirty="0" smtClean="0"/>
-            <a:t> </a:t>
-          </a:r>
-          <a:endParaRPr lang="de-DE" sz="2000" kern="1200" dirty="0"/>
-        </a:p>
-      </dsp:txBody>
-      <dsp:txXfrm>
-        <a:off x="0" y="2425179"/>
-        <a:ext cx="7888288" cy="1237860"/>
-      </dsp:txXfrm>
-    </dsp:sp>
-    <dsp:sp modelId="{D08F9FAB-9CBE-4AEF-93AA-47F52A25FF42}">
-      <dsp:nvSpPr>
-        <dsp:cNvPr id="0" name=""/>
-        <dsp:cNvSpPr/>
-      </dsp:nvSpPr>
-      <dsp:spPr>
-        <a:xfrm>
-          <a:off x="0" y="3663039"/>
-          <a:ext cx="7888288" cy="608400"/>
-        </a:xfrm>
-        <a:prstGeom prst="roundRect">
-          <a:avLst/>
-        </a:prstGeom>
-        <a:solidFill>
-          <a:schemeClr val="lt1">
-            <a:hueOff val="0"/>
-            <a:satOff val="0"/>
-            <a:lumOff val="0"/>
-            <a:alphaOff val="0"/>
-          </a:schemeClr>
-        </a:solidFill>
-        <a:ln w="25400" cap="flat" cmpd="sng" algn="ctr">
-          <a:solidFill>
-            <a:schemeClr val="dk2">
-              <a:shade val="80000"/>
-              <a:hueOff val="0"/>
-              <a:satOff val="0"/>
-              <a:lumOff val="0"/>
-              <a:alphaOff val="0"/>
-            </a:schemeClr>
-          </a:solidFill>
-          <a:prstDash val="solid"/>
-        </a:ln>
-        <a:effectLst/>
-      </dsp:spPr>
-      <dsp:style>
-        <a:lnRef idx="2">
-          <a:scrgbClr r="0" g="0" b="0"/>
-        </a:lnRef>
-        <a:fillRef idx="1">
-          <a:scrgbClr r="0" g="0" b="0"/>
-        </a:fillRef>
-        <a:effectRef idx="0">
-          <a:scrgbClr r="0" g="0" b="0"/>
-        </a:effectRef>
-        <a:fontRef idx="minor">
-          <a:schemeClr val="lt1"/>
-        </a:fontRef>
-      </dsp:style>
-      <dsp:txBody>
-        <a:bodyPr spcFirstLastPara="0" vert="horz" wrap="square" lIns="99060" tIns="99060" rIns="99060" bIns="99060" numCol="1" spcCol="1270" anchor="ctr" anchorCtr="0">
-          <a:noAutofit/>
-        </a:bodyPr>
-        <a:lstStyle/>
-        <a:p>
-          <a:pPr lvl="0" algn="l" defTabSz="1155700">
-            <a:lnSpc>
-              <a:spcPct val="90000"/>
-            </a:lnSpc>
-            <a:spcBef>
-              <a:spcPct val="0"/>
-            </a:spcBef>
-            <a:spcAft>
-              <a:spcPct val="35000"/>
-            </a:spcAft>
-          </a:pPr>
-          <a:r>
-            <a:rPr lang="de-DE" sz="2600" kern="1200" dirty="0" smtClean="0"/>
-            <a:t>Erfahrungen</a:t>
-          </a:r>
-          <a:endParaRPr lang="de-DE" sz="2600" kern="1200" dirty="0"/>
-        </a:p>
-      </dsp:txBody>
-      <dsp:txXfrm>
-        <a:off x="29700" y="3692739"/>
-        <a:ext cx="7828888" cy="549000"/>
-      </dsp:txXfrm>
-    </dsp:sp>
-    <dsp:sp modelId="{45E1BD41-C25F-49BE-856B-DA67C6CE395A}">
-      <dsp:nvSpPr>
-        <dsp:cNvPr id="0" name=""/>
-        <dsp:cNvSpPr/>
-      </dsp:nvSpPr>
-      <dsp:spPr>
-        <a:xfrm>
-          <a:off x="0" y="4271439"/>
-          <a:ext cx="7888288" cy="914940"/>
-        </a:xfrm>
-        <a:prstGeom prst="rect">
-          <a:avLst/>
-        </a:prstGeom>
-        <a:noFill/>
-        <a:ln>
-          <a:noFill/>
-        </a:ln>
-        <a:effectLst/>
-      </dsp:spPr>
-      <dsp:style>
-        <a:lnRef idx="0">
-          <a:scrgbClr r="0" g="0" b="0"/>
-        </a:lnRef>
-        <a:fillRef idx="0">
-          <a:scrgbClr r="0" g="0" b="0"/>
-        </a:fillRef>
-        <a:effectRef idx="0">
-          <a:scrgbClr r="0" g="0" b="0"/>
-        </a:effectRef>
-        <a:fontRef idx="minor"/>
-      </dsp:style>
-      <dsp:txBody>
-        <a:bodyPr spcFirstLastPara="0" vert="horz" wrap="square" lIns="250453" tIns="33020" rIns="184912" bIns="33020" numCol="1" spcCol="1270" anchor="t" anchorCtr="0">
-          <a:noAutofit/>
-        </a:bodyPr>
-        <a:lstStyle/>
-        <a:p>
-          <a:pPr marL="228600" lvl="1" indent="-228600" algn="l" defTabSz="889000">
-            <a:lnSpc>
-              <a:spcPct val="90000"/>
-            </a:lnSpc>
-            <a:spcBef>
-              <a:spcPct val="0"/>
-            </a:spcBef>
-            <a:spcAft>
-              <a:spcPct val="20000"/>
-            </a:spcAft>
-            <a:buChar char="••"/>
-          </a:pPr>
-          <a:r>
-            <a:rPr lang="de-DE" sz="2000" kern="1200" dirty="0" smtClean="0"/>
-            <a:t>Unterschiedliche Erfahrungs- und Kenntnisstände</a:t>
-          </a:r>
-          <a:endParaRPr lang="de-DE" sz="2000" kern="1200" dirty="0"/>
-        </a:p>
-        <a:p>
-          <a:pPr marL="228600" lvl="1" indent="-228600" algn="l" defTabSz="889000">
-            <a:lnSpc>
-              <a:spcPct val="90000"/>
-            </a:lnSpc>
-            <a:spcBef>
-              <a:spcPct val="0"/>
-            </a:spcBef>
-            <a:spcAft>
-              <a:spcPct val="20000"/>
-            </a:spcAft>
-            <a:buChar char="••"/>
-          </a:pPr>
-          <a:r>
-            <a:rPr lang="de-DE" sz="2000" kern="1200" dirty="0" smtClean="0"/>
-            <a:t>Technische Probleme (</a:t>
-          </a:r>
-          <a:r>
-            <a:rPr lang="de-DE" sz="2000" kern="1200" dirty="0" err="1" smtClean="0"/>
-            <a:t>MikTex</a:t>
-          </a:r>
-          <a:r>
-            <a:rPr lang="de-DE" sz="2000" kern="1200" dirty="0" smtClean="0"/>
-            <a:t>, SVN) vor allem bei der Gruppenbearbeitung</a:t>
-          </a:r>
-          <a:endParaRPr lang="de-DE" sz="2000" kern="1200" dirty="0"/>
-        </a:p>
-      </dsp:txBody>
-      <dsp:txXfrm>
-        <a:off x="0" y="4271439"/>
-        <a:ext cx="7888288" cy="914940"/>
-      </dsp:txXfrm>
-    </dsp:sp>
   </dsp:spTree>
 </dsp:drawing>
 </file>
@@ -18991,7 +17063,7 @@
     </p:spTree>
     <p:extLst>
       <p:ext uri="{BB962C8B-B14F-4D97-AF65-F5344CB8AC3E}">
-        <p14:creationId xmlns:p14="http://schemas.microsoft.com/office/powerpoint/2010/main" val="4009446347"/>
+        <p14:creationId xmlns:p14="http://schemas.microsoft.com/office/powerpoint/2010/main" xmlns="" val="4009446347"/>
       </p:ext>
     </p:extLst>
   </p:cSld>
@@ -19345,7 +17417,7 @@
     </p:spTree>
     <p:extLst>
       <p:ext uri="{BB962C8B-B14F-4D97-AF65-F5344CB8AC3E}">
-        <p14:creationId xmlns:p14="http://schemas.microsoft.com/office/powerpoint/2010/main" val="1641019796"/>
+        <p14:creationId xmlns:p14="http://schemas.microsoft.com/office/powerpoint/2010/main" xmlns="" val="1641019796"/>
       </p:ext>
     </p:extLst>
   </p:cSld>
@@ -23133,7 +21205,7 @@
     </p:spTree>
     <p:extLst>
       <p:ext uri="{BB962C8B-B14F-4D97-AF65-F5344CB8AC3E}">
-        <p14:creationId xmlns:p14="http://schemas.microsoft.com/office/powerpoint/2010/main" val="3943676473"/>
+        <p14:creationId xmlns:p14="http://schemas.microsoft.com/office/powerpoint/2010/main" xmlns="" val="3943676473"/>
       </p:ext>
     </p:extLst>
   </p:cSld>
@@ -23961,7 +22033,7 @@
     </p:spTree>
     <p:extLst>
       <p:ext uri="{BB962C8B-B14F-4D97-AF65-F5344CB8AC3E}">
-        <p14:creationId xmlns:p14="http://schemas.microsoft.com/office/powerpoint/2010/main" val="3943676473"/>
+        <p14:creationId xmlns:p14="http://schemas.microsoft.com/office/powerpoint/2010/main" xmlns="" val="3943676473"/>
       </p:ext>
     </p:extLst>
   </p:cSld>
@@ -24779,7 +22851,7 @@
     </p:spTree>
     <p:extLst>
       <p:ext uri="{BB962C8B-B14F-4D97-AF65-F5344CB8AC3E}">
-        <p14:creationId xmlns:p14="http://schemas.microsoft.com/office/powerpoint/2010/main" val="3751893185"/>
+        <p14:creationId xmlns:p14="http://schemas.microsoft.com/office/powerpoint/2010/main" xmlns="" val="3751893185"/>
       </p:ext>
     </p:extLst>
   </p:cSld>
@@ -25566,7 +23638,7 @@
     </p:spTree>
     <p:extLst>
       <p:ext uri="{BB962C8B-B14F-4D97-AF65-F5344CB8AC3E}">
-        <p14:creationId xmlns:p14="http://schemas.microsoft.com/office/powerpoint/2010/main" val="3751893185"/>
+        <p14:creationId xmlns:p14="http://schemas.microsoft.com/office/powerpoint/2010/main" xmlns="" val="3751893185"/>
       </p:ext>
     </p:extLst>
   </p:cSld>
@@ -26384,7 +24456,7 @@
     </p:spTree>
     <p:extLst>
       <p:ext uri="{BB962C8B-B14F-4D97-AF65-F5344CB8AC3E}">
-        <p14:creationId xmlns:p14="http://schemas.microsoft.com/office/powerpoint/2010/main" val="3751893185"/>
+        <p14:creationId xmlns:p14="http://schemas.microsoft.com/office/powerpoint/2010/main" xmlns="" val="3751893185"/>
       </p:ext>
     </p:extLst>
   </p:cSld>
@@ -27192,7 +25264,7 @@
     </p:spTree>
     <p:extLst>
       <p:ext uri="{BB962C8B-B14F-4D97-AF65-F5344CB8AC3E}">
-        <p14:creationId xmlns:p14="http://schemas.microsoft.com/office/powerpoint/2010/main" val="3751893185"/>
+        <p14:creationId xmlns:p14="http://schemas.microsoft.com/office/powerpoint/2010/main" xmlns="" val="3751893185"/>
       </p:ext>
     </p:extLst>
   </p:cSld>
@@ -27989,7 +26061,7 @@
     </p:spTree>
     <p:extLst>
       <p:ext uri="{BB962C8B-B14F-4D97-AF65-F5344CB8AC3E}">
-        <p14:creationId xmlns:p14="http://schemas.microsoft.com/office/powerpoint/2010/main" val="1502012764"/>
+        <p14:creationId xmlns:p14="http://schemas.microsoft.com/office/powerpoint/2010/main" xmlns="" val="1502012764"/>
       </p:ext>
     </p:extLst>
   </p:cSld>
@@ -29059,7 +27131,7 @@
             </a:clrChange>
             <a:extLst>
               <a:ext uri="{28A0092B-C50C-407E-A947-70E740481C1C}">
-                <a14:useLocalDpi xmlns:a14="http://schemas.microsoft.com/office/drawing/2010/main" val="0"/>
+                <a14:useLocalDpi xmlns:a14="http://schemas.microsoft.com/office/drawing/2010/main" xmlns="" val="0"/>
               </a:ext>
             </a:extLst>
           </a:blip>
@@ -29079,7 +27151,7 @@
           <a:noFill/>
           <a:extLst>
             <a:ext uri="{909E8E84-426E-40DD-AFC4-6F175D3DCCD1}">
-              <a14:hiddenFill xmlns:a14="http://schemas.microsoft.com/office/drawing/2010/main">
+              <a14:hiddenFill xmlns:a14="http://schemas.microsoft.com/office/drawing/2010/main" xmlns="">
                 <a:solidFill>
                   <a:srgbClr val="FFFFFF"/>
                 </a:solidFill>
@@ -29309,7 +27381,7 @@
             </a:clrChange>
             <a:extLst>
               <a:ext uri="{28A0092B-C50C-407E-A947-70E740481C1C}">
-                <a14:useLocalDpi xmlns:a14="http://schemas.microsoft.com/office/drawing/2010/main" val="0"/>
+                <a14:useLocalDpi xmlns:a14="http://schemas.microsoft.com/office/drawing/2010/main" xmlns="" val="0"/>
               </a:ext>
             </a:extLst>
           </a:blip>
@@ -29329,7 +27401,7 @@
           <a:noFill/>
           <a:extLst>
             <a:ext uri="{909E8E84-426E-40DD-AFC4-6F175D3DCCD1}">
-              <a14:hiddenFill xmlns:a14="http://schemas.microsoft.com/office/drawing/2010/main">
+              <a14:hiddenFill xmlns:a14="http://schemas.microsoft.com/office/drawing/2010/main" xmlns="">
                 <a:solidFill>
                   <a:srgbClr val="FFFFFF"/>
                 </a:solidFill>
@@ -29357,7 +27429,7 @@
             </a:duotone>
             <a:extLst>
               <a:ext uri="{28A0092B-C50C-407E-A947-70E740481C1C}">
-                <a14:useLocalDpi xmlns:a14="http://schemas.microsoft.com/office/drawing/2010/main" val="0"/>
+                <a14:useLocalDpi xmlns:a14="http://schemas.microsoft.com/office/drawing/2010/main" xmlns="" val="0"/>
               </a:ext>
             </a:extLst>
           </a:blip>
@@ -29377,7 +27449,7 @@
           <a:noFill/>
           <a:extLst>
             <a:ext uri="{909E8E84-426E-40DD-AFC4-6F175D3DCCD1}">
-              <a14:hiddenFill xmlns:a14="http://schemas.microsoft.com/office/drawing/2010/main">
+              <a14:hiddenFill xmlns:a14="http://schemas.microsoft.com/office/drawing/2010/main" xmlns="">
                 <a:solidFill>
                   <a:srgbClr val="FFFFFF"/>
                 </a:solidFill>
@@ -29405,7 +27477,7 @@
             </a:duotone>
             <a:extLst>
               <a:ext uri="{28A0092B-C50C-407E-A947-70E740481C1C}">
-                <a14:useLocalDpi xmlns:a14="http://schemas.microsoft.com/office/drawing/2010/main" val="0"/>
+                <a14:useLocalDpi xmlns:a14="http://schemas.microsoft.com/office/drawing/2010/main" xmlns="" val="0"/>
               </a:ext>
             </a:extLst>
           </a:blip>
@@ -29425,7 +27497,7 @@
           <a:noFill/>
           <a:extLst>
             <a:ext uri="{909E8E84-426E-40DD-AFC4-6F175D3DCCD1}">
-              <a14:hiddenFill xmlns:a14="http://schemas.microsoft.com/office/drawing/2010/main">
+              <a14:hiddenFill xmlns:a14="http://schemas.microsoft.com/office/drawing/2010/main" xmlns="">
                 <a:solidFill>
                   <a:srgbClr val="FFFFFF"/>
                 </a:solidFill>
@@ -29446,7 +27518,7 @@
           <a:blip r:embed="rId5" cstate="print">
             <a:extLst>
               <a:ext uri="{28A0092B-C50C-407E-A947-70E740481C1C}">
-                <a14:useLocalDpi xmlns:a14="http://schemas.microsoft.com/office/drawing/2010/main" val="0"/>
+                <a14:useLocalDpi xmlns:a14="http://schemas.microsoft.com/office/drawing/2010/main" xmlns="" val="0"/>
               </a:ext>
             </a:extLst>
           </a:blip>
@@ -29466,7 +27538,7 @@
           <a:noFill/>
           <a:extLst>
             <a:ext uri="{909E8E84-426E-40DD-AFC4-6F175D3DCCD1}">
-              <a14:hiddenFill xmlns:a14="http://schemas.microsoft.com/office/drawing/2010/main">
+              <a14:hiddenFill xmlns:a14="http://schemas.microsoft.com/office/drawing/2010/main" xmlns="">
                 <a:solidFill>
                   <a:srgbClr val="FFFFFF"/>
                 </a:solidFill>
@@ -29577,7 +27649,7 @@
           <a:blip r:embed="rId2" cstate="print">
             <a:extLst>
               <a:ext uri="{28A0092B-C50C-407E-A947-70E740481C1C}">
-                <a14:useLocalDpi xmlns:a14="http://schemas.microsoft.com/office/drawing/2010/main" val="0"/>
+                <a14:useLocalDpi xmlns:a14="http://schemas.microsoft.com/office/drawing/2010/main" xmlns="" val="0"/>
               </a:ext>
             </a:extLst>
           </a:blip>
@@ -29597,7 +27669,7 @@
           <a:noFill/>
           <a:extLst>
             <a:ext uri="{909E8E84-426E-40DD-AFC4-6F175D3DCCD1}">
-              <a14:hiddenFill xmlns:a14="http://schemas.microsoft.com/office/drawing/2010/main">
+              <a14:hiddenFill xmlns:a14="http://schemas.microsoft.com/office/drawing/2010/main" xmlns="">
                 <a:solidFill>
                   <a:srgbClr val="FFFFFF"/>
                 </a:solidFill>
@@ -29985,7 +28057,7 @@
           <a:noFill/>
           <a:extLst>
             <a:ext uri="{909E8E84-426E-40DD-AFC4-6F175D3DCCD1}">
-              <a14:hiddenFill xmlns:a14="http://schemas.microsoft.com/office/drawing/2010/main">
+              <a14:hiddenFill xmlns:a14="http://schemas.microsoft.com/office/drawing/2010/main" xmlns="">
                 <a:solidFill>
                   <a:srgbClr val="FFFFFF"/>
                 </a:solidFill>
@@ -30155,7 +28227,7 @@
     </p:spTree>
     <p:extLst>
       <p:ext uri="{BB962C8B-B14F-4D97-AF65-F5344CB8AC3E}">
-        <p14:creationId xmlns:p14="http://schemas.microsoft.com/office/powerpoint/2010/main" val="272805048"/>
+        <p14:creationId xmlns:p14="http://schemas.microsoft.com/office/powerpoint/2010/main" xmlns="" val="272805048"/>
       </p:ext>
     </p:extLst>
   </p:cSld>
@@ -30284,7 +28356,7 @@
           <a:noFill/>
           <a:extLst>
             <a:ext uri="{909E8E84-426E-40DD-AFC4-6F175D3DCCD1}">
-              <a14:hiddenFill xmlns:a14="http://schemas.microsoft.com/office/drawing/2010/main">
+              <a14:hiddenFill xmlns:a14="http://schemas.microsoft.com/office/drawing/2010/main" xmlns="">
                 <a:solidFill>
                   <a:srgbClr val="FFFFFF"/>
                 </a:solidFill>
@@ -30689,10 +28761,10 @@
           <p:nvPr/>
         </p:nvPicPr>
         <p:blipFill rotWithShape="1">
-          <a:blip r:embed="rId3">
+          <a:blip r:embed="rId3" cstate="print">
             <a:extLst>
               <a:ext uri="{28A0092B-C50C-407E-A947-70E740481C1C}">
-                <a14:useLocalDpi xmlns:a14="http://schemas.microsoft.com/office/drawing/2010/main" val="0"/>
+                <a14:useLocalDpi xmlns:a14="http://schemas.microsoft.com/office/drawing/2010/main" xmlns="" val="0"/>
               </a:ext>
             </a:extLst>
           </a:blip>
@@ -30710,7 +28782,7 @@
           <a:noFill/>
           <a:extLst>
             <a:ext uri="{909E8E84-426E-40DD-AFC4-6F175D3DCCD1}">
-              <a14:hiddenFill xmlns:a14="http://schemas.microsoft.com/office/drawing/2010/main">
+              <a14:hiddenFill xmlns:a14="http://schemas.microsoft.com/office/drawing/2010/main" xmlns="">
                 <a:solidFill>
                   <a:srgbClr val="FFFFFF"/>
                 </a:solidFill>
@@ -30874,7 +28946,7 @@
           <a:noFill/>
           <a:extLst>
             <a:ext uri="{909E8E84-426E-40DD-AFC4-6F175D3DCCD1}">
-              <a14:hiddenFill xmlns:a14="http://schemas.microsoft.com/office/drawing/2010/main">
+              <a14:hiddenFill xmlns:a14="http://schemas.microsoft.com/office/drawing/2010/main" xmlns="">
                 <a:solidFill>
                   <a:srgbClr val="FFFFFF"/>
                 </a:solidFill>
@@ -31111,7 +29183,7 @@
     </p:spTree>
     <p:extLst>
       <p:ext uri="{BB962C8B-B14F-4D97-AF65-F5344CB8AC3E}">
-        <p14:creationId xmlns:p14="http://schemas.microsoft.com/office/powerpoint/2010/main" val="4028831541"/>
+        <p14:creationId xmlns:p14="http://schemas.microsoft.com/office/powerpoint/2010/main" xmlns="" val="4028831541"/>
       </p:ext>
     </p:extLst>
   </p:cSld>
@@ -32240,10 +30312,10 @@
             <p:nvPr/>
           </p:nvPicPr>
           <p:blipFill>
-            <a:blip r:embed="rId2">
+            <a:blip r:embed="rId2" cstate="print">
               <a:extLst>
                 <a:ext uri="{28A0092B-C50C-407E-A947-70E740481C1C}">
-                  <a14:useLocalDpi xmlns:a14="http://schemas.microsoft.com/office/drawing/2010/main" val="0"/>
+                  <a14:useLocalDpi xmlns:a14="http://schemas.microsoft.com/office/drawing/2010/main" xmlns="" val="0"/>
                 </a:ext>
               </a:extLst>
             </a:blip>
@@ -32539,10 +30611,10 @@
             <p:nvPr/>
           </p:nvPicPr>
           <p:blipFill>
-            <a:blip r:embed="rId3">
+            <a:blip r:embed="rId3" cstate="print">
               <a:extLst>
                 <a:ext uri="{28A0092B-C50C-407E-A947-70E740481C1C}">
-                  <a14:useLocalDpi xmlns:a14="http://schemas.microsoft.com/office/drawing/2010/main" val="0"/>
+                  <a14:useLocalDpi xmlns:a14="http://schemas.microsoft.com/office/drawing/2010/main" xmlns="" val="0"/>
                 </a:ext>
               </a:extLst>
             </a:blip>
@@ -32647,10 +30719,10 @@
             <p:nvPr/>
           </p:nvPicPr>
           <p:blipFill>
-            <a:blip r:embed="rId4">
+            <a:blip r:embed="rId4" cstate="print">
               <a:extLst>
                 <a:ext uri="{28A0092B-C50C-407E-A947-70E740481C1C}">
-                  <a14:useLocalDpi xmlns:a14="http://schemas.microsoft.com/office/drawing/2010/main" val="0"/>
+                  <a14:useLocalDpi xmlns:a14="http://schemas.microsoft.com/office/drawing/2010/main" xmlns="" val="0"/>
                 </a:ext>
               </a:extLst>
             </a:blip>
@@ -32938,10 +31010,10 @@
             <p:nvPr/>
           </p:nvPicPr>
           <p:blipFill>
-            <a:blip r:embed="rId5">
+            <a:blip r:embed="rId5" cstate="print">
               <a:extLst>
                 <a:ext uri="{28A0092B-C50C-407E-A947-70E740481C1C}">
-                  <a14:useLocalDpi xmlns:a14="http://schemas.microsoft.com/office/drawing/2010/main" val="0"/>
+                  <a14:useLocalDpi xmlns:a14="http://schemas.microsoft.com/office/drawing/2010/main" xmlns="" val="0"/>
                 </a:ext>
               </a:extLst>
             </a:blip>
@@ -33115,10 +31187,10 @@
           <p:nvPr/>
         </p:nvPicPr>
         <p:blipFill>
-          <a:blip r:embed="rId6">
+          <a:blip r:embed="rId6" cstate="print">
             <a:extLst>
               <a:ext uri="{28A0092B-C50C-407E-A947-70E740481C1C}">
-                <a14:useLocalDpi xmlns:a14="http://schemas.microsoft.com/office/drawing/2010/main" val="0"/>
+                <a14:useLocalDpi xmlns:a14="http://schemas.microsoft.com/office/drawing/2010/main" xmlns="" val="0"/>
               </a:ext>
             </a:extLst>
           </a:blip>
@@ -33382,7 +31454,7 @@
     </p:spTree>
     <p:extLst>
       <p:ext uri="{BB962C8B-B14F-4D97-AF65-F5344CB8AC3E}">
-        <p14:creationId xmlns:p14="http://schemas.microsoft.com/office/powerpoint/2010/main" val="4004833020"/>
+        <p14:creationId xmlns:p14="http://schemas.microsoft.com/office/powerpoint/2010/main" xmlns="" val="4004833020"/>
       </p:ext>
     </p:extLst>
   </p:cSld>
@@ -34612,7 +32684,7 @@
     </p:spTree>
     <p:extLst>
       <p:ext uri="{BB962C8B-B14F-4D97-AF65-F5344CB8AC3E}">
-        <p14:creationId xmlns:p14="http://schemas.microsoft.com/office/powerpoint/2010/main" val="526066225"/>
+        <p14:creationId xmlns:p14="http://schemas.microsoft.com/office/powerpoint/2010/main" xmlns="" val="526066225"/>
       </p:ext>
     </p:extLst>
   </p:cSld>
@@ -34794,7 +32866,7 @@
           <p:nvPr>
             <p:extLst>
               <p:ext uri="{D42A27DB-BD31-4B8C-83A1-F6EECF244321}">
-                <p14:modId xmlns:p14="http://schemas.microsoft.com/office/powerpoint/2010/main" val="3801044247"/>
+                <p14:modId xmlns:p14="http://schemas.microsoft.com/office/powerpoint/2010/main" xmlns="" val="3801044247"/>
               </p:ext>
             </p:extLst>
           </p:nvPr>
@@ -35784,7 +33856,7 @@
             <p:ph idx="1"/>
             <p:extLst>
               <p:ext uri="{D42A27DB-BD31-4B8C-83A1-F6EECF244321}">
-                <p14:modId xmlns:p14="http://schemas.microsoft.com/office/powerpoint/2010/main" val="1687333463"/>
+                <p14:modId xmlns:p14="http://schemas.microsoft.com/office/powerpoint/2010/main" xmlns="" val="1687333463"/>
               </p:ext>
             </p:extLst>
           </p:nvPr>
@@ -35834,7 +33906,7 @@
     </p:spTree>
     <p:extLst>
       <p:ext uri="{BB962C8B-B14F-4D97-AF65-F5344CB8AC3E}">
-        <p14:creationId xmlns:p14="http://schemas.microsoft.com/office/powerpoint/2010/main" val="2488400954"/>
+        <p14:creationId xmlns:p14="http://schemas.microsoft.com/office/powerpoint/2010/main" xmlns="" val="2488400954"/>
       </p:ext>
     </p:extLst>
   </p:cSld>
@@ -36005,7 +34077,7 @@
           <p:nvPr>
             <p:extLst>
               <p:ext uri="{D42A27DB-BD31-4B8C-83A1-F6EECF244321}">
-                <p14:modId xmlns:p14="http://schemas.microsoft.com/office/powerpoint/2010/main" val="87723924"/>
+                <p14:modId xmlns:p14="http://schemas.microsoft.com/office/powerpoint/2010/main" xmlns="" val="87723924"/>
               </p:ext>
             </p:extLst>
           </p:nvPr>
@@ -36349,7 +34421,7 @@
     </p:spTree>
     <p:extLst>
       <p:ext uri="{BB962C8B-B14F-4D97-AF65-F5344CB8AC3E}">
-        <p14:creationId xmlns:p14="http://schemas.microsoft.com/office/powerpoint/2010/main" val="3000389116"/>
+        <p14:creationId xmlns:p14="http://schemas.microsoft.com/office/powerpoint/2010/main" xmlns="" val="3000389116"/>
       </p:ext>
     </p:extLst>
   </p:cSld>
@@ -36813,7 +34885,7 @@
             </a:clrChange>
             <a:extLst>
               <a:ext uri="{28A0092B-C50C-407E-A947-70E740481C1C}">
-                <a14:useLocalDpi xmlns:a14="http://schemas.microsoft.com/office/drawing/2010/main" val="0"/>
+                <a14:useLocalDpi xmlns:a14="http://schemas.microsoft.com/office/drawing/2010/main" xmlns="" val="0"/>
               </a:ext>
             </a:extLst>
           </a:blip>
@@ -36833,7 +34905,7 @@
           <a:noFill/>
           <a:extLst>
             <a:ext uri="{909E8E84-426E-40DD-AFC4-6F175D3DCCD1}">
-              <a14:hiddenFill xmlns:a14="http://schemas.microsoft.com/office/drawing/2010/main">
+              <a14:hiddenFill xmlns:a14="http://schemas.microsoft.com/office/drawing/2010/main" xmlns="">
                 <a:solidFill>
                   <a:srgbClr val="FFFFFF"/>
                 </a:solidFill>
@@ -36879,7 +34951,7 @@
     </p:spTree>
     <p:extLst>
       <p:ext uri="{BB962C8B-B14F-4D97-AF65-F5344CB8AC3E}">
-        <p14:creationId xmlns:p14="http://schemas.microsoft.com/office/powerpoint/2010/main" val="3000389116"/>
+        <p14:creationId xmlns:p14="http://schemas.microsoft.com/office/powerpoint/2010/main" xmlns="" val="3000389116"/>
       </p:ext>
     </p:extLst>
   </p:cSld>
@@ -36946,7 +35018,7 @@
           <p:nvPr>
             <p:extLst>
               <p:ext uri="{D42A27DB-BD31-4B8C-83A1-F6EECF244321}">
-                <p14:modId xmlns:p14="http://schemas.microsoft.com/office/powerpoint/2010/main" val="548316895"/>
+                <p14:modId xmlns:p14="http://schemas.microsoft.com/office/powerpoint/2010/main" xmlns="" val="548316895"/>
               </p:ext>
             </p:extLst>
           </p:nvPr>
@@ -36968,7 +35040,7 @@
           <p:nvPr>
             <p:extLst>
               <p:ext uri="{D42A27DB-BD31-4B8C-83A1-F6EECF244321}">
-                <p14:modId xmlns:p14="http://schemas.microsoft.com/office/powerpoint/2010/main" val="914656860"/>
+                <p14:modId xmlns:p14="http://schemas.microsoft.com/office/powerpoint/2010/main" xmlns="" val="914656860"/>
               </p:ext>
             </p:extLst>
           </p:nvPr>
@@ -37042,7 +35114,7 @@
             </a:clrChange>
             <a:extLst>
               <a:ext uri="{28A0092B-C50C-407E-A947-70E740481C1C}">
-                <a14:useLocalDpi xmlns:a14="http://schemas.microsoft.com/office/drawing/2010/main" val="0"/>
+                <a14:useLocalDpi xmlns:a14="http://schemas.microsoft.com/office/drawing/2010/main" xmlns="" val="0"/>
               </a:ext>
             </a:extLst>
           </a:blip>
@@ -37062,7 +35134,7 @@
           <a:noFill/>
           <a:extLst>
             <a:ext uri="{909E8E84-426E-40DD-AFC4-6F175D3DCCD1}">
-              <a14:hiddenFill xmlns:a14="http://schemas.microsoft.com/office/drawing/2010/main">
+              <a14:hiddenFill xmlns:a14="http://schemas.microsoft.com/office/drawing/2010/main" xmlns="">
                 <a:solidFill>
                   <a:srgbClr val="FFFFFF"/>
                 </a:solidFill>
@@ -37130,7 +35202,7 @@
             </a:clrChange>
             <a:extLst>
               <a:ext uri="{28A0092B-C50C-407E-A947-70E740481C1C}">
-                <a14:useLocalDpi xmlns:a14="http://schemas.microsoft.com/office/drawing/2010/main" val="0"/>
+                <a14:useLocalDpi xmlns:a14="http://schemas.microsoft.com/office/drawing/2010/main" xmlns="" val="0"/>
               </a:ext>
             </a:extLst>
           </a:blip>
@@ -37150,7 +35222,7 @@
           <a:noFill/>
           <a:extLst>
             <a:ext uri="{909E8E84-426E-40DD-AFC4-6F175D3DCCD1}">
-              <a14:hiddenFill xmlns:a14="http://schemas.microsoft.com/office/drawing/2010/main">
+              <a14:hiddenFill xmlns:a14="http://schemas.microsoft.com/office/drawing/2010/main" xmlns="">
                 <a:solidFill>
                   <a:srgbClr val="FFFFFF"/>
                 </a:solidFill>
@@ -37181,7 +35253,7 @@
             </a:clrChange>
             <a:extLst>
               <a:ext uri="{28A0092B-C50C-407E-A947-70E740481C1C}">
-                <a14:useLocalDpi xmlns:a14="http://schemas.microsoft.com/office/drawing/2010/main" val="0"/>
+                <a14:useLocalDpi xmlns:a14="http://schemas.microsoft.com/office/drawing/2010/main" xmlns="" val="0"/>
               </a:ext>
             </a:extLst>
           </a:blip>
@@ -37201,7 +35273,7 @@
           <a:noFill/>
           <a:extLst>
             <a:ext uri="{909E8E84-426E-40DD-AFC4-6F175D3DCCD1}">
-              <a14:hiddenFill xmlns:a14="http://schemas.microsoft.com/office/drawing/2010/main">
+              <a14:hiddenFill xmlns:a14="http://schemas.microsoft.com/office/drawing/2010/main" xmlns="">
                 <a:solidFill>
                   <a:srgbClr val="FFFFFF"/>
                 </a:solidFill>
@@ -37232,7 +35304,7 @@
             </a:clrChange>
             <a:extLst>
               <a:ext uri="{28A0092B-C50C-407E-A947-70E740481C1C}">
-                <a14:useLocalDpi xmlns:a14="http://schemas.microsoft.com/office/drawing/2010/main" val="0"/>
+                <a14:useLocalDpi xmlns:a14="http://schemas.microsoft.com/office/drawing/2010/main" xmlns="" val="0"/>
               </a:ext>
             </a:extLst>
           </a:blip>
@@ -37252,7 +35324,7 @@
           <a:noFill/>
           <a:extLst>
             <a:ext uri="{909E8E84-426E-40DD-AFC4-6F175D3DCCD1}">
-              <a14:hiddenFill xmlns:a14="http://schemas.microsoft.com/office/drawing/2010/main">
+              <a14:hiddenFill xmlns:a14="http://schemas.microsoft.com/office/drawing/2010/main" xmlns="">
                 <a:solidFill>
                   <a:srgbClr val="FFFFFF"/>
                 </a:solidFill>
@@ -37273,7 +35345,7 @@
           <a:blip r:embed="rId17" cstate="print">
             <a:extLst>
               <a:ext uri="{28A0092B-C50C-407E-A947-70E740481C1C}">
-                <a14:useLocalDpi xmlns:a14="http://schemas.microsoft.com/office/drawing/2010/main" val="0"/>
+                <a14:useLocalDpi xmlns:a14="http://schemas.microsoft.com/office/drawing/2010/main" xmlns="" val="0"/>
               </a:ext>
             </a:extLst>
           </a:blip>
@@ -37293,7 +35365,7 @@
           <a:noFill/>
           <a:extLst>
             <a:ext uri="{909E8E84-426E-40DD-AFC4-6F175D3DCCD1}">
-              <a14:hiddenFill xmlns:a14="http://schemas.microsoft.com/office/drawing/2010/main">
+              <a14:hiddenFill xmlns:a14="http://schemas.microsoft.com/office/drawing/2010/main" xmlns="">
                 <a:solidFill>
                   <a:srgbClr val="FFFFFF"/>
                 </a:solidFill>
@@ -37324,7 +35396,7 @@
             </a:clrChange>
             <a:extLst>
               <a:ext uri="{28A0092B-C50C-407E-A947-70E740481C1C}">
-                <a14:useLocalDpi xmlns:a14="http://schemas.microsoft.com/office/drawing/2010/main" val="0"/>
+                <a14:useLocalDpi xmlns:a14="http://schemas.microsoft.com/office/drawing/2010/main" xmlns="" val="0"/>
               </a:ext>
             </a:extLst>
           </a:blip>
@@ -37344,7 +35416,7 @@
           <a:noFill/>
           <a:extLst>
             <a:ext uri="{909E8E84-426E-40DD-AFC4-6F175D3DCCD1}">
-              <a14:hiddenFill xmlns:a14="http://schemas.microsoft.com/office/drawing/2010/main">
+              <a14:hiddenFill xmlns:a14="http://schemas.microsoft.com/office/drawing/2010/main" xmlns="">
                 <a:solidFill>
                   <a:srgbClr val="FFFFFF"/>
                 </a:solidFill>
@@ -37375,7 +35447,7 @@
             </a:clrChange>
             <a:extLst>
               <a:ext uri="{28A0092B-C50C-407E-A947-70E740481C1C}">
-                <a14:useLocalDpi xmlns:a14="http://schemas.microsoft.com/office/drawing/2010/main" val="0"/>
+                <a14:useLocalDpi xmlns:a14="http://schemas.microsoft.com/office/drawing/2010/main" xmlns="" val="0"/>
               </a:ext>
             </a:extLst>
           </a:blip>
@@ -37393,7 +35465,7 @@
           <a:noFill/>
           <a:extLst>
             <a:ext uri="{909E8E84-426E-40DD-AFC4-6F175D3DCCD1}">
-              <a14:hiddenFill xmlns:a14="http://schemas.microsoft.com/office/drawing/2010/main">
+              <a14:hiddenFill xmlns:a14="http://schemas.microsoft.com/office/drawing/2010/main" xmlns="">
                 <a:solidFill>
                   <a:srgbClr val="FFFFFF"/>
                 </a:solidFill>
@@ -37405,7 +35477,7 @@
     </p:spTree>
     <p:extLst>
       <p:ext uri="{BB962C8B-B14F-4D97-AF65-F5344CB8AC3E}">
-        <p14:creationId xmlns:p14="http://schemas.microsoft.com/office/powerpoint/2010/main" val="1007964341"/>
+        <p14:creationId xmlns:p14="http://schemas.microsoft.com/office/powerpoint/2010/main" xmlns="" val="1007964341"/>
       </p:ext>
     </p:extLst>
   </p:cSld>
@@ -37504,7 +35576,7 @@
           <p:nvPr>
             <p:extLst>
               <p:ext uri="{D42A27DB-BD31-4B8C-83A1-F6EECF244321}">
-                <p14:modId xmlns:p14="http://schemas.microsoft.com/office/powerpoint/2010/main" val="422745057"/>
+                <p14:modId xmlns:p14="http://schemas.microsoft.com/office/powerpoint/2010/main" xmlns="" val="422745057"/>
               </p:ext>
             </p:extLst>
           </p:nvPr>
@@ -37526,7 +35598,7 @@
           <p:nvPr>
             <p:extLst>
               <p:ext uri="{D42A27DB-BD31-4B8C-83A1-F6EECF244321}">
-                <p14:modId xmlns:p14="http://schemas.microsoft.com/office/powerpoint/2010/main" val="762260667"/>
+                <p14:modId xmlns:p14="http://schemas.microsoft.com/office/powerpoint/2010/main" xmlns="" val="762260667"/>
               </p:ext>
             </p:extLst>
           </p:nvPr>
@@ -37553,7 +35625,7 @@
           <a:blip r:embed="rId12" cstate="print">
             <a:extLst>
               <a:ext uri="{28A0092B-C50C-407E-A947-70E740481C1C}">
-                <a14:useLocalDpi xmlns:a14="http://schemas.microsoft.com/office/drawing/2010/main" val="0"/>
+                <a14:useLocalDpi xmlns:a14="http://schemas.microsoft.com/office/drawing/2010/main" xmlns="" val="0"/>
               </a:ext>
             </a:extLst>
           </a:blip>
@@ -37577,14 +35649,14 @@
           <a:effectLst/>
           <a:extLst>
             <a:ext uri="{909E8E84-426E-40DD-AFC4-6F175D3DCCD1}">
-              <a14:hiddenFill xmlns:a14="http://schemas.microsoft.com/office/drawing/2010/main">
+              <a14:hiddenFill xmlns:a14="http://schemas.microsoft.com/office/drawing/2010/main" xmlns="">
                 <a:solidFill>
                   <a:schemeClr val="accent1"/>
                 </a:solidFill>
               </a14:hiddenFill>
             </a:ext>
             <a:ext uri="{91240B29-F687-4F45-9708-019B960494DF}">
-              <a14:hiddenLine xmlns:a14="http://schemas.microsoft.com/office/drawing/2010/main" w="9525">
+              <a14:hiddenLine xmlns:a14="http://schemas.microsoft.com/office/drawing/2010/main" xmlns="" w="9525">
                 <a:solidFill>
                   <a:schemeClr val="tx1"/>
                 </a:solidFill>
@@ -37594,7 +35666,7 @@
               </a14:hiddenLine>
             </a:ext>
             <a:ext uri="{AF507438-7753-43E0-B8FC-AC1667EBCBE1}">
-              <a14:hiddenEffects xmlns:a14="http://schemas.microsoft.com/office/drawing/2010/main">
+              <a14:hiddenEffects xmlns:a14="http://schemas.microsoft.com/office/drawing/2010/main" xmlns="">
                 <a:effectLst>
                   <a:outerShdw dist="35921" dir="2700000" algn="ctr" rotWithShape="0">
                     <a:schemeClr val="bg2"/>
@@ -37617,7 +35689,7 @@
           <a:blip r:embed="rId13" cstate="print">
             <a:extLst>
               <a:ext uri="{28A0092B-C50C-407E-A947-70E740481C1C}">
-                <a14:useLocalDpi xmlns:a14="http://schemas.microsoft.com/office/drawing/2010/main" val="0"/>
+                <a14:useLocalDpi xmlns:a14="http://schemas.microsoft.com/office/drawing/2010/main" xmlns="" val="0"/>
               </a:ext>
             </a:extLst>
           </a:blip>
@@ -37641,14 +35713,14 @@
           <a:effectLst/>
           <a:extLst>
             <a:ext uri="{909E8E84-426E-40DD-AFC4-6F175D3DCCD1}">
-              <a14:hiddenFill xmlns:a14="http://schemas.microsoft.com/office/drawing/2010/main">
+              <a14:hiddenFill xmlns:a14="http://schemas.microsoft.com/office/drawing/2010/main" xmlns="">
                 <a:solidFill>
                   <a:schemeClr val="accent1"/>
                 </a:solidFill>
               </a14:hiddenFill>
             </a:ext>
             <a:ext uri="{91240B29-F687-4F45-9708-019B960494DF}">
-              <a14:hiddenLine xmlns:a14="http://schemas.microsoft.com/office/drawing/2010/main" w="9525">
+              <a14:hiddenLine xmlns:a14="http://schemas.microsoft.com/office/drawing/2010/main" xmlns="" w="9525">
                 <a:solidFill>
                   <a:schemeClr val="tx1"/>
                 </a:solidFill>
@@ -37658,7 +35730,7 @@
               </a14:hiddenLine>
             </a:ext>
             <a:ext uri="{AF507438-7753-43E0-B8FC-AC1667EBCBE1}">
-              <a14:hiddenEffects xmlns:a14="http://schemas.microsoft.com/office/drawing/2010/main">
+              <a14:hiddenEffects xmlns:a14="http://schemas.microsoft.com/office/drawing/2010/main" xmlns="">
                 <a:effectLst>
                   <a:outerShdw dist="35921" dir="2700000" algn="ctr" rotWithShape="0">
                     <a:schemeClr val="bg2"/>
@@ -37672,7 +35744,7 @@
     </p:spTree>
     <p:extLst>
       <p:ext uri="{BB962C8B-B14F-4D97-AF65-F5344CB8AC3E}">
-        <p14:creationId xmlns:p14="http://schemas.microsoft.com/office/powerpoint/2010/main" val="1600518736"/>
+        <p14:creationId xmlns:p14="http://schemas.microsoft.com/office/powerpoint/2010/main" xmlns="" val="1600518736"/>
       </p:ext>
     </p:extLst>
   </p:cSld>
@@ -37778,7 +35850,7 @@
           <a:blip r:embed="rId2" cstate="print">
             <a:extLst>
               <a:ext uri="{28A0092B-C50C-407E-A947-70E740481C1C}">
-                <a14:useLocalDpi xmlns:a14="http://schemas.microsoft.com/office/drawing/2010/main" val="0"/>
+                <a14:useLocalDpi xmlns:a14="http://schemas.microsoft.com/office/drawing/2010/main" xmlns="" val="0"/>
               </a:ext>
             </a:extLst>
           </a:blip>
@@ -37798,7 +35870,7 @@
           <a:noFill/>
           <a:extLst>
             <a:ext uri="{909E8E84-426E-40DD-AFC4-6F175D3DCCD1}">
-              <a14:hiddenFill xmlns:a14="http://schemas.microsoft.com/office/drawing/2010/main">
+              <a14:hiddenFill xmlns:a14="http://schemas.microsoft.com/office/drawing/2010/main" xmlns="">
                 <a:solidFill>
                   <a:srgbClr val="FFFFFF"/>
                 </a:solidFill>
@@ -38231,7 +36303,7 @@
     </p:spTree>
     <p:extLst>
       <p:ext uri="{BB962C8B-B14F-4D97-AF65-F5344CB8AC3E}">
-        <p14:creationId xmlns:p14="http://schemas.microsoft.com/office/powerpoint/2010/main" val="979251354"/>
+        <p14:creationId xmlns:p14="http://schemas.microsoft.com/office/powerpoint/2010/main" xmlns="" val="979251354"/>
       </p:ext>
     </p:extLst>
   </p:cSld>
@@ -38559,7 +36631,7 @@
     </p:spTree>
     <p:extLst>
       <p:ext uri="{BB962C8B-B14F-4D97-AF65-F5344CB8AC3E}">
-        <p14:creationId xmlns:p14="http://schemas.microsoft.com/office/powerpoint/2010/main" val="3986978259"/>
+        <p14:creationId xmlns:p14="http://schemas.microsoft.com/office/powerpoint/2010/main" xmlns="" val="3986978259"/>
       </p:ext>
     </p:extLst>
   </p:cSld>
@@ -43374,7 +41446,7 @@
     </p:spTree>
     <p:extLst>
       <p:ext uri="{BB962C8B-B14F-4D97-AF65-F5344CB8AC3E}">
-        <p14:creationId xmlns:p14="http://schemas.microsoft.com/office/powerpoint/2010/main" val="2766175370"/>
+        <p14:creationId xmlns:p14="http://schemas.microsoft.com/office/powerpoint/2010/main" xmlns="" val="2766175370"/>
       </p:ext>
     </p:extLst>
   </p:cSld>

</xml_diff>